<commit_message>
Updated broken links, removed Notes and few minor changes
</commit_message>
<xml_diff>
--- a/S26/documents/Recitation_0_Series/0.07/Recitation 0.7 Git_Github.pptx
+++ b/S26/documents/Recitation_0_Series/0.07/Recitation 0.7 Git_Github.pptx
@@ -21,18 +21,31 @@
     <p:sldId id="266" r:id="rId16"/>
     <p:sldId id="267" r:id="rId17"/>
     <p:sldId id="268" r:id="rId18"/>
+    <p:sldId id="269" r:id="rId19"/>
+    <p:sldId id="270" r:id="rId20"/>
+    <p:sldId id="271" r:id="rId21"/>
+    <p:sldId id="272" r:id="rId22"/>
+    <p:sldId id="273" r:id="rId23"/>
+    <p:sldId id="274" r:id="rId24"/>
   </p:sldIdLst>
   <p:sldSz cy="5143500" cx="9144000"/>
   <p:notesSz cx="6858000" cy="9144000"/>
   <p:embeddedFontLst>
     <p:embeddedFont>
+      <p:font typeface="Nunito"/>
+      <p:regular r:id="rId25"/>
+      <p:bold r:id="rId26"/>
+      <p:italic r:id="rId27"/>
+      <p:boldItalic r:id="rId28"/>
+    </p:embeddedFont>
+    <p:embeddedFont>
       <p:font typeface="Average"/>
-      <p:regular r:id="rId19"/>
+      <p:regular r:id="rId29"/>
     </p:embeddedFont>
     <p:embeddedFont>
       <p:font typeface="Oswald"/>
-      <p:regular r:id="rId20"/>
-      <p:bold r:id="rId21"/>
+      <p:regular r:id="rId30"/>
+      <p:bold r:id="rId31"/>
     </p:embeddedFont>
   </p:embeddedFontLst>
   <p:defaultTextStyle>
@@ -813,7 +826,7 @@
   <p:cSld>
     <p:spTree>
       <p:nvGrpSpPr>
-        <p:cNvPr id="111" name="Shape 111"/>
+        <p:cNvPr id="117" name="Shape 117"/>
         <p:cNvGrpSpPr/>
         <p:nvPr/>
       </p:nvGrpSpPr>
@@ -827,7 +840,7 @@
       </p:grpSpPr>
       <p:sp>
         <p:nvSpPr>
-          <p:cNvPr id="112" name="Google Shape;112;g3ad558a6d07_0_321:notes"/>
+          <p:cNvPr id="118" name="Google Shape;118;g3ad558a6d07_0_296:notes"/>
           <p:cNvSpPr/>
           <p:nvPr>
             <p:ph idx="2" type="sldImg"/>
@@ -862,7 +875,7 @@
       </p:sp>
       <p:sp>
         <p:nvSpPr>
-          <p:cNvPr id="113" name="Google Shape;113;g3ad558a6d07_0_321:notes"/>
+          <p:cNvPr id="119" name="Google Shape;119;g3ad558a6d07_0_296:notes"/>
           <p:cNvSpPr txBox="1"/>
           <p:nvPr>
             <p:ph idx="1" type="body"/>
@@ -912,7 +925,7 @@
   <p:cSld>
     <p:spTree>
       <p:nvGrpSpPr>
-        <p:cNvPr id="117" name="Shape 117"/>
+        <p:cNvPr id="123" name="Shape 123"/>
         <p:cNvGrpSpPr/>
         <p:nvPr/>
       </p:nvGrpSpPr>
@@ -926,7 +939,7 @@
       </p:grpSpPr>
       <p:sp>
         <p:nvSpPr>
-          <p:cNvPr id="118" name="Google Shape;118;g3ad558a6d07_0_326:notes"/>
+          <p:cNvPr id="124" name="Google Shape;124;g3ad558a6d07_0_301:notes"/>
           <p:cNvSpPr/>
           <p:nvPr>
             <p:ph idx="2" type="sldImg"/>
@@ -961,7 +974,7 @@
       </p:sp>
       <p:sp>
         <p:nvSpPr>
-          <p:cNvPr id="119" name="Google Shape;119;g3ad558a6d07_0_326:notes"/>
+          <p:cNvPr id="125" name="Google Shape;125;g3ad558a6d07_0_301:notes"/>
           <p:cNvSpPr txBox="1"/>
           <p:nvPr>
             <p:ph idx="1" type="body"/>
@@ -1011,7 +1024,7 @@
   <p:cSld>
     <p:spTree>
       <p:nvGrpSpPr>
-        <p:cNvPr id="123" name="Shape 123"/>
+        <p:cNvPr id="129" name="Shape 129"/>
         <p:cNvGrpSpPr/>
         <p:nvPr/>
       </p:nvGrpSpPr>
@@ -1025,7 +1038,7 @@
       </p:grpSpPr>
       <p:sp>
         <p:nvSpPr>
-          <p:cNvPr id="124" name="Google Shape;124;g3a412ac772a_0_1:notes"/>
+          <p:cNvPr id="130" name="Google Shape;130;g3ad558a6d07_0_291:notes"/>
           <p:cNvSpPr/>
           <p:nvPr>
             <p:ph idx="2" type="sldImg"/>
@@ -1060,7 +1073,7 @@
       </p:sp>
       <p:sp>
         <p:nvSpPr>
-          <p:cNvPr id="125" name="Google Shape;125;g3a412ac772a_0_1:notes"/>
+          <p:cNvPr id="131" name="Google Shape;131;g3ad558a6d07_0_291:notes"/>
           <p:cNvSpPr txBox="1"/>
           <p:nvPr>
             <p:ph idx="1" type="body"/>
@@ -1110,7 +1123,7 @@
   <p:cSld>
     <p:spTree>
       <p:nvGrpSpPr>
-        <p:cNvPr id="129" name="Shape 129"/>
+        <p:cNvPr id="135" name="Shape 135"/>
         <p:cNvGrpSpPr/>
         <p:nvPr/>
       </p:nvGrpSpPr>
@@ -1124,7 +1137,7 @@
       </p:grpSpPr>
       <p:sp>
         <p:nvSpPr>
-          <p:cNvPr id="130" name="Google Shape;130;g3a412ac772a_0_6:notes"/>
+          <p:cNvPr id="136" name="Google Shape;136;g3ad558a6d07_0_306:notes"/>
           <p:cNvSpPr/>
           <p:nvPr>
             <p:ph idx="2" type="sldImg"/>
@@ -1159,7 +1172,601 @@
       </p:sp>
       <p:sp>
         <p:nvSpPr>
-          <p:cNvPr id="131" name="Google Shape;131;g3a412ac772a_0_6:notes"/>
+          <p:cNvPr id="137" name="Google Shape;137;g3ad558a6d07_0_306:notes"/>
+          <p:cNvSpPr txBox="1"/>
+          <p:nvPr>
+            <p:ph idx="1" type="body"/>
+          </p:nvPr>
+        </p:nvSpPr>
+        <p:spPr>
+          <a:xfrm>
+            <a:off x="685800" y="4343400"/>
+            <a:ext cx="5486400" cy="4114800"/>
+          </a:xfrm>
+          <a:prstGeom prst="rect">
+            <a:avLst/>
+          </a:prstGeom>
+        </p:spPr>
+        <p:txBody>
+          <a:bodyPr anchorCtr="0" anchor="t" bIns="91425" lIns="91425" spcFirstLastPara="1" rIns="91425" wrap="square" tIns="91425">
+            <a:noAutofit/>
+          </a:bodyPr>
+          <a:lstStyle/>
+          <a:p>
+            <a:pPr indent="0" lvl="0" marL="0" rtl="0" algn="l">
+              <a:spcBef>
+                <a:spcPts val="0"/>
+              </a:spcBef>
+              <a:spcAft>
+                <a:spcPts val="0"/>
+              </a:spcAft>
+              <a:buNone/>
+            </a:pPr>
+            <a:r>
+              <a:t/>
+            </a:r>
+            <a:endParaRPr/>
+          </a:p>
+        </p:txBody>
+      </p:sp>
+    </p:spTree>
+  </p:cSld>
+  <p:clrMapOvr>
+    <a:masterClrMapping/>
+  </p:clrMapOvr>
+</p:notes>
+</file>
+
+<file path=ppt/notesSlides/notesSlide14.xml><?xml version="1.0" encoding="utf-8"?>
+<p:notes xmlns:a="http://schemas.openxmlformats.org/drawingml/2006/main" xmlns:r="http://schemas.openxmlformats.org/officeDocument/2006/relationships" xmlns:mc="http://schemas.openxmlformats.org/markup-compatibility/2006" xmlns:mv="urn:schemas-microsoft-com:mac:vml" xmlns:p="http://schemas.openxmlformats.org/presentationml/2006/main" xmlns:c="http://schemas.openxmlformats.org/drawingml/2006/chart" xmlns:dgm="http://schemas.openxmlformats.org/drawingml/2006/diagram" xmlns:o="urn:schemas-microsoft-com:office:office" xmlns:v="urn:schemas-microsoft-com:vml" xmlns:pvml="urn:schemas-microsoft-com:office:powerpoint" xmlns:com="http://schemas.openxmlformats.org/drawingml/2006/compatibility" xmlns:p14="http://schemas.microsoft.com/office/powerpoint/2010/main" xmlns:p15="http://schemas.microsoft.com/office/powerpoint/2012/main" xmlns:ahyp="http://schemas.microsoft.com/office/drawing/2018/hyperlinkcolor" showMasterPhAnim="0" showMasterSp="0">
+  <p:cSld>
+    <p:spTree>
+      <p:nvGrpSpPr>
+        <p:cNvPr id="141" name="Shape 141"/>
+        <p:cNvGrpSpPr/>
+        <p:nvPr/>
+      </p:nvGrpSpPr>
+      <p:grpSpPr>
+        <a:xfrm>
+          <a:off x="0" y="0"/>
+          <a:ext cx="0" cy="0"/>
+          <a:chOff x="0" y="0"/>
+          <a:chExt cx="0" cy="0"/>
+        </a:xfrm>
+      </p:grpSpPr>
+      <p:sp>
+        <p:nvSpPr>
+          <p:cNvPr id="142" name="Google Shape;142;g3ad558a6d07_0_311:notes"/>
+          <p:cNvSpPr/>
+          <p:nvPr>
+            <p:ph idx="2" type="sldImg"/>
+          </p:nvPr>
+        </p:nvSpPr>
+        <p:spPr>
+          <a:xfrm>
+            <a:off x="381300" y="685800"/>
+            <a:ext cx="6096000" cy="3429000"/>
+          </a:xfrm>
+          <a:custGeom>
+            <a:rect b="b" l="l" r="r" t="t"/>
+            <a:pathLst>
+              <a:path extrusionOk="0" h="120000" w="120000">
+                <a:moveTo>
+                  <a:pt x="0" y="0"/>
+                </a:moveTo>
+                <a:lnTo>
+                  <a:pt x="120000" y="0"/>
+                </a:lnTo>
+                <a:lnTo>
+                  <a:pt x="120000" y="120000"/>
+                </a:lnTo>
+                <a:lnTo>
+                  <a:pt x="0" y="120000"/>
+                </a:lnTo>
+                <a:close/>
+              </a:path>
+            </a:pathLst>
+          </a:custGeom>
+        </p:spPr>
+      </p:sp>
+      <p:sp>
+        <p:nvSpPr>
+          <p:cNvPr id="143" name="Google Shape;143;g3ad558a6d07_0_311:notes"/>
+          <p:cNvSpPr txBox="1"/>
+          <p:nvPr>
+            <p:ph idx="1" type="body"/>
+          </p:nvPr>
+        </p:nvSpPr>
+        <p:spPr>
+          <a:xfrm>
+            <a:off x="685800" y="4343400"/>
+            <a:ext cx="5486400" cy="4114800"/>
+          </a:xfrm>
+          <a:prstGeom prst="rect">
+            <a:avLst/>
+          </a:prstGeom>
+        </p:spPr>
+        <p:txBody>
+          <a:bodyPr anchorCtr="0" anchor="t" bIns="91425" lIns="91425" spcFirstLastPara="1" rIns="91425" wrap="square" tIns="91425">
+            <a:noAutofit/>
+          </a:bodyPr>
+          <a:lstStyle/>
+          <a:p>
+            <a:pPr indent="0" lvl="0" marL="0" rtl="0" algn="l">
+              <a:spcBef>
+                <a:spcPts val="0"/>
+              </a:spcBef>
+              <a:spcAft>
+                <a:spcPts val="0"/>
+              </a:spcAft>
+              <a:buNone/>
+            </a:pPr>
+            <a:r>
+              <a:t/>
+            </a:r>
+            <a:endParaRPr/>
+          </a:p>
+        </p:txBody>
+      </p:sp>
+    </p:spTree>
+  </p:cSld>
+  <p:clrMapOvr>
+    <a:masterClrMapping/>
+  </p:clrMapOvr>
+</p:notes>
+</file>
+
+<file path=ppt/notesSlides/notesSlide15.xml><?xml version="1.0" encoding="utf-8"?>
+<p:notes xmlns:a="http://schemas.openxmlformats.org/drawingml/2006/main" xmlns:r="http://schemas.openxmlformats.org/officeDocument/2006/relationships" xmlns:mc="http://schemas.openxmlformats.org/markup-compatibility/2006" xmlns:mv="urn:schemas-microsoft-com:mac:vml" xmlns:p="http://schemas.openxmlformats.org/presentationml/2006/main" xmlns:c="http://schemas.openxmlformats.org/drawingml/2006/chart" xmlns:dgm="http://schemas.openxmlformats.org/drawingml/2006/diagram" xmlns:o="urn:schemas-microsoft-com:office:office" xmlns:v="urn:schemas-microsoft-com:vml" xmlns:pvml="urn:schemas-microsoft-com:office:powerpoint" xmlns:com="http://schemas.openxmlformats.org/drawingml/2006/compatibility" xmlns:p14="http://schemas.microsoft.com/office/powerpoint/2010/main" xmlns:p15="http://schemas.microsoft.com/office/powerpoint/2012/main" xmlns:ahyp="http://schemas.microsoft.com/office/drawing/2018/hyperlinkcolor" showMasterPhAnim="0" showMasterSp="0">
+  <p:cSld>
+    <p:spTree>
+      <p:nvGrpSpPr>
+        <p:cNvPr id="147" name="Shape 147"/>
+        <p:cNvGrpSpPr/>
+        <p:nvPr/>
+      </p:nvGrpSpPr>
+      <p:grpSpPr>
+        <a:xfrm>
+          <a:off x="0" y="0"/>
+          <a:ext cx="0" cy="0"/>
+          <a:chOff x="0" y="0"/>
+          <a:chExt cx="0" cy="0"/>
+        </a:xfrm>
+      </p:grpSpPr>
+      <p:sp>
+        <p:nvSpPr>
+          <p:cNvPr id="148" name="Google Shape;148;g3ad558a6d07_0_316:notes"/>
+          <p:cNvSpPr/>
+          <p:nvPr>
+            <p:ph idx="2" type="sldImg"/>
+          </p:nvPr>
+        </p:nvSpPr>
+        <p:spPr>
+          <a:xfrm>
+            <a:off x="381300" y="685800"/>
+            <a:ext cx="6096000" cy="3429000"/>
+          </a:xfrm>
+          <a:custGeom>
+            <a:rect b="b" l="l" r="r" t="t"/>
+            <a:pathLst>
+              <a:path extrusionOk="0" h="120000" w="120000">
+                <a:moveTo>
+                  <a:pt x="0" y="0"/>
+                </a:moveTo>
+                <a:lnTo>
+                  <a:pt x="120000" y="0"/>
+                </a:lnTo>
+                <a:lnTo>
+                  <a:pt x="120000" y="120000"/>
+                </a:lnTo>
+                <a:lnTo>
+                  <a:pt x="0" y="120000"/>
+                </a:lnTo>
+                <a:close/>
+              </a:path>
+            </a:pathLst>
+          </a:custGeom>
+        </p:spPr>
+      </p:sp>
+      <p:sp>
+        <p:nvSpPr>
+          <p:cNvPr id="149" name="Google Shape;149;g3ad558a6d07_0_316:notes"/>
+          <p:cNvSpPr txBox="1"/>
+          <p:nvPr>
+            <p:ph idx="1" type="body"/>
+          </p:nvPr>
+        </p:nvSpPr>
+        <p:spPr>
+          <a:xfrm>
+            <a:off x="685800" y="4343400"/>
+            <a:ext cx="5486400" cy="4114800"/>
+          </a:xfrm>
+          <a:prstGeom prst="rect">
+            <a:avLst/>
+          </a:prstGeom>
+        </p:spPr>
+        <p:txBody>
+          <a:bodyPr anchorCtr="0" anchor="t" bIns="91425" lIns="91425" spcFirstLastPara="1" rIns="91425" wrap="square" tIns="91425">
+            <a:noAutofit/>
+          </a:bodyPr>
+          <a:lstStyle/>
+          <a:p>
+            <a:pPr indent="0" lvl="0" marL="0" rtl="0" algn="l">
+              <a:spcBef>
+                <a:spcPts val="0"/>
+              </a:spcBef>
+              <a:spcAft>
+                <a:spcPts val="0"/>
+              </a:spcAft>
+              <a:buNone/>
+            </a:pPr>
+            <a:r>
+              <a:t/>
+            </a:r>
+            <a:endParaRPr/>
+          </a:p>
+        </p:txBody>
+      </p:sp>
+    </p:spTree>
+  </p:cSld>
+  <p:clrMapOvr>
+    <a:masterClrMapping/>
+  </p:clrMapOvr>
+</p:notes>
+</file>
+
+<file path=ppt/notesSlides/notesSlide16.xml><?xml version="1.0" encoding="utf-8"?>
+<p:notes xmlns:a="http://schemas.openxmlformats.org/drawingml/2006/main" xmlns:r="http://schemas.openxmlformats.org/officeDocument/2006/relationships" xmlns:mc="http://schemas.openxmlformats.org/markup-compatibility/2006" xmlns:mv="urn:schemas-microsoft-com:mac:vml" xmlns:p="http://schemas.openxmlformats.org/presentationml/2006/main" xmlns:c="http://schemas.openxmlformats.org/drawingml/2006/chart" xmlns:dgm="http://schemas.openxmlformats.org/drawingml/2006/diagram" xmlns:o="urn:schemas-microsoft-com:office:office" xmlns:v="urn:schemas-microsoft-com:vml" xmlns:pvml="urn:schemas-microsoft-com:office:powerpoint" xmlns:com="http://schemas.openxmlformats.org/drawingml/2006/compatibility" xmlns:p14="http://schemas.microsoft.com/office/powerpoint/2010/main" xmlns:p15="http://schemas.microsoft.com/office/powerpoint/2012/main" xmlns:ahyp="http://schemas.microsoft.com/office/drawing/2018/hyperlinkcolor" showMasterPhAnim="0" showMasterSp="0">
+  <p:cSld>
+    <p:spTree>
+      <p:nvGrpSpPr>
+        <p:cNvPr id="153" name="Shape 153"/>
+        <p:cNvGrpSpPr/>
+        <p:nvPr/>
+      </p:nvGrpSpPr>
+      <p:grpSpPr>
+        <a:xfrm>
+          <a:off x="0" y="0"/>
+          <a:ext cx="0" cy="0"/>
+          <a:chOff x="0" y="0"/>
+          <a:chExt cx="0" cy="0"/>
+        </a:xfrm>
+      </p:grpSpPr>
+      <p:sp>
+        <p:nvSpPr>
+          <p:cNvPr id="154" name="Google Shape;154;g3ad558a6d07_0_321:notes"/>
+          <p:cNvSpPr/>
+          <p:nvPr>
+            <p:ph idx="2" type="sldImg"/>
+          </p:nvPr>
+        </p:nvSpPr>
+        <p:spPr>
+          <a:xfrm>
+            <a:off x="381300" y="685800"/>
+            <a:ext cx="6096000" cy="3429000"/>
+          </a:xfrm>
+          <a:custGeom>
+            <a:rect b="b" l="l" r="r" t="t"/>
+            <a:pathLst>
+              <a:path extrusionOk="0" h="120000" w="120000">
+                <a:moveTo>
+                  <a:pt x="0" y="0"/>
+                </a:moveTo>
+                <a:lnTo>
+                  <a:pt x="120000" y="0"/>
+                </a:lnTo>
+                <a:lnTo>
+                  <a:pt x="120000" y="120000"/>
+                </a:lnTo>
+                <a:lnTo>
+                  <a:pt x="0" y="120000"/>
+                </a:lnTo>
+                <a:close/>
+              </a:path>
+            </a:pathLst>
+          </a:custGeom>
+        </p:spPr>
+      </p:sp>
+      <p:sp>
+        <p:nvSpPr>
+          <p:cNvPr id="155" name="Google Shape;155;g3ad558a6d07_0_321:notes"/>
+          <p:cNvSpPr txBox="1"/>
+          <p:nvPr>
+            <p:ph idx="1" type="body"/>
+          </p:nvPr>
+        </p:nvSpPr>
+        <p:spPr>
+          <a:xfrm>
+            <a:off x="685800" y="4343400"/>
+            <a:ext cx="5486400" cy="4114800"/>
+          </a:xfrm>
+          <a:prstGeom prst="rect">
+            <a:avLst/>
+          </a:prstGeom>
+        </p:spPr>
+        <p:txBody>
+          <a:bodyPr anchorCtr="0" anchor="t" bIns="91425" lIns="91425" spcFirstLastPara="1" rIns="91425" wrap="square" tIns="91425">
+            <a:noAutofit/>
+          </a:bodyPr>
+          <a:lstStyle/>
+          <a:p>
+            <a:pPr indent="0" lvl="0" marL="0" rtl="0" algn="l">
+              <a:spcBef>
+                <a:spcPts val="0"/>
+              </a:spcBef>
+              <a:spcAft>
+                <a:spcPts val="0"/>
+              </a:spcAft>
+              <a:buNone/>
+            </a:pPr>
+            <a:r>
+              <a:t/>
+            </a:r>
+            <a:endParaRPr/>
+          </a:p>
+        </p:txBody>
+      </p:sp>
+    </p:spTree>
+  </p:cSld>
+  <p:clrMapOvr>
+    <a:masterClrMapping/>
+  </p:clrMapOvr>
+</p:notes>
+</file>
+
+<file path=ppt/notesSlides/notesSlide17.xml><?xml version="1.0" encoding="utf-8"?>
+<p:notes xmlns:a="http://schemas.openxmlformats.org/drawingml/2006/main" xmlns:r="http://schemas.openxmlformats.org/officeDocument/2006/relationships" xmlns:mc="http://schemas.openxmlformats.org/markup-compatibility/2006" xmlns:mv="urn:schemas-microsoft-com:mac:vml" xmlns:p="http://schemas.openxmlformats.org/presentationml/2006/main" xmlns:c="http://schemas.openxmlformats.org/drawingml/2006/chart" xmlns:dgm="http://schemas.openxmlformats.org/drawingml/2006/diagram" xmlns:o="urn:schemas-microsoft-com:office:office" xmlns:v="urn:schemas-microsoft-com:vml" xmlns:pvml="urn:schemas-microsoft-com:office:powerpoint" xmlns:com="http://schemas.openxmlformats.org/drawingml/2006/compatibility" xmlns:p14="http://schemas.microsoft.com/office/powerpoint/2010/main" xmlns:p15="http://schemas.microsoft.com/office/powerpoint/2012/main" xmlns:ahyp="http://schemas.microsoft.com/office/drawing/2018/hyperlinkcolor" showMasterPhAnim="0" showMasterSp="0">
+  <p:cSld>
+    <p:spTree>
+      <p:nvGrpSpPr>
+        <p:cNvPr id="159" name="Shape 159"/>
+        <p:cNvGrpSpPr/>
+        <p:nvPr/>
+      </p:nvGrpSpPr>
+      <p:grpSpPr>
+        <a:xfrm>
+          <a:off x="0" y="0"/>
+          <a:ext cx="0" cy="0"/>
+          <a:chOff x="0" y="0"/>
+          <a:chExt cx="0" cy="0"/>
+        </a:xfrm>
+      </p:grpSpPr>
+      <p:sp>
+        <p:nvSpPr>
+          <p:cNvPr id="160" name="Google Shape;160;g3ad558a6d07_0_326:notes"/>
+          <p:cNvSpPr/>
+          <p:nvPr>
+            <p:ph idx="2" type="sldImg"/>
+          </p:nvPr>
+        </p:nvSpPr>
+        <p:spPr>
+          <a:xfrm>
+            <a:off x="381300" y="685800"/>
+            <a:ext cx="6096000" cy="3429000"/>
+          </a:xfrm>
+          <a:custGeom>
+            <a:rect b="b" l="l" r="r" t="t"/>
+            <a:pathLst>
+              <a:path extrusionOk="0" h="120000" w="120000">
+                <a:moveTo>
+                  <a:pt x="0" y="0"/>
+                </a:moveTo>
+                <a:lnTo>
+                  <a:pt x="120000" y="0"/>
+                </a:lnTo>
+                <a:lnTo>
+                  <a:pt x="120000" y="120000"/>
+                </a:lnTo>
+                <a:lnTo>
+                  <a:pt x="0" y="120000"/>
+                </a:lnTo>
+                <a:close/>
+              </a:path>
+            </a:pathLst>
+          </a:custGeom>
+        </p:spPr>
+      </p:sp>
+      <p:sp>
+        <p:nvSpPr>
+          <p:cNvPr id="161" name="Google Shape;161;g3ad558a6d07_0_326:notes"/>
+          <p:cNvSpPr txBox="1"/>
+          <p:nvPr>
+            <p:ph idx="1" type="body"/>
+          </p:nvPr>
+        </p:nvSpPr>
+        <p:spPr>
+          <a:xfrm>
+            <a:off x="685800" y="4343400"/>
+            <a:ext cx="5486400" cy="4114800"/>
+          </a:xfrm>
+          <a:prstGeom prst="rect">
+            <a:avLst/>
+          </a:prstGeom>
+        </p:spPr>
+        <p:txBody>
+          <a:bodyPr anchorCtr="0" anchor="t" bIns="91425" lIns="91425" spcFirstLastPara="1" rIns="91425" wrap="square" tIns="91425">
+            <a:noAutofit/>
+          </a:bodyPr>
+          <a:lstStyle/>
+          <a:p>
+            <a:pPr indent="0" lvl="0" marL="0" rtl="0" algn="l">
+              <a:spcBef>
+                <a:spcPts val="0"/>
+              </a:spcBef>
+              <a:spcAft>
+                <a:spcPts val="0"/>
+              </a:spcAft>
+              <a:buNone/>
+            </a:pPr>
+            <a:r>
+              <a:t/>
+            </a:r>
+            <a:endParaRPr/>
+          </a:p>
+        </p:txBody>
+      </p:sp>
+    </p:spTree>
+  </p:cSld>
+  <p:clrMapOvr>
+    <a:masterClrMapping/>
+  </p:clrMapOvr>
+</p:notes>
+</file>
+
+<file path=ppt/notesSlides/notesSlide18.xml><?xml version="1.0" encoding="utf-8"?>
+<p:notes xmlns:a="http://schemas.openxmlformats.org/drawingml/2006/main" xmlns:r="http://schemas.openxmlformats.org/officeDocument/2006/relationships" xmlns:mc="http://schemas.openxmlformats.org/markup-compatibility/2006" xmlns:mv="urn:schemas-microsoft-com:mac:vml" xmlns:p="http://schemas.openxmlformats.org/presentationml/2006/main" xmlns:c="http://schemas.openxmlformats.org/drawingml/2006/chart" xmlns:dgm="http://schemas.openxmlformats.org/drawingml/2006/diagram" xmlns:o="urn:schemas-microsoft-com:office:office" xmlns:v="urn:schemas-microsoft-com:vml" xmlns:pvml="urn:schemas-microsoft-com:office:powerpoint" xmlns:com="http://schemas.openxmlformats.org/drawingml/2006/compatibility" xmlns:p14="http://schemas.microsoft.com/office/powerpoint/2010/main" xmlns:p15="http://schemas.microsoft.com/office/powerpoint/2012/main" xmlns:ahyp="http://schemas.microsoft.com/office/drawing/2018/hyperlinkcolor" showMasterPhAnim="0" showMasterSp="0">
+  <p:cSld>
+    <p:spTree>
+      <p:nvGrpSpPr>
+        <p:cNvPr id="165" name="Shape 165"/>
+        <p:cNvGrpSpPr/>
+        <p:nvPr/>
+      </p:nvGrpSpPr>
+      <p:grpSpPr>
+        <a:xfrm>
+          <a:off x="0" y="0"/>
+          <a:ext cx="0" cy="0"/>
+          <a:chOff x="0" y="0"/>
+          <a:chExt cx="0" cy="0"/>
+        </a:xfrm>
+      </p:grpSpPr>
+      <p:sp>
+        <p:nvSpPr>
+          <p:cNvPr id="166" name="Google Shape;166;g3a412ac772a_0_1:notes"/>
+          <p:cNvSpPr/>
+          <p:nvPr>
+            <p:ph idx="2" type="sldImg"/>
+          </p:nvPr>
+        </p:nvSpPr>
+        <p:spPr>
+          <a:xfrm>
+            <a:off x="381300" y="685800"/>
+            <a:ext cx="6096000" cy="3429000"/>
+          </a:xfrm>
+          <a:custGeom>
+            <a:rect b="b" l="l" r="r" t="t"/>
+            <a:pathLst>
+              <a:path extrusionOk="0" h="120000" w="120000">
+                <a:moveTo>
+                  <a:pt x="0" y="0"/>
+                </a:moveTo>
+                <a:lnTo>
+                  <a:pt x="120000" y="0"/>
+                </a:lnTo>
+                <a:lnTo>
+                  <a:pt x="120000" y="120000"/>
+                </a:lnTo>
+                <a:lnTo>
+                  <a:pt x="0" y="120000"/>
+                </a:lnTo>
+                <a:close/>
+              </a:path>
+            </a:pathLst>
+          </a:custGeom>
+        </p:spPr>
+      </p:sp>
+      <p:sp>
+        <p:nvSpPr>
+          <p:cNvPr id="167" name="Google Shape;167;g3a412ac772a_0_1:notes"/>
+          <p:cNvSpPr txBox="1"/>
+          <p:nvPr>
+            <p:ph idx="1" type="body"/>
+          </p:nvPr>
+        </p:nvSpPr>
+        <p:spPr>
+          <a:xfrm>
+            <a:off x="685800" y="4343400"/>
+            <a:ext cx="5486400" cy="4114800"/>
+          </a:xfrm>
+          <a:prstGeom prst="rect">
+            <a:avLst/>
+          </a:prstGeom>
+        </p:spPr>
+        <p:txBody>
+          <a:bodyPr anchorCtr="0" anchor="t" bIns="91425" lIns="91425" spcFirstLastPara="1" rIns="91425" wrap="square" tIns="91425">
+            <a:noAutofit/>
+          </a:bodyPr>
+          <a:lstStyle/>
+          <a:p>
+            <a:pPr indent="0" lvl="0" marL="0" rtl="0" algn="l">
+              <a:spcBef>
+                <a:spcPts val="0"/>
+              </a:spcBef>
+              <a:spcAft>
+                <a:spcPts val="0"/>
+              </a:spcAft>
+              <a:buNone/>
+            </a:pPr>
+            <a:r>
+              <a:t/>
+            </a:r>
+            <a:endParaRPr/>
+          </a:p>
+        </p:txBody>
+      </p:sp>
+    </p:spTree>
+  </p:cSld>
+  <p:clrMapOvr>
+    <a:masterClrMapping/>
+  </p:clrMapOvr>
+</p:notes>
+</file>
+
+<file path=ppt/notesSlides/notesSlide19.xml><?xml version="1.0" encoding="utf-8"?>
+<p:notes xmlns:a="http://schemas.openxmlformats.org/drawingml/2006/main" xmlns:r="http://schemas.openxmlformats.org/officeDocument/2006/relationships" xmlns:mc="http://schemas.openxmlformats.org/markup-compatibility/2006" xmlns:mv="urn:schemas-microsoft-com:mac:vml" xmlns:p="http://schemas.openxmlformats.org/presentationml/2006/main" xmlns:c="http://schemas.openxmlformats.org/drawingml/2006/chart" xmlns:dgm="http://schemas.openxmlformats.org/drawingml/2006/diagram" xmlns:o="urn:schemas-microsoft-com:office:office" xmlns:v="urn:schemas-microsoft-com:vml" xmlns:pvml="urn:schemas-microsoft-com:office:powerpoint" xmlns:com="http://schemas.openxmlformats.org/drawingml/2006/compatibility" xmlns:p14="http://schemas.microsoft.com/office/powerpoint/2010/main" xmlns:p15="http://schemas.microsoft.com/office/powerpoint/2012/main" xmlns:ahyp="http://schemas.microsoft.com/office/drawing/2018/hyperlinkcolor" showMasterPhAnim="0" showMasterSp="0">
+  <p:cSld>
+    <p:spTree>
+      <p:nvGrpSpPr>
+        <p:cNvPr id="171" name="Shape 171"/>
+        <p:cNvGrpSpPr/>
+        <p:nvPr/>
+      </p:nvGrpSpPr>
+      <p:grpSpPr>
+        <a:xfrm>
+          <a:off x="0" y="0"/>
+          <a:ext cx="0" cy="0"/>
+          <a:chOff x="0" y="0"/>
+          <a:chExt cx="0" cy="0"/>
+        </a:xfrm>
+      </p:grpSpPr>
+      <p:sp>
+        <p:nvSpPr>
+          <p:cNvPr id="172" name="Google Shape;172;g3a412ac772a_0_6:notes"/>
+          <p:cNvSpPr/>
+          <p:nvPr>
+            <p:ph idx="2" type="sldImg"/>
+          </p:nvPr>
+        </p:nvSpPr>
+        <p:spPr>
+          <a:xfrm>
+            <a:off x="381300" y="685800"/>
+            <a:ext cx="6096000" cy="3429000"/>
+          </a:xfrm>
+          <a:custGeom>
+            <a:rect b="b" l="l" r="r" t="t"/>
+            <a:pathLst>
+              <a:path extrusionOk="0" h="120000" w="120000">
+                <a:moveTo>
+                  <a:pt x="0" y="0"/>
+                </a:moveTo>
+                <a:lnTo>
+                  <a:pt x="120000" y="0"/>
+                </a:lnTo>
+                <a:lnTo>
+                  <a:pt x="120000" y="120000"/>
+                </a:lnTo>
+                <a:lnTo>
+                  <a:pt x="0" y="120000"/>
+                </a:lnTo>
+                <a:close/>
+              </a:path>
+            </a:pathLst>
+          </a:custGeom>
+        </p:spPr>
+      </p:sp>
+      <p:sp>
+        <p:nvSpPr>
+          <p:cNvPr id="173" name="Google Shape;173;g3a412ac772a_0_6:notes"/>
           <p:cNvSpPr txBox="1"/>
           <p:nvPr>
             <p:ph idx="1" type="body"/>
@@ -1308,7 +1915,7 @@
   <p:cSld>
     <p:spTree>
       <p:nvGrpSpPr>
-        <p:cNvPr id="69" name="Shape 69"/>
+        <p:cNvPr id="70" name="Shape 70"/>
         <p:cNvGrpSpPr/>
         <p:nvPr/>
       </p:nvGrpSpPr>
@@ -1322,7 +1929,7 @@
       </p:grpSpPr>
       <p:sp>
         <p:nvSpPr>
-          <p:cNvPr id="70" name="Google Shape;70;g3a41800a066_0_0:notes"/>
+          <p:cNvPr id="71" name="Google Shape;71;g3ab465da5cf_0_26:notes"/>
           <p:cNvSpPr/>
           <p:nvPr>
             <p:ph idx="2" type="sldImg"/>
@@ -1357,7 +1964,7 @@
       </p:sp>
       <p:sp>
         <p:nvSpPr>
-          <p:cNvPr id="71" name="Google Shape;71;g3a41800a066_0_0:notes"/>
+          <p:cNvPr id="72" name="Google Shape;72;g3ab465da5cf_0_26:notes"/>
           <p:cNvSpPr txBox="1"/>
           <p:nvPr>
             <p:ph idx="1" type="body"/>
@@ -1407,7 +2014,7 @@
   <p:cSld>
     <p:spTree>
       <p:nvGrpSpPr>
-        <p:cNvPr id="75" name="Shape 75"/>
+        <p:cNvPr id="76" name="Shape 76"/>
         <p:cNvGrpSpPr/>
         <p:nvPr/>
       </p:nvGrpSpPr>
@@ -1421,7 +2028,7 @@
       </p:grpSpPr>
       <p:sp>
         <p:nvSpPr>
-          <p:cNvPr id="76" name="Google Shape;76;g3ad558a6d07_0_296:notes"/>
+          <p:cNvPr id="77" name="Google Shape;77;g3b3204d6968_0_0:notes"/>
           <p:cNvSpPr/>
           <p:nvPr>
             <p:ph idx="2" type="sldImg"/>
@@ -1456,7 +2063,7 @@
       </p:sp>
       <p:sp>
         <p:nvSpPr>
-          <p:cNvPr id="77" name="Google Shape;77;g3ad558a6d07_0_296:notes"/>
+          <p:cNvPr id="78" name="Google Shape;78;g3b3204d6968_0_0:notes"/>
           <p:cNvSpPr txBox="1"/>
           <p:nvPr>
             <p:ph idx="1" type="body"/>
@@ -1506,7 +2113,7 @@
   <p:cSld>
     <p:spTree>
       <p:nvGrpSpPr>
-        <p:cNvPr id="81" name="Shape 81"/>
+        <p:cNvPr id="82" name="Shape 82"/>
         <p:cNvGrpSpPr/>
         <p:nvPr/>
       </p:nvGrpSpPr>
@@ -1520,7 +2127,7 @@
       </p:grpSpPr>
       <p:sp>
         <p:nvSpPr>
-          <p:cNvPr id="82" name="Google Shape;82;g3ad558a6d07_0_301:notes"/>
+          <p:cNvPr id="83" name="Google Shape;83;g3ab465da5cf_0_42:notes"/>
           <p:cNvSpPr/>
           <p:nvPr>
             <p:ph idx="2" type="sldImg"/>
@@ -1555,7 +2162,7 @@
       </p:sp>
       <p:sp>
         <p:nvSpPr>
-          <p:cNvPr id="83" name="Google Shape;83;g3ad558a6d07_0_301:notes"/>
+          <p:cNvPr id="84" name="Google Shape;84;g3ab465da5cf_0_42:notes"/>
           <p:cNvSpPr txBox="1"/>
           <p:nvPr>
             <p:ph idx="1" type="body"/>
@@ -1605,7 +2212,7 @@
   <p:cSld>
     <p:spTree>
       <p:nvGrpSpPr>
-        <p:cNvPr id="87" name="Shape 87"/>
+        <p:cNvPr id="89" name="Shape 89"/>
         <p:cNvGrpSpPr/>
         <p:nvPr/>
       </p:nvGrpSpPr>
@@ -1619,7 +2226,7 @@
       </p:grpSpPr>
       <p:sp>
         <p:nvSpPr>
-          <p:cNvPr id="88" name="Google Shape;88;g3ad558a6d07_0_291:notes"/>
+          <p:cNvPr id="90" name="Google Shape;90;g3ab465da5cf_0_1:notes"/>
           <p:cNvSpPr/>
           <p:nvPr>
             <p:ph idx="2" type="sldImg"/>
@@ -1654,7 +2261,7 @@
       </p:sp>
       <p:sp>
         <p:nvSpPr>
-          <p:cNvPr id="89" name="Google Shape;89;g3ad558a6d07_0_291:notes"/>
+          <p:cNvPr id="91" name="Google Shape;91;g3ab465da5cf_0_1:notes"/>
           <p:cNvSpPr txBox="1"/>
           <p:nvPr>
             <p:ph idx="1" type="body"/>
@@ -1704,7 +2311,7 @@
   <p:cSld>
     <p:spTree>
       <p:nvGrpSpPr>
-        <p:cNvPr id="93" name="Shape 93"/>
+        <p:cNvPr id="96" name="Shape 96"/>
         <p:cNvGrpSpPr/>
         <p:nvPr/>
       </p:nvGrpSpPr>
@@ -1718,7 +2325,7 @@
       </p:grpSpPr>
       <p:sp>
         <p:nvSpPr>
-          <p:cNvPr id="94" name="Google Shape;94;g3ad558a6d07_0_306:notes"/>
+          <p:cNvPr id="97" name="Google Shape;97;g3b3204d6968_0_5:notes"/>
           <p:cNvSpPr/>
           <p:nvPr>
             <p:ph idx="2" type="sldImg"/>
@@ -1753,7 +2360,7 @@
       </p:sp>
       <p:sp>
         <p:nvSpPr>
-          <p:cNvPr id="95" name="Google Shape;95;g3ad558a6d07_0_306:notes"/>
+          <p:cNvPr id="98" name="Google Shape;98;g3b3204d6968_0_5:notes"/>
           <p:cNvSpPr txBox="1"/>
           <p:nvPr>
             <p:ph idx="1" type="body"/>
@@ -1803,7 +2410,7 @@
   <p:cSld>
     <p:spTree>
       <p:nvGrpSpPr>
-        <p:cNvPr id="99" name="Shape 99"/>
+        <p:cNvPr id="103" name="Shape 103"/>
         <p:cNvGrpSpPr/>
         <p:nvPr/>
       </p:nvGrpSpPr>
@@ -1817,7 +2424,7 @@
       </p:grpSpPr>
       <p:sp>
         <p:nvSpPr>
-          <p:cNvPr id="100" name="Google Shape;100;g3ad558a6d07_0_311:notes"/>
+          <p:cNvPr id="104" name="Google Shape;104;g3ab465da5cf_0_14:notes"/>
           <p:cNvSpPr/>
           <p:nvPr>
             <p:ph idx="2" type="sldImg"/>
@@ -1852,7 +2459,7 @@
       </p:sp>
       <p:sp>
         <p:nvSpPr>
-          <p:cNvPr id="101" name="Google Shape;101;g3ad558a6d07_0_311:notes"/>
+          <p:cNvPr id="105" name="Google Shape;105;g3ab465da5cf_0_14:notes"/>
           <p:cNvSpPr txBox="1"/>
           <p:nvPr>
             <p:ph idx="1" type="body"/>
@@ -1902,7 +2509,7 @@
   <p:cSld>
     <p:spTree>
       <p:nvGrpSpPr>
-        <p:cNvPr id="105" name="Shape 105"/>
+        <p:cNvPr id="110" name="Shape 110"/>
         <p:cNvGrpSpPr/>
         <p:nvPr/>
       </p:nvGrpSpPr>
@@ -1916,7 +2523,7 @@
       </p:grpSpPr>
       <p:sp>
         <p:nvSpPr>
-          <p:cNvPr id="106" name="Google Shape;106;g3ad558a6d07_0_316:notes"/>
+          <p:cNvPr id="111" name="Google Shape;111;g3a41800a066_0_0:notes"/>
           <p:cNvSpPr/>
           <p:nvPr>
             <p:ph idx="2" type="sldImg"/>
@@ -1951,7 +2558,7 @@
       </p:sp>
       <p:sp>
         <p:nvSpPr>
-          <p:cNvPr id="107" name="Google Shape;107;g3ad558a6d07_0_316:notes"/>
+          <p:cNvPr id="112" name="Google Shape;112;g3a41800a066_0_0:notes"/>
           <p:cNvSpPr txBox="1"/>
           <p:nvPr>
             <p:ph idx="1" type="body"/>
@@ -7435,7 +8042,7 @@
   <p:cSld>
     <p:spTree>
       <p:nvGrpSpPr>
-        <p:cNvPr id="114" name="Shape 114"/>
+        <p:cNvPr id="120" name="Shape 120"/>
         <p:cNvGrpSpPr/>
         <p:nvPr/>
       </p:nvGrpSpPr>
@@ -7449,7 +8056,7 @@
       </p:grpSpPr>
       <p:sp>
         <p:nvSpPr>
-          <p:cNvPr id="115" name="Google Shape;115;p22"/>
+          <p:cNvPr id="121" name="Google Shape;121;p22"/>
           <p:cNvSpPr txBox="1"/>
           <p:nvPr>
             <p:ph type="title"/>
@@ -7486,15 +8093,7 @@
                   <a:schemeClr val="accent5"/>
                 </a:solidFill>
               </a:rPr>
-              <a:t>Init</a:t>
-            </a:r>
-            <a:r>
-              <a:rPr lang="en-GB" sz="3200">
-                <a:solidFill>
-                  <a:schemeClr val="accent5"/>
-                </a:solidFill>
-              </a:rPr>
-              <a:t> Command</a:t>
+              <a:t>Setting up Git</a:t>
             </a:r>
             <a:endParaRPr sz="3200">
               <a:solidFill>
@@ -7506,7 +8105,7 @@
       </p:sp>
       <p:sp>
         <p:nvSpPr>
-          <p:cNvPr id="116" name="Google Shape;116;p22"/>
+          <p:cNvPr id="122" name="Google Shape;122;p22"/>
           <p:cNvSpPr txBox="1"/>
           <p:nvPr>
             <p:ph idx="1" type="body"/>
@@ -7537,18 +8136,10 @@
               <a:buNone/>
             </a:pPr>
             <a:r>
-              <a:rPr i="1" lang="en-GB" sz="2100">
-                <a:solidFill>
-                  <a:schemeClr val="dk1"/>
-                </a:solidFill>
-              </a:rPr>
-              <a:t>git init</a:t>
-            </a:r>
-            <a:endParaRPr i="1" sz="2100">
-              <a:solidFill>
-                <a:schemeClr val="dk1"/>
-              </a:solidFill>
-            </a:endParaRPr>
+              <a:rPr lang="en-GB" sz="2100"/>
+              <a:t>Visual Studio Code</a:t>
+            </a:r>
+            <a:endParaRPr sz="2100"/>
           </a:p>
           <a:p>
             <a:pPr indent="0" lvl="0" marL="0" rtl="0" algn="l">
@@ -7561,26 +8152,10 @@
               <a:buNone/>
             </a:pPr>
             <a:r>
-              <a:rPr i="1" lang="en-GB" sz="2100">
-                <a:solidFill>
-                  <a:schemeClr val="dk1"/>
-                </a:solidFill>
-              </a:rPr>
-              <a:t>g</a:t>
-            </a:r>
-            <a:r>
-              <a:rPr i="1" lang="en-GB" sz="2100">
-                <a:solidFill>
-                  <a:schemeClr val="dk1"/>
-                </a:solidFill>
-              </a:rPr>
-              <a:t>it remote add origin &lt;-link-&gt;</a:t>
-            </a:r>
-            <a:endParaRPr i="1" sz="2100">
-              <a:solidFill>
-                <a:schemeClr val="dk1"/>
-              </a:solidFill>
-            </a:endParaRPr>
+              <a:rPr lang="en-GB" sz="2100"/>
+              <a:t>Windows (Git Bash)</a:t>
+            </a:r>
+            <a:endParaRPr sz="2100"/>
           </a:p>
           <a:p>
             <a:pPr indent="0" lvl="0" marL="0" rtl="0" algn="l">
@@ -7593,26 +8168,10 @@
               <a:buNone/>
             </a:pPr>
             <a:r>
-              <a:rPr i="1" lang="en-GB" sz="2100">
-                <a:solidFill>
-                  <a:schemeClr val="dk1"/>
-                </a:solidFill>
-              </a:rPr>
-              <a:t>g</a:t>
-            </a:r>
-            <a:r>
-              <a:rPr i="1" lang="en-GB" sz="2100">
-                <a:solidFill>
-                  <a:schemeClr val="dk1"/>
-                </a:solidFill>
-              </a:rPr>
-              <a:t>it remote -v</a:t>
-            </a:r>
-            <a:endParaRPr i="1" sz="2100">
-              <a:solidFill>
-                <a:schemeClr val="dk1"/>
-              </a:solidFill>
-            </a:endParaRPr>
+              <a:rPr lang="en-GB" sz="2100"/>
+              <a:t>Mac (Terminal)</a:t>
+            </a:r>
+            <a:endParaRPr sz="2100"/>
           </a:p>
           <a:p>
             <a:pPr indent="0" lvl="0" marL="0" rtl="0" algn="l">
@@ -7625,26 +8184,9 @@
               <a:buNone/>
             </a:pPr>
             <a:r>
-              <a:rPr i="1" lang="en-GB" sz="2100">
-                <a:solidFill>
-                  <a:schemeClr val="dk1"/>
-                </a:solidFill>
-              </a:rPr>
-              <a:t>g</a:t>
-            </a:r>
-            <a:r>
-              <a:rPr i="1" lang="en-GB" sz="2100">
-                <a:solidFill>
-                  <a:schemeClr val="dk1"/>
-                </a:solidFill>
-              </a:rPr>
-              <a:t>it branch</a:t>
-            </a:r>
-            <a:endParaRPr i="1" sz="2100">
-              <a:solidFill>
-                <a:schemeClr val="dk1"/>
-              </a:solidFill>
-            </a:endParaRPr>
+              <a:t/>
+            </a:r>
+            <a:endParaRPr sz="2100"/>
           </a:p>
           <a:p>
             <a:pPr indent="0" lvl="0" marL="0" rtl="0" algn="l">
@@ -7652,63 +8194,23 @@
                 <a:spcPts val="1200"/>
               </a:spcBef>
               <a:spcAft>
-                <a:spcPts val="0"/>
-              </a:spcAft>
-              <a:buNone/>
-            </a:pPr>
-            <a:r>
-              <a:rPr i="1" lang="en-GB" sz="2100">
-                <a:solidFill>
-                  <a:schemeClr val="dk1"/>
-                </a:solidFill>
-              </a:rPr>
-              <a:t>g</a:t>
-            </a:r>
-            <a:r>
-              <a:rPr i="1" lang="en-GB" sz="2100">
-                <a:solidFill>
-                  <a:schemeClr val="dk1"/>
-                </a:solidFill>
-              </a:rPr>
-              <a:t>it branch -M main</a:t>
-            </a:r>
-            <a:endParaRPr i="1" sz="2100">
-              <a:solidFill>
-                <a:schemeClr val="dk1"/>
-              </a:solidFill>
-            </a:endParaRPr>
-          </a:p>
-          <a:p>
-            <a:pPr indent="0" lvl="0" marL="0" rtl="0" algn="l">
-              <a:spcBef>
                 <a:spcPts val="1200"/>
-              </a:spcBef>
-              <a:spcAft>
-                <a:spcPts val="1200"/>
-              </a:spcAft>
-              <a:buNone/>
-            </a:pPr>
-            <a:r>
-              <a:rPr i="1" lang="en-GB" sz="2100">
-                <a:solidFill>
-                  <a:schemeClr val="dk1"/>
-                </a:solidFill>
-              </a:rPr>
-              <a:t>g</a:t>
-            </a:r>
-            <a:r>
-              <a:rPr i="1" lang="en-GB" sz="2100">
-                <a:solidFill>
-                  <a:schemeClr val="dk1"/>
-                </a:solidFill>
-              </a:rPr>
-              <a:t>it push origin main</a:t>
-            </a:r>
-            <a:endParaRPr i="1" sz="2100">
-              <a:solidFill>
-                <a:schemeClr val="dk1"/>
-              </a:solidFill>
-            </a:endParaRPr>
+              </a:spcAft>
+              <a:buNone/>
+            </a:pPr>
+            <a:r>
+              <a:rPr i="1" lang="en-GB" sz="2100"/>
+              <a:t>git </a:t>
+            </a:r>
+            <a:r>
+              <a:rPr i="1" lang="en-GB" sz="2100"/>
+              <a:t>--</a:t>
+            </a:r>
+            <a:r>
+              <a:rPr i="1" lang="en-GB" sz="2100"/>
+              <a:t>version</a:t>
+            </a:r>
+            <a:endParaRPr i="1" sz="2100"/>
           </a:p>
         </p:txBody>
       </p:sp>
@@ -7725,7 +8227,7 @@
   <p:cSld>
     <p:spTree>
       <p:nvGrpSpPr>
-        <p:cNvPr id="120" name="Shape 120"/>
+        <p:cNvPr id="126" name="Shape 126"/>
         <p:cNvGrpSpPr/>
         <p:nvPr/>
       </p:nvGrpSpPr>
@@ -7739,7 +8241,7 @@
       </p:grpSpPr>
       <p:sp>
         <p:nvSpPr>
-          <p:cNvPr id="121" name="Google Shape;121;p23"/>
+          <p:cNvPr id="127" name="Google Shape;127;p23"/>
           <p:cNvSpPr txBox="1"/>
           <p:nvPr>
             <p:ph type="title"/>
@@ -7760,7 +8262,7 @@
           </a:bodyPr>
           <a:lstStyle/>
           <a:p>
-            <a:pPr indent="0" lvl="0" marL="0" rtl="0" algn="ctr">
+            <a:pPr indent="0" lvl="0" marL="0" rtl="0" algn="l">
               <a:spcBef>
                 <a:spcPts val="0"/>
               </a:spcBef>
@@ -7776,7 +8278,15 @@
                   <a:schemeClr val="accent5"/>
                 </a:solidFill>
               </a:rPr>
-              <a:t>Git Branches</a:t>
+              <a:t>Configuring</a:t>
+            </a:r>
+            <a:r>
+              <a:rPr lang="en-GB" sz="3200">
+                <a:solidFill>
+                  <a:schemeClr val="accent5"/>
+                </a:solidFill>
+              </a:rPr>
+              <a:t> Git</a:t>
             </a:r>
             <a:endParaRPr sz="3200">
               <a:solidFill>
@@ -7786,9 +8296,1246 @@
           </a:p>
         </p:txBody>
       </p:sp>
+      <p:sp>
+        <p:nvSpPr>
+          <p:cNvPr id="128" name="Google Shape;128;p23"/>
+          <p:cNvSpPr txBox="1"/>
+          <p:nvPr>
+            <p:ph idx="1" type="body"/>
+          </p:nvPr>
+        </p:nvSpPr>
+        <p:spPr>
+          <a:xfrm>
+            <a:off x="311700" y="1152475"/>
+            <a:ext cx="8520600" cy="3416400"/>
+          </a:xfrm>
+          <a:prstGeom prst="rect">
+            <a:avLst/>
+          </a:prstGeom>
+        </p:spPr>
+        <p:txBody>
+          <a:bodyPr anchorCtr="0" anchor="t" bIns="91425" lIns="91425" spcFirstLastPara="1" rIns="91425" wrap="square" tIns="91425">
+            <a:normAutofit/>
+          </a:bodyPr>
+          <a:lstStyle/>
+          <a:p>
+            <a:pPr indent="0" lvl="0" marL="0" rtl="0" algn="l">
+              <a:spcBef>
+                <a:spcPts val="0"/>
+              </a:spcBef>
+              <a:spcAft>
+                <a:spcPts val="0"/>
+              </a:spcAft>
+              <a:buNone/>
+            </a:pPr>
+            <a:r>
+              <a:rPr i="1" lang="en-GB" sz="2100"/>
+              <a:t>git config </a:t>
+            </a:r>
+            <a:r>
+              <a:rPr i="1" lang="en-GB" sz="2100"/>
+              <a:t>--global user.name “Khushee”</a:t>
+            </a:r>
+            <a:endParaRPr i="1" sz="2100"/>
+          </a:p>
+          <a:p>
+            <a:pPr indent="0" lvl="0" marL="0" rtl="0" algn="l">
+              <a:spcBef>
+                <a:spcPts val="1200"/>
+              </a:spcBef>
+              <a:spcAft>
+                <a:spcPts val="0"/>
+              </a:spcAft>
+              <a:buNone/>
+            </a:pPr>
+            <a:r>
+              <a:rPr i="1" lang="en-GB" sz="2100"/>
+              <a:t>git config --global user.email “</a:t>
+            </a:r>
+            <a:r>
+              <a:rPr i="1" lang="en-GB" sz="2100" u="sng">
+                <a:solidFill>
+                  <a:schemeClr val="hlink"/>
+                </a:solidFill>
+                <a:hlinkClick r:id="rId3"/>
+              </a:rPr>
+              <a:t>khushee@gmail.com</a:t>
+            </a:r>
+            <a:r>
+              <a:rPr i="1" lang="en-GB" sz="2100"/>
+              <a:t>”</a:t>
+            </a:r>
+            <a:endParaRPr i="1" sz="2100"/>
+          </a:p>
+          <a:p>
+            <a:pPr indent="0" lvl="0" marL="0" rtl="0" algn="l">
+              <a:spcBef>
+                <a:spcPts val="1200"/>
+              </a:spcBef>
+              <a:spcAft>
+                <a:spcPts val="1200"/>
+              </a:spcAft>
+              <a:buNone/>
+            </a:pPr>
+            <a:r>
+              <a:rPr i="1" lang="en-GB" sz="2100"/>
+              <a:t>git config --list</a:t>
+            </a:r>
+            <a:endParaRPr i="1" sz="2100"/>
+          </a:p>
+        </p:txBody>
+      </p:sp>
+    </p:spTree>
+  </p:cSld>
+  <p:clrMapOvr>
+    <a:masterClrMapping/>
+  </p:clrMapOvr>
+</p:sld>
+</file>
+
+<file path=ppt/slides/slide12.xml><?xml version="1.0" encoding="utf-8"?>
+<p:sld xmlns:a="http://schemas.openxmlformats.org/drawingml/2006/main" xmlns:r="http://schemas.openxmlformats.org/officeDocument/2006/relationships" xmlns:mc="http://schemas.openxmlformats.org/markup-compatibility/2006" xmlns:mv="urn:schemas-microsoft-com:mac:vml" xmlns:p="http://schemas.openxmlformats.org/presentationml/2006/main" xmlns:c="http://schemas.openxmlformats.org/drawingml/2006/chart" xmlns:dgm="http://schemas.openxmlformats.org/drawingml/2006/diagram" xmlns:o="urn:schemas-microsoft-com:office:office" xmlns:v="urn:schemas-microsoft-com:vml" xmlns:pvml="urn:schemas-microsoft-com:office:powerpoint" xmlns:com="http://schemas.openxmlformats.org/drawingml/2006/compatibility" xmlns:p14="http://schemas.microsoft.com/office/powerpoint/2010/main" xmlns:p15="http://schemas.microsoft.com/office/powerpoint/2012/main" xmlns:ahyp="http://schemas.microsoft.com/office/drawing/2018/hyperlinkcolor">
+  <p:cSld>
+    <p:spTree>
+      <p:nvGrpSpPr>
+        <p:cNvPr id="132" name="Shape 132"/>
+        <p:cNvGrpSpPr/>
+        <p:nvPr/>
+      </p:nvGrpSpPr>
+      <p:grpSpPr>
+        <a:xfrm>
+          <a:off x="0" y="0"/>
+          <a:ext cx="0" cy="0"/>
+          <a:chOff x="0" y="0"/>
+          <a:chExt cx="0" cy="0"/>
+        </a:xfrm>
+      </p:grpSpPr>
+      <p:sp>
+        <p:nvSpPr>
+          <p:cNvPr id="133" name="Google Shape;133;p24"/>
+          <p:cNvSpPr txBox="1"/>
+          <p:nvPr>
+            <p:ph type="title"/>
+          </p:nvPr>
+        </p:nvSpPr>
+        <p:spPr>
+          <a:xfrm>
+            <a:off x="311700" y="445025"/>
+            <a:ext cx="8520600" cy="572700"/>
+          </a:xfrm>
+          <a:prstGeom prst="rect">
+            <a:avLst/>
+          </a:prstGeom>
+        </p:spPr>
+        <p:txBody>
+          <a:bodyPr anchorCtr="0" anchor="t" bIns="91425" lIns="91425" spcFirstLastPara="1" rIns="91425" wrap="square" tIns="91425">
+            <a:noAutofit/>
+          </a:bodyPr>
+          <a:lstStyle/>
+          <a:p>
+            <a:pPr indent="0" lvl="0" marL="0" rtl="0" algn="l">
+              <a:spcBef>
+                <a:spcPts val="0"/>
+              </a:spcBef>
+              <a:spcAft>
+                <a:spcPts val="0"/>
+              </a:spcAft>
+              <a:buSzPts val="990"/>
+              <a:buNone/>
+            </a:pPr>
+            <a:r>
+              <a:rPr lang="en-GB" sz="3200">
+                <a:solidFill>
+                  <a:schemeClr val="accent5"/>
+                </a:solidFill>
+              </a:rPr>
+              <a:t>Github Account</a:t>
+            </a:r>
+            <a:endParaRPr sz="3200">
+              <a:solidFill>
+                <a:schemeClr val="accent5"/>
+              </a:solidFill>
+            </a:endParaRPr>
+          </a:p>
+        </p:txBody>
+      </p:sp>
+      <p:sp>
+        <p:nvSpPr>
+          <p:cNvPr id="134" name="Google Shape;134;p24"/>
+          <p:cNvSpPr txBox="1"/>
+          <p:nvPr>
+            <p:ph idx="1" type="body"/>
+          </p:nvPr>
+        </p:nvSpPr>
+        <p:spPr>
+          <a:xfrm>
+            <a:off x="311700" y="1152475"/>
+            <a:ext cx="8520600" cy="3416400"/>
+          </a:xfrm>
+          <a:prstGeom prst="rect">
+            <a:avLst/>
+          </a:prstGeom>
+        </p:spPr>
+        <p:txBody>
+          <a:bodyPr anchorCtr="0" anchor="t" bIns="91425" lIns="91425" spcFirstLastPara="1" rIns="91425" wrap="square" tIns="91425">
+            <a:normAutofit/>
+          </a:bodyPr>
+          <a:lstStyle/>
+          <a:p>
+            <a:pPr indent="0" lvl="0" marL="0" rtl="0" algn="l">
+              <a:spcBef>
+                <a:spcPts val="0"/>
+              </a:spcBef>
+              <a:spcAft>
+                <a:spcPts val="0"/>
+              </a:spcAft>
+              <a:buNone/>
+            </a:pPr>
+            <a:r>
+              <a:rPr lang="en-GB" sz="2100"/>
+              <a:t>Create a new repository : github-demo</a:t>
+            </a:r>
+            <a:endParaRPr sz="2100"/>
+          </a:p>
+          <a:p>
+            <a:pPr indent="0" lvl="0" marL="0" rtl="0" algn="l">
+              <a:spcBef>
+                <a:spcPts val="1200"/>
+              </a:spcBef>
+              <a:spcAft>
+                <a:spcPts val="1200"/>
+              </a:spcAft>
+              <a:buNone/>
+            </a:pPr>
+            <a:r>
+              <a:rPr lang="en-GB" sz="2100"/>
+              <a:t>Make our first commit</a:t>
+            </a:r>
+            <a:endParaRPr sz="2100"/>
+          </a:p>
+        </p:txBody>
+      </p:sp>
+    </p:spTree>
+  </p:cSld>
+  <p:clrMapOvr>
+    <a:masterClrMapping/>
+  </p:clrMapOvr>
+</p:sld>
+</file>
+
+<file path=ppt/slides/slide13.xml><?xml version="1.0" encoding="utf-8"?>
+<p:sld xmlns:a="http://schemas.openxmlformats.org/drawingml/2006/main" xmlns:r="http://schemas.openxmlformats.org/officeDocument/2006/relationships" xmlns:mc="http://schemas.openxmlformats.org/markup-compatibility/2006" xmlns:mv="urn:schemas-microsoft-com:mac:vml" xmlns:p="http://schemas.openxmlformats.org/presentationml/2006/main" xmlns:c="http://schemas.openxmlformats.org/drawingml/2006/chart" xmlns:dgm="http://schemas.openxmlformats.org/drawingml/2006/diagram" xmlns:o="urn:schemas-microsoft-com:office:office" xmlns:v="urn:schemas-microsoft-com:vml" xmlns:pvml="urn:schemas-microsoft-com:office:powerpoint" xmlns:com="http://schemas.openxmlformats.org/drawingml/2006/compatibility" xmlns:p14="http://schemas.microsoft.com/office/powerpoint/2010/main" xmlns:p15="http://schemas.microsoft.com/office/powerpoint/2012/main" xmlns:ahyp="http://schemas.microsoft.com/office/drawing/2018/hyperlinkcolor">
+  <p:cSld>
+    <p:spTree>
+      <p:nvGrpSpPr>
+        <p:cNvPr id="138" name="Shape 138"/>
+        <p:cNvGrpSpPr/>
+        <p:nvPr/>
+      </p:nvGrpSpPr>
+      <p:grpSpPr>
+        <a:xfrm>
+          <a:off x="0" y="0"/>
+          <a:ext cx="0" cy="0"/>
+          <a:chOff x="0" y="0"/>
+          <a:chExt cx="0" cy="0"/>
+        </a:xfrm>
+      </p:grpSpPr>
+      <p:sp>
+        <p:nvSpPr>
+          <p:cNvPr id="139" name="Google Shape;139;p25"/>
+          <p:cNvSpPr txBox="1"/>
+          <p:nvPr>
+            <p:ph type="title"/>
+          </p:nvPr>
+        </p:nvSpPr>
+        <p:spPr>
+          <a:xfrm>
+            <a:off x="311700" y="445025"/>
+            <a:ext cx="8520600" cy="572700"/>
+          </a:xfrm>
+          <a:prstGeom prst="rect">
+            <a:avLst/>
+          </a:prstGeom>
+        </p:spPr>
+        <p:txBody>
+          <a:bodyPr anchorCtr="0" anchor="t" bIns="91425" lIns="91425" spcFirstLastPara="1" rIns="91425" wrap="square" tIns="91425">
+            <a:noAutofit/>
+          </a:bodyPr>
+          <a:lstStyle/>
+          <a:p>
+            <a:pPr indent="0" lvl="0" marL="0" rtl="0" algn="l">
+              <a:spcBef>
+                <a:spcPts val="0"/>
+              </a:spcBef>
+              <a:spcAft>
+                <a:spcPts val="0"/>
+              </a:spcAft>
+              <a:buSzPts val="990"/>
+              <a:buNone/>
+            </a:pPr>
+            <a:r>
+              <a:rPr lang="en-GB" sz="3200">
+                <a:solidFill>
+                  <a:schemeClr val="accent5"/>
+                </a:solidFill>
+              </a:rPr>
+              <a:t>Clone &amp; Status</a:t>
+            </a:r>
+            <a:endParaRPr sz="3200">
+              <a:solidFill>
+                <a:schemeClr val="accent5"/>
+              </a:solidFill>
+            </a:endParaRPr>
+          </a:p>
+        </p:txBody>
+      </p:sp>
+      <p:sp>
+        <p:nvSpPr>
+          <p:cNvPr id="140" name="Google Shape;140;p25"/>
+          <p:cNvSpPr txBox="1"/>
+          <p:nvPr>
+            <p:ph idx="1" type="body"/>
+          </p:nvPr>
+        </p:nvSpPr>
+        <p:spPr>
+          <a:xfrm>
+            <a:off x="311700" y="1152475"/>
+            <a:ext cx="8520600" cy="3416400"/>
+          </a:xfrm>
+          <a:prstGeom prst="rect">
+            <a:avLst/>
+          </a:prstGeom>
+        </p:spPr>
+        <p:txBody>
+          <a:bodyPr anchorCtr="0" anchor="t" bIns="91425" lIns="91425" spcFirstLastPara="1" rIns="91425" wrap="square" tIns="91425">
+            <a:normAutofit/>
+          </a:bodyPr>
+          <a:lstStyle/>
+          <a:p>
+            <a:pPr indent="0" lvl="0" marL="0" rtl="0" algn="l">
+              <a:spcBef>
+                <a:spcPts val="0"/>
+              </a:spcBef>
+              <a:spcAft>
+                <a:spcPts val="0"/>
+              </a:spcAft>
+              <a:buNone/>
+            </a:pPr>
+            <a:r>
+              <a:rPr b="1" lang="en-GB" sz="2100">
+                <a:solidFill>
+                  <a:srgbClr val="A4C2F4"/>
+                </a:solidFill>
+              </a:rPr>
+              <a:t>Clone- </a:t>
+            </a:r>
+            <a:r>
+              <a:rPr lang="en-GB" sz="2100">
+                <a:solidFill>
+                  <a:schemeClr val="dk1"/>
+                </a:solidFill>
+              </a:rPr>
+              <a:t>Cloning a repository on our local machine</a:t>
+            </a:r>
+            <a:endParaRPr sz="2100">
+              <a:solidFill>
+                <a:schemeClr val="dk1"/>
+              </a:solidFill>
+            </a:endParaRPr>
+          </a:p>
+          <a:p>
+            <a:pPr indent="0" lvl="0" marL="0" rtl="0" algn="l">
+              <a:spcBef>
+                <a:spcPts val="1200"/>
+              </a:spcBef>
+              <a:spcAft>
+                <a:spcPts val="0"/>
+              </a:spcAft>
+              <a:buNone/>
+            </a:pPr>
+            <a:r>
+              <a:rPr lang="en-GB" sz="2100">
+                <a:solidFill>
+                  <a:schemeClr val="dk1"/>
+                </a:solidFill>
+              </a:rPr>
+              <a:t>	</a:t>
+            </a:r>
+            <a:r>
+              <a:rPr i="1" lang="en-GB" sz="2100">
+                <a:solidFill>
+                  <a:schemeClr val="dk1"/>
+                </a:solidFill>
+              </a:rPr>
+              <a:t>git clone &lt;- some link -&gt;</a:t>
+            </a:r>
+            <a:endParaRPr i="1" sz="2100">
+              <a:solidFill>
+                <a:schemeClr val="dk1"/>
+              </a:solidFill>
+            </a:endParaRPr>
+          </a:p>
+          <a:p>
+            <a:pPr indent="0" lvl="0" marL="0" rtl="0" algn="l">
+              <a:spcBef>
+                <a:spcPts val="1200"/>
+              </a:spcBef>
+              <a:spcAft>
+                <a:spcPts val="0"/>
+              </a:spcAft>
+              <a:buNone/>
+            </a:pPr>
+            <a:r>
+              <a:rPr b="1" lang="en-GB" sz="2100">
+                <a:solidFill>
+                  <a:srgbClr val="A4C2F4"/>
+                </a:solidFill>
+              </a:rPr>
+              <a:t>status</a:t>
+            </a:r>
+            <a:r>
+              <a:rPr b="1" lang="en-GB" sz="2100">
+                <a:solidFill>
+                  <a:srgbClr val="A4C2F4"/>
+                </a:solidFill>
+              </a:rPr>
+              <a:t>- </a:t>
+            </a:r>
+            <a:r>
+              <a:rPr lang="en-GB" sz="2100">
+                <a:solidFill>
+                  <a:schemeClr val="dk1"/>
+                </a:solidFill>
+              </a:rPr>
+              <a:t>displays the status of the code</a:t>
+            </a:r>
+            <a:endParaRPr sz="2100">
+              <a:solidFill>
+                <a:schemeClr val="dk1"/>
+              </a:solidFill>
+            </a:endParaRPr>
+          </a:p>
+          <a:p>
+            <a:pPr indent="0" lvl="0" marL="0" rtl="0" algn="l">
+              <a:spcBef>
+                <a:spcPts val="1200"/>
+              </a:spcBef>
+              <a:spcAft>
+                <a:spcPts val="1200"/>
+              </a:spcAft>
+              <a:buNone/>
+            </a:pPr>
+            <a:r>
+              <a:rPr lang="en-GB" sz="2100">
+                <a:solidFill>
+                  <a:schemeClr val="dk1"/>
+                </a:solidFill>
+              </a:rPr>
+              <a:t>	</a:t>
+            </a:r>
+            <a:r>
+              <a:rPr i="1" lang="en-GB" sz="2100">
+                <a:solidFill>
+                  <a:schemeClr val="dk1"/>
+                </a:solidFill>
+              </a:rPr>
+              <a:t>git status </a:t>
+            </a:r>
+            <a:endParaRPr i="1" sz="2100">
+              <a:solidFill>
+                <a:schemeClr val="dk1"/>
+              </a:solidFill>
+            </a:endParaRPr>
+          </a:p>
+        </p:txBody>
+      </p:sp>
+    </p:spTree>
+  </p:cSld>
+  <p:clrMapOvr>
+    <a:masterClrMapping/>
+  </p:clrMapOvr>
+</p:sld>
+</file>
+
+<file path=ppt/slides/slide14.xml><?xml version="1.0" encoding="utf-8"?>
+<p:sld xmlns:a="http://schemas.openxmlformats.org/drawingml/2006/main" xmlns:r="http://schemas.openxmlformats.org/officeDocument/2006/relationships" xmlns:mc="http://schemas.openxmlformats.org/markup-compatibility/2006" xmlns:mv="urn:schemas-microsoft-com:mac:vml" xmlns:p="http://schemas.openxmlformats.org/presentationml/2006/main" xmlns:c="http://schemas.openxmlformats.org/drawingml/2006/chart" xmlns:dgm="http://schemas.openxmlformats.org/drawingml/2006/diagram" xmlns:o="urn:schemas-microsoft-com:office:office" xmlns:v="urn:schemas-microsoft-com:vml" xmlns:pvml="urn:schemas-microsoft-com:office:powerpoint" xmlns:com="http://schemas.openxmlformats.org/drawingml/2006/compatibility" xmlns:p14="http://schemas.microsoft.com/office/powerpoint/2010/main" xmlns:p15="http://schemas.microsoft.com/office/powerpoint/2012/main" xmlns:ahyp="http://schemas.microsoft.com/office/drawing/2018/hyperlinkcolor">
+  <p:cSld>
+    <p:spTree>
+      <p:nvGrpSpPr>
+        <p:cNvPr id="144" name="Shape 144"/>
+        <p:cNvGrpSpPr/>
+        <p:nvPr/>
+      </p:nvGrpSpPr>
+      <p:grpSpPr>
+        <a:xfrm>
+          <a:off x="0" y="0"/>
+          <a:ext cx="0" cy="0"/>
+          <a:chOff x="0" y="0"/>
+          <a:chExt cx="0" cy="0"/>
+        </a:xfrm>
+      </p:grpSpPr>
+      <p:sp>
+        <p:nvSpPr>
+          <p:cNvPr id="145" name="Google Shape;145;p26"/>
+          <p:cNvSpPr txBox="1"/>
+          <p:nvPr>
+            <p:ph type="title"/>
+          </p:nvPr>
+        </p:nvSpPr>
+        <p:spPr>
+          <a:xfrm>
+            <a:off x="311700" y="445025"/>
+            <a:ext cx="8520600" cy="572700"/>
+          </a:xfrm>
+          <a:prstGeom prst="rect">
+            <a:avLst/>
+          </a:prstGeom>
+        </p:spPr>
+        <p:txBody>
+          <a:bodyPr anchorCtr="0" anchor="t" bIns="91425" lIns="91425" spcFirstLastPara="1" rIns="91425" wrap="square" tIns="91425">
+            <a:noAutofit/>
+          </a:bodyPr>
+          <a:lstStyle/>
+          <a:p>
+            <a:pPr indent="0" lvl="0" marL="0" rtl="0" algn="l">
+              <a:spcBef>
+                <a:spcPts val="0"/>
+              </a:spcBef>
+              <a:spcAft>
+                <a:spcPts val="0"/>
+              </a:spcAft>
+              <a:buSzPts val="990"/>
+              <a:buNone/>
+            </a:pPr>
+            <a:r>
+              <a:rPr lang="en-GB" sz="3200">
+                <a:solidFill>
+                  <a:schemeClr val="accent5"/>
+                </a:solidFill>
+              </a:rPr>
+              <a:t>Add &amp; Commit</a:t>
+            </a:r>
+            <a:endParaRPr sz="3200">
+              <a:solidFill>
+                <a:schemeClr val="accent5"/>
+              </a:solidFill>
+            </a:endParaRPr>
+          </a:p>
+        </p:txBody>
+      </p:sp>
+      <p:sp>
+        <p:nvSpPr>
+          <p:cNvPr id="146" name="Google Shape;146;p26"/>
+          <p:cNvSpPr txBox="1"/>
+          <p:nvPr>
+            <p:ph idx="1" type="body"/>
+          </p:nvPr>
+        </p:nvSpPr>
+        <p:spPr>
+          <a:xfrm>
+            <a:off x="311700" y="1152475"/>
+            <a:ext cx="8520600" cy="3416400"/>
+          </a:xfrm>
+          <a:prstGeom prst="rect">
+            <a:avLst/>
+          </a:prstGeom>
+        </p:spPr>
+        <p:txBody>
+          <a:bodyPr anchorCtr="0" anchor="t" bIns="91425" lIns="91425" spcFirstLastPara="1" rIns="91425" wrap="square" tIns="91425">
+            <a:normAutofit/>
+          </a:bodyPr>
+          <a:lstStyle/>
+          <a:p>
+            <a:pPr indent="0" lvl="0" marL="0" rtl="0" algn="l">
+              <a:spcBef>
+                <a:spcPts val="0"/>
+              </a:spcBef>
+              <a:spcAft>
+                <a:spcPts val="0"/>
+              </a:spcAft>
+              <a:buNone/>
+            </a:pPr>
+            <a:r>
+              <a:rPr b="1" lang="en-GB" sz="2100">
+                <a:solidFill>
+                  <a:srgbClr val="A4C2F4"/>
+                </a:solidFill>
+              </a:rPr>
+              <a:t>add</a:t>
+            </a:r>
+            <a:r>
+              <a:rPr b="1" lang="en-GB" sz="2100">
+                <a:solidFill>
+                  <a:srgbClr val="A4C2F4"/>
+                </a:solidFill>
+              </a:rPr>
+              <a:t>- </a:t>
+            </a:r>
+            <a:r>
+              <a:rPr lang="en-GB" sz="2100">
+                <a:solidFill>
+                  <a:schemeClr val="dk1"/>
+                </a:solidFill>
+              </a:rPr>
+              <a:t>adds new or changed files in your working directory to the Git staging area.</a:t>
+            </a:r>
+            <a:endParaRPr sz="2100">
+              <a:solidFill>
+                <a:schemeClr val="dk1"/>
+              </a:solidFill>
+            </a:endParaRPr>
+          </a:p>
+          <a:p>
+            <a:pPr indent="0" lvl="0" marL="0" rtl="0" algn="l">
+              <a:spcBef>
+                <a:spcPts val="1200"/>
+              </a:spcBef>
+              <a:spcAft>
+                <a:spcPts val="0"/>
+              </a:spcAft>
+              <a:buNone/>
+            </a:pPr>
+            <a:r>
+              <a:rPr lang="en-GB" sz="2100">
+                <a:solidFill>
+                  <a:schemeClr val="dk1"/>
+                </a:solidFill>
+              </a:rPr>
+              <a:t>	</a:t>
+            </a:r>
+            <a:r>
+              <a:rPr i="1" lang="en-GB" sz="2100">
+                <a:solidFill>
+                  <a:schemeClr val="dk1"/>
+                </a:solidFill>
+              </a:rPr>
+              <a:t>git add &lt;- file name -&gt;</a:t>
+            </a:r>
+            <a:endParaRPr i="1" sz="2100">
+              <a:solidFill>
+                <a:schemeClr val="dk1"/>
+              </a:solidFill>
+            </a:endParaRPr>
+          </a:p>
+          <a:p>
+            <a:pPr indent="0" lvl="0" marL="0" rtl="0" algn="l">
+              <a:spcBef>
+                <a:spcPts val="1200"/>
+              </a:spcBef>
+              <a:spcAft>
+                <a:spcPts val="0"/>
+              </a:spcAft>
+              <a:buNone/>
+            </a:pPr>
+            <a:r>
+              <a:rPr b="1" lang="en-GB" sz="2100">
+                <a:solidFill>
+                  <a:srgbClr val="A4C2F4"/>
+                </a:solidFill>
+              </a:rPr>
+              <a:t>commit</a:t>
+            </a:r>
+            <a:r>
+              <a:rPr b="1" lang="en-GB" sz="2100">
+                <a:solidFill>
+                  <a:srgbClr val="A4C2F4"/>
+                </a:solidFill>
+              </a:rPr>
+              <a:t>- </a:t>
+            </a:r>
+            <a:r>
+              <a:rPr lang="en-GB" sz="2100">
+                <a:solidFill>
+                  <a:schemeClr val="dk1"/>
+                </a:solidFill>
+              </a:rPr>
+              <a:t>it is the record of change</a:t>
+            </a:r>
+            <a:endParaRPr sz="2100">
+              <a:solidFill>
+                <a:schemeClr val="dk1"/>
+              </a:solidFill>
+            </a:endParaRPr>
+          </a:p>
+          <a:p>
+            <a:pPr indent="0" lvl="0" marL="0" rtl="0" algn="l">
+              <a:spcBef>
+                <a:spcPts val="1200"/>
+              </a:spcBef>
+              <a:spcAft>
+                <a:spcPts val="1200"/>
+              </a:spcAft>
+              <a:buNone/>
+            </a:pPr>
+            <a:r>
+              <a:rPr lang="en-GB" sz="2100">
+                <a:solidFill>
+                  <a:schemeClr val="dk1"/>
+                </a:solidFill>
+              </a:rPr>
+              <a:t>	</a:t>
+            </a:r>
+            <a:r>
+              <a:rPr i="1" lang="en-GB" sz="2100">
+                <a:solidFill>
+                  <a:schemeClr val="dk1"/>
+                </a:solidFill>
+              </a:rPr>
+              <a:t>git commit -m “some message”</a:t>
+            </a:r>
+            <a:endParaRPr i="1" sz="2100">
+              <a:solidFill>
+                <a:schemeClr val="dk1"/>
+              </a:solidFill>
+            </a:endParaRPr>
+          </a:p>
+        </p:txBody>
+      </p:sp>
+    </p:spTree>
+  </p:cSld>
+  <p:clrMapOvr>
+    <a:masterClrMapping/>
+  </p:clrMapOvr>
+</p:sld>
+</file>
+
+<file path=ppt/slides/slide15.xml><?xml version="1.0" encoding="utf-8"?>
+<p:sld xmlns:a="http://schemas.openxmlformats.org/drawingml/2006/main" xmlns:r="http://schemas.openxmlformats.org/officeDocument/2006/relationships" xmlns:mc="http://schemas.openxmlformats.org/markup-compatibility/2006" xmlns:mv="urn:schemas-microsoft-com:mac:vml" xmlns:p="http://schemas.openxmlformats.org/presentationml/2006/main" xmlns:c="http://schemas.openxmlformats.org/drawingml/2006/chart" xmlns:dgm="http://schemas.openxmlformats.org/drawingml/2006/diagram" xmlns:o="urn:schemas-microsoft-com:office:office" xmlns:v="urn:schemas-microsoft-com:vml" xmlns:pvml="urn:schemas-microsoft-com:office:powerpoint" xmlns:com="http://schemas.openxmlformats.org/drawingml/2006/compatibility" xmlns:p14="http://schemas.microsoft.com/office/powerpoint/2010/main" xmlns:p15="http://schemas.microsoft.com/office/powerpoint/2012/main" xmlns:ahyp="http://schemas.microsoft.com/office/drawing/2018/hyperlinkcolor">
+  <p:cSld>
+    <p:spTree>
+      <p:nvGrpSpPr>
+        <p:cNvPr id="150" name="Shape 150"/>
+        <p:cNvGrpSpPr/>
+        <p:nvPr/>
+      </p:nvGrpSpPr>
+      <p:grpSpPr>
+        <a:xfrm>
+          <a:off x="0" y="0"/>
+          <a:ext cx="0" cy="0"/>
+          <a:chOff x="0" y="0"/>
+          <a:chExt cx="0" cy="0"/>
+        </a:xfrm>
+      </p:grpSpPr>
+      <p:sp>
+        <p:nvSpPr>
+          <p:cNvPr id="151" name="Google Shape;151;p27"/>
+          <p:cNvSpPr txBox="1"/>
+          <p:nvPr>
+            <p:ph type="title"/>
+          </p:nvPr>
+        </p:nvSpPr>
+        <p:spPr>
+          <a:xfrm>
+            <a:off x="311700" y="445025"/>
+            <a:ext cx="8520600" cy="572700"/>
+          </a:xfrm>
+          <a:prstGeom prst="rect">
+            <a:avLst/>
+          </a:prstGeom>
+        </p:spPr>
+        <p:txBody>
+          <a:bodyPr anchorCtr="0" anchor="t" bIns="91425" lIns="91425" spcFirstLastPara="1" rIns="91425" wrap="square" tIns="91425">
+            <a:noAutofit/>
+          </a:bodyPr>
+          <a:lstStyle/>
+          <a:p>
+            <a:pPr indent="0" lvl="0" marL="0" rtl="0" algn="l">
+              <a:spcBef>
+                <a:spcPts val="0"/>
+              </a:spcBef>
+              <a:spcAft>
+                <a:spcPts val="0"/>
+              </a:spcAft>
+              <a:buSzPts val="990"/>
+              <a:buNone/>
+            </a:pPr>
+            <a:r>
+              <a:rPr lang="en-GB" sz="3200">
+                <a:solidFill>
+                  <a:schemeClr val="accent5"/>
+                </a:solidFill>
+              </a:rPr>
+              <a:t>Push Command</a:t>
+            </a:r>
+            <a:endParaRPr sz="3200">
+              <a:solidFill>
+                <a:schemeClr val="accent5"/>
+              </a:solidFill>
+            </a:endParaRPr>
+          </a:p>
+        </p:txBody>
+      </p:sp>
+      <p:sp>
+        <p:nvSpPr>
+          <p:cNvPr id="152" name="Google Shape;152;p27"/>
+          <p:cNvSpPr txBox="1"/>
+          <p:nvPr>
+            <p:ph idx="1" type="body"/>
+          </p:nvPr>
+        </p:nvSpPr>
+        <p:spPr>
+          <a:xfrm>
+            <a:off x="311700" y="1152475"/>
+            <a:ext cx="8520600" cy="3416400"/>
+          </a:xfrm>
+          <a:prstGeom prst="rect">
+            <a:avLst/>
+          </a:prstGeom>
+        </p:spPr>
+        <p:txBody>
+          <a:bodyPr anchorCtr="0" anchor="t" bIns="91425" lIns="91425" spcFirstLastPara="1" rIns="91425" wrap="square" tIns="91425">
+            <a:normAutofit/>
+          </a:bodyPr>
+          <a:lstStyle/>
+          <a:p>
+            <a:pPr indent="0" lvl="0" marL="0" rtl="0" algn="l">
+              <a:spcBef>
+                <a:spcPts val="0"/>
+              </a:spcBef>
+              <a:spcAft>
+                <a:spcPts val="0"/>
+              </a:spcAft>
+              <a:buNone/>
+            </a:pPr>
+            <a:r>
+              <a:rPr b="1" lang="en-GB" sz="2100">
+                <a:solidFill>
+                  <a:srgbClr val="A4C2F4"/>
+                </a:solidFill>
+              </a:rPr>
+              <a:t>Push</a:t>
+            </a:r>
+            <a:r>
+              <a:rPr b="1" lang="en-GB" sz="2100">
+                <a:solidFill>
+                  <a:srgbClr val="A4C2F4"/>
+                </a:solidFill>
+              </a:rPr>
+              <a:t>- upload local repo content to </a:t>
+            </a:r>
+            <a:r>
+              <a:rPr b="1" lang="en-GB" sz="2100">
+                <a:solidFill>
+                  <a:srgbClr val="A4C2F4"/>
+                </a:solidFill>
+              </a:rPr>
+              <a:t>remote</a:t>
+            </a:r>
+            <a:r>
+              <a:rPr b="1" lang="en-GB" sz="2100">
+                <a:solidFill>
+                  <a:srgbClr val="A4C2F4"/>
+                </a:solidFill>
+              </a:rPr>
+              <a:t> repo</a:t>
+            </a:r>
+            <a:endParaRPr sz="2100">
+              <a:solidFill>
+                <a:schemeClr val="dk1"/>
+              </a:solidFill>
+            </a:endParaRPr>
+          </a:p>
+          <a:p>
+            <a:pPr indent="0" lvl="0" marL="0" rtl="0" algn="l">
+              <a:spcBef>
+                <a:spcPts val="1200"/>
+              </a:spcBef>
+              <a:spcAft>
+                <a:spcPts val="1200"/>
+              </a:spcAft>
+              <a:buNone/>
+            </a:pPr>
+            <a:r>
+              <a:rPr lang="en-GB" sz="2100">
+                <a:solidFill>
+                  <a:schemeClr val="dk1"/>
+                </a:solidFill>
+              </a:rPr>
+              <a:t>	</a:t>
+            </a:r>
+            <a:r>
+              <a:rPr i="1" lang="en-GB" sz="2100">
+                <a:solidFill>
+                  <a:schemeClr val="dk1"/>
+                </a:solidFill>
+              </a:rPr>
+              <a:t>git push origin main</a:t>
+            </a:r>
+            <a:endParaRPr i="1" sz="2100">
+              <a:solidFill>
+                <a:schemeClr val="dk1"/>
+              </a:solidFill>
+            </a:endParaRPr>
+          </a:p>
+        </p:txBody>
+      </p:sp>
+    </p:spTree>
+  </p:cSld>
+  <p:clrMapOvr>
+    <a:masterClrMapping/>
+  </p:clrMapOvr>
+</p:sld>
+</file>
+
+<file path=ppt/slides/slide16.xml><?xml version="1.0" encoding="utf-8"?>
+<p:sld xmlns:a="http://schemas.openxmlformats.org/drawingml/2006/main" xmlns:r="http://schemas.openxmlformats.org/officeDocument/2006/relationships" xmlns:mc="http://schemas.openxmlformats.org/markup-compatibility/2006" xmlns:mv="urn:schemas-microsoft-com:mac:vml" xmlns:p="http://schemas.openxmlformats.org/presentationml/2006/main" xmlns:c="http://schemas.openxmlformats.org/drawingml/2006/chart" xmlns:dgm="http://schemas.openxmlformats.org/drawingml/2006/diagram" xmlns:o="urn:schemas-microsoft-com:office:office" xmlns:v="urn:schemas-microsoft-com:vml" xmlns:pvml="urn:schemas-microsoft-com:office:powerpoint" xmlns:com="http://schemas.openxmlformats.org/drawingml/2006/compatibility" xmlns:p14="http://schemas.microsoft.com/office/powerpoint/2010/main" xmlns:p15="http://schemas.microsoft.com/office/powerpoint/2012/main" xmlns:ahyp="http://schemas.microsoft.com/office/drawing/2018/hyperlinkcolor">
+  <p:cSld>
+    <p:spTree>
+      <p:nvGrpSpPr>
+        <p:cNvPr id="156" name="Shape 156"/>
+        <p:cNvGrpSpPr/>
+        <p:nvPr/>
+      </p:nvGrpSpPr>
+      <p:grpSpPr>
+        <a:xfrm>
+          <a:off x="0" y="0"/>
+          <a:ext cx="0" cy="0"/>
+          <a:chOff x="0" y="0"/>
+          <a:chExt cx="0" cy="0"/>
+        </a:xfrm>
+      </p:grpSpPr>
+      <p:sp>
+        <p:nvSpPr>
+          <p:cNvPr id="157" name="Google Shape;157;p28"/>
+          <p:cNvSpPr txBox="1"/>
+          <p:nvPr>
+            <p:ph type="title"/>
+          </p:nvPr>
+        </p:nvSpPr>
+        <p:spPr>
+          <a:xfrm>
+            <a:off x="311700" y="445025"/>
+            <a:ext cx="8520600" cy="572700"/>
+          </a:xfrm>
+          <a:prstGeom prst="rect">
+            <a:avLst/>
+          </a:prstGeom>
+        </p:spPr>
+        <p:txBody>
+          <a:bodyPr anchorCtr="0" anchor="t" bIns="91425" lIns="91425" spcFirstLastPara="1" rIns="91425" wrap="square" tIns="91425">
+            <a:noAutofit/>
+          </a:bodyPr>
+          <a:lstStyle/>
+          <a:p>
+            <a:pPr indent="0" lvl="0" marL="0" rtl="0" algn="l">
+              <a:spcBef>
+                <a:spcPts val="0"/>
+              </a:spcBef>
+              <a:spcAft>
+                <a:spcPts val="0"/>
+              </a:spcAft>
+              <a:buSzPts val="990"/>
+              <a:buNone/>
+            </a:pPr>
+            <a:r>
+              <a:rPr lang="en-GB" sz="3200">
+                <a:solidFill>
+                  <a:schemeClr val="accent5"/>
+                </a:solidFill>
+              </a:rPr>
+              <a:t>Init</a:t>
+            </a:r>
+            <a:r>
+              <a:rPr lang="en-GB" sz="3200">
+                <a:solidFill>
+                  <a:schemeClr val="accent5"/>
+                </a:solidFill>
+              </a:rPr>
+              <a:t> Command</a:t>
+            </a:r>
+            <a:endParaRPr sz="3200">
+              <a:solidFill>
+                <a:schemeClr val="accent5"/>
+              </a:solidFill>
+            </a:endParaRPr>
+          </a:p>
+        </p:txBody>
+      </p:sp>
+      <p:sp>
+        <p:nvSpPr>
+          <p:cNvPr id="158" name="Google Shape;158;p28"/>
+          <p:cNvSpPr txBox="1"/>
+          <p:nvPr>
+            <p:ph idx="1" type="body"/>
+          </p:nvPr>
+        </p:nvSpPr>
+        <p:spPr>
+          <a:xfrm>
+            <a:off x="311700" y="1152475"/>
+            <a:ext cx="8520600" cy="3416400"/>
+          </a:xfrm>
+          <a:prstGeom prst="rect">
+            <a:avLst/>
+          </a:prstGeom>
+        </p:spPr>
+        <p:txBody>
+          <a:bodyPr anchorCtr="0" anchor="t" bIns="91425" lIns="91425" spcFirstLastPara="1" rIns="91425" wrap="square" tIns="91425">
+            <a:normAutofit/>
+          </a:bodyPr>
+          <a:lstStyle/>
+          <a:p>
+            <a:pPr indent="0" lvl="0" marL="0" rtl="0" algn="l">
+              <a:spcBef>
+                <a:spcPts val="0"/>
+              </a:spcBef>
+              <a:spcAft>
+                <a:spcPts val="0"/>
+              </a:spcAft>
+              <a:buNone/>
+            </a:pPr>
+            <a:r>
+              <a:rPr i="1" lang="en-GB" sz="2100">
+                <a:solidFill>
+                  <a:schemeClr val="dk1"/>
+                </a:solidFill>
+              </a:rPr>
+              <a:t>git init</a:t>
+            </a:r>
+            <a:endParaRPr i="1" sz="2100">
+              <a:solidFill>
+                <a:schemeClr val="dk1"/>
+              </a:solidFill>
+            </a:endParaRPr>
+          </a:p>
+          <a:p>
+            <a:pPr indent="0" lvl="0" marL="0" rtl="0" algn="l">
+              <a:spcBef>
+                <a:spcPts val="1200"/>
+              </a:spcBef>
+              <a:spcAft>
+                <a:spcPts val="0"/>
+              </a:spcAft>
+              <a:buNone/>
+            </a:pPr>
+            <a:r>
+              <a:rPr i="1" lang="en-GB" sz="2100">
+                <a:solidFill>
+                  <a:schemeClr val="dk1"/>
+                </a:solidFill>
+              </a:rPr>
+              <a:t>g</a:t>
+            </a:r>
+            <a:r>
+              <a:rPr i="1" lang="en-GB" sz="2100">
+                <a:solidFill>
+                  <a:schemeClr val="dk1"/>
+                </a:solidFill>
+              </a:rPr>
+              <a:t>it remote add origin &lt;-link-&gt;</a:t>
+            </a:r>
+            <a:endParaRPr i="1" sz="2100">
+              <a:solidFill>
+                <a:schemeClr val="dk1"/>
+              </a:solidFill>
+            </a:endParaRPr>
+          </a:p>
+          <a:p>
+            <a:pPr indent="0" lvl="0" marL="0" rtl="0" algn="l">
+              <a:spcBef>
+                <a:spcPts val="1200"/>
+              </a:spcBef>
+              <a:spcAft>
+                <a:spcPts val="0"/>
+              </a:spcAft>
+              <a:buNone/>
+            </a:pPr>
+            <a:r>
+              <a:rPr i="1" lang="en-GB" sz="2100">
+                <a:solidFill>
+                  <a:schemeClr val="dk1"/>
+                </a:solidFill>
+              </a:rPr>
+              <a:t>g</a:t>
+            </a:r>
+            <a:r>
+              <a:rPr i="1" lang="en-GB" sz="2100">
+                <a:solidFill>
+                  <a:schemeClr val="dk1"/>
+                </a:solidFill>
+              </a:rPr>
+              <a:t>it remote -v</a:t>
+            </a:r>
+            <a:endParaRPr i="1" sz="2100">
+              <a:solidFill>
+                <a:schemeClr val="dk1"/>
+              </a:solidFill>
+            </a:endParaRPr>
+          </a:p>
+          <a:p>
+            <a:pPr indent="0" lvl="0" marL="0" rtl="0" algn="l">
+              <a:spcBef>
+                <a:spcPts val="1200"/>
+              </a:spcBef>
+              <a:spcAft>
+                <a:spcPts val="0"/>
+              </a:spcAft>
+              <a:buNone/>
+            </a:pPr>
+            <a:r>
+              <a:rPr i="1" lang="en-GB" sz="2100">
+                <a:solidFill>
+                  <a:schemeClr val="dk1"/>
+                </a:solidFill>
+              </a:rPr>
+              <a:t>g</a:t>
+            </a:r>
+            <a:r>
+              <a:rPr i="1" lang="en-GB" sz="2100">
+                <a:solidFill>
+                  <a:schemeClr val="dk1"/>
+                </a:solidFill>
+              </a:rPr>
+              <a:t>it branch</a:t>
+            </a:r>
+            <a:endParaRPr i="1" sz="2100">
+              <a:solidFill>
+                <a:schemeClr val="dk1"/>
+              </a:solidFill>
+            </a:endParaRPr>
+          </a:p>
+          <a:p>
+            <a:pPr indent="0" lvl="0" marL="0" rtl="0" algn="l">
+              <a:spcBef>
+                <a:spcPts val="1200"/>
+              </a:spcBef>
+              <a:spcAft>
+                <a:spcPts val="0"/>
+              </a:spcAft>
+              <a:buNone/>
+            </a:pPr>
+            <a:r>
+              <a:rPr i="1" lang="en-GB" sz="2100">
+                <a:solidFill>
+                  <a:schemeClr val="dk1"/>
+                </a:solidFill>
+              </a:rPr>
+              <a:t>g</a:t>
+            </a:r>
+            <a:r>
+              <a:rPr i="1" lang="en-GB" sz="2100">
+                <a:solidFill>
+                  <a:schemeClr val="dk1"/>
+                </a:solidFill>
+              </a:rPr>
+              <a:t>it branch -M main</a:t>
+            </a:r>
+            <a:endParaRPr i="1" sz="2100">
+              <a:solidFill>
+                <a:schemeClr val="dk1"/>
+              </a:solidFill>
+            </a:endParaRPr>
+          </a:p>
+          <a:p>
+            <a:pPr indent="0" lvl="0" marL="0" rtl="0" algn="l">
+              <a:spcBef>
+                <a:spcPts val="1200"/>
+              </a:spcBef>
+              <a:spcAft>
+                <a:spcPts val="1200"/>
+              </a:spcAft>
+              <a:buNone/>
+            </a:pPr>
+            <a:r>
+              <a:rPr i="1" lang="en-GB" sz="2100">
+                <a:solidFill>
+                  <a:schemeClr val="dk1"/>
+                </a:solidFill>
+              </a:rPr>
+              <a:t>g</a:t>
+            </a:r>
+            <a:r>
+              <a:rPr i="1" lang="en-GB" sz="2100">
+                <a:solidFill>
+                  <a:schemeClr val="dk1"/>
+                </a:solidFill>
+              </a:rPr>
+              <a:t>it push origin main</a:t>
+            </a:r>
+            <a:endParaRPr i="1" sz="2100">
+              <a:solidFill>
+                <a:schemeClr val="dk1"/>
+              </a:solidFill>
+            </a:endParaRPr>
+          </a:p>
+        </p:txBody>
+      </p:sp>
+    </p:spTree>
+  </p:cSld>
+  <p:clrMapOvr>
+    <a:masterClrMapping/>
+  </p:clrMapOvr>
+</p:sld>
+</file>
+
+<file path=ppt/slides/slide17.xml><?xml version="1.0" encoding="utf-8"?>
+<p:sld xmlns:a="http://schemas.openxmlformats.org/drawingml/2006/main" xmlns:r="http://schemas.openxmlformats.org/officeDocument/2006/relationships" xmlns:mc="http://schemas.openxmlformats.org/markup-compatibility/2006" xmlns:mv="urn:schemas-microsoft-com:mac:vml" xmlns:p="http://schemas.openxmlformats.org/presentationml/2006/main" xmlns:c="http://schemas.openxmlformats.org/drawingml/2006/chart" xmlns:dgm="http://schemas.openxmlformats.org/drawingml/2006/diagram" xmlns:o="urn:schemas-microsoft-com:office:office" xmlns:v="urn:schemas-microsoft-com:vml" xmlns:pvml="urn:schemas-microsoft-com:office:powerpoint" xmlns:com="http://schemas.openxmlformats.org/drawingml/2006/compatibility" xmlns:p14="http://schemas.microsoft.com/office/powerpoint/2010/main" xmlns:p15="http://schemas.microsoft.com/office/powerpoint/2012/main" xmlns:ahyp="http://schemas.microsoft.com/office/drawing/2018/hyperlinkcolor">
+  <p:cSld>
+    <p:spTree>
+      <p:nvGrpSpPr>
+        <p:cNvPr id="162" name="Shape 162"/>
+        <p:cNvGrpSpPr/>
+        <p:nvPr/>
+      </p:nvGrpSpPr>
+      <p:grpSpPr>
+        <a:xfrm>
+          <a:off x="0" y="0"/>
+          <a:ext cx="0" cy="0"/>
+          <a:chOff x="0" y="0"/>
+          <a:chExt cx="0" cy="0"/>
+        </a:xfrm>
+      </p:grpSpPr>
+      <p:sp>
+        <p:nvSpPr>
+          <p:cNvPr id="163" name="Google Shape;163;p29"/>
+          <p:cNvSpPr txBox="1"/>
+          <p:nvPr>
+            <p:ph type="title"/>
+          </p:nvPr>
+        </p:nvSpPr>
+        <p:spPr>
+          <a:xfrm>
+            <a:off x="311700" y="445025"/>
+            <a:ext cx="8520600" cy="572700"/>
+          </a:xfrm>
+          <a:prstGeom prst="rect">
+            <a:avLst/>
+          </a:prstGeom>
+        </p:spPr>
+        <p:txBody>
+          <a:bodyPr anchorCtr="0" anchor="t" bIns="91425" lIns="91425" spcFirstLastPara="1" rIns="91425" wrap="square" tIns="91425">
+            <a:noAutofit/>
+          </a:bodyPr>
+          <a:lstStyle/>
+          <a:p>
+            <a:pPr indent="0" lvl="0" marL="0" rtl="0" algn="ctr">
+              <a:spcBef>
+                <a:spcPts val="0"/>
+              </a:spcBef>
+              <a:spcAft>
+                <a:spcPts val="0"/>
+              </a:spcAft>
+              <a:buSzPts val="990"/>
+              <a:buNone/>
+            </a:pPr>
+            <a:r>
+              <a:rPr lang="en-GB" sz="3200">
+                <a:solidFill>
+                  <a:schemeClr val="accent5"/>
+                </a:solidFill>
+              </a:rPr>
+              <a:t>Git Branches</a:t>
+            </a:r>
+            <a:endParaRPr sz="3200">
+              <a:solidFill>
+                <a:schemeClr val="accent5"/>
+              </a:solidFill>
+            </a:endParaRPr>
+          </a:p>
+        </p:txBody>
+      </p:sp>
       <p:pic>
         <p:nvPicPr>
-          <p:cNvPr id="122" name="Google Shape;122;p23"/>
+          <p:cNvPr id="164" name="Google Shape;164;p29"/>
           <p:cNvPicPr preferRelativeResize="0"/>
           <p:nvPr/>
         </p:nvPicPr>
@@ -7822,12 +9569,12 @@
 </p:sld>
 </file>
 
-<file path=ppt/slides/slide12.xml><?xml version="1.0" encoding="utf-8"?>
+<file path=ppt/slides/slide18.xml><?xml version="1.0" encoding="utf-8"?>
 <p:sld xmlns:a="http://schemas.openxmlformats.org/drawingml/2006/main" xmlns:r="http://schemas.openxmlformats.org/officeDocument/2006/relationships" xmlns:mc="http://schemas.openxmlformats.org/markup-compatibility/2006" xmlns:mv="urn:schemas-microsoft-com:mac:vml" xmlns:p="http://schemas.openxmlformats.org/presentationml/2006/main" xmlns:c="http://schemas.openxmlformats.org/drawingml/2006/chart" xmlns:dgm="http://schemas.openxmlformats.org/drawingml/2006/diagram" xmlns:o="urn:schemas-microsoft-com:office:office" xmlns:v="urn:schemas-microsoft-com:vml" xmlns:pvml="urn:schemas-microsoft-com:office:powerpoint" xmlns:com="http://schemas.openxmlformats.org/drawingml/2006/compatibility" xmlns:p14="http://schemas.microsoft.com/office/powerpoint/2010/main" xmlns:p15="http://schemas.microsoft.com/office/powerpoint/2012/main" xmlns:ahyp="http://schemas.microsoft.com/office/drawing/2018/hyperlinkcolor">
   <p:cSld>
     <p:spTree>
       <p:nvGrpSpPr>
-        <p:cNvPr id="126" name="Shape 126"/>
+        <p:cNvPr id="168" name="Shape 168"/>
         <p:cNvGrpSpPr/>
         <p:nvPr/>
       </p:nvGrpSpPr>
@@ -7841,7 +9588,7 @@
       </p:grpSpPr>
       <p:sp>
         <p:nvSpPr>
-          <p:cNvPr id="127" name="Google Shape;127;p24"/>
+          <p:cNvPr id="169" name="Google Shape;169;p30"/>
           <p:cNvSpPr txBox="1"/>
           <p:nvPr>
             <p:ph type="title"/>
@@ -7898,7 +9645,7 @@
       </p:sp>
       <p:sp>
         <p:nvSpPr>
-          <p:cNvPr id="128" name="Google Shape;128;p24"/>
+          <p:cNvPr id="170" name="Google Shape;170;p30"/>
           <p:cNvSpPr txBox="1"/>
           <p:nvPr>
             <p:ph idx="1" type="body"/>
@@ -8104,12 +9851,12 @@
 </p:sld>
 </file>
 
-<file path=ppt/slides/slide13.xml><?xml version="1.0" encoding="utf-8"?>
+<file path=ppt/slides/slide19.xml><?xml version="1.0" encoding="utf-8"?>
 <p:sld xmlns:a="http://schemas.openxmlformats.org/drawingml/2006/main" xmlns:r="http://schemas.openxmlformats.org/officeDocument/2006/relationships" xmlns:mc="http://schemas.openxmlformats.org/markup-compatibility/2006" xmlns:mv="urn:schemas-microsoft-com:mac:vml" xmlns:p="http://schemas.openxmlformats.org/presentationml/2006/main" xmlns:c="http://schemas.openxmlformats.org/drawingml/2006/chart" xmlns:dgm="http://schemas.openxmlformats.org/drawingml/2006/diagram" xmlns:o="urn:schemas-microsoft-com:office:office" xmlns:v="urn:schemas-microsoft-com:vml" xmlns:pvml="urn:schemas-microsoft-com:office:powerpoint" xmlns:com="http://schemas.openxmlformats.org/drawingml/2006/compatibility" xmlns:p14="http://schemas.microsoft.com/office/powerpoint/2010/main" xmlns:p15="http://schemas.microsoft.com/office/powerpoint/2012/main" xmlns:ahyp="http://schemas.microsoft.com/office/drawing/2018/hyperlinkcolor">
   <p:cSld>
     <p:spTree>
       <p:nvGrpSpPr>
-        <p:cNvPr id="132" name="Shape 132"/>
+        <p:cNvPr id="174" name="Shape 174"/>
         <p:cNvGrpSpPr/>
         <p:nvPr/>
       </p:nvGrpSpPr>
@@ -8123,7 +9870,7 @@
       </p:grpSpPr>
       <p:sp>
         <p:nvSpPr>
-          <p:cNvPr id="133" name="Google Shape;133;p25"/>
+          <p:cNvPr id="175" name="Google Shape;175;p31"/>
           <p:cNvSpPr txBox="1"/>
           <p:nvPr>
             <p:ph type="title"/>
@@ -8172,7 +9919,7 @@
       </p:sp>
       <p:sp>
         <p:nvSpPr>
-          <p:cNvPr id="134" name="Google Shape;134;p25"/>
+          <p:cNvPr id="176" name="Google Shape;176;p31"/>
           <p:cNvSpPr txBox="1"/>
           <p:nvPr>
             <p:ph idx="1" type="body"/>
@@ -8400,7 +10147,7 @@
         </p:nvSpPr>
         <p:spPr>
           <a:xfrm>
-            <a:off x="311700" y="445025"/>
+            <a:off x="311700" y="324600"/>
             <a:ext cx="8520600" cy="572700"/>
           </a:xfrm>
           <a:prstGeom prst="rect">
@@ -8424,14 +10171,14 @@
               <a:buNone/>
             </a:pPr>
             <a:r>
-              <a:rPr lang="en-GB" sz="3200">
+              <a:rPr lang="en-GB" sz="3900">
                 <a:solidFill>
                   <a:schemeClr val="accent5"/>
                 </a:solidFill>
               </a:rPr>
               <a:t>Git</a:t>
             </a:r>
-            <a:endParaRPr sz="3200">
+            <a:endParaRPr sz="3900">
               <a:solidFill>
                 <a:schemeClr val="accent5"/>
               </a:solidFill>
@@ -8458,7 +10205,7 @@
         </p:spPr>
         <p:txBody>
           <a:bodyPr anchorCtr="0" anchor="t" bIns="91425" lIns="91425" spcFirstLastPara="1" rIns="91425" wrap="square" tIns="91425">
-            <a:normAutofit/>
+            <a:normAutofit lnSpcReduction="20000"/>
           </a:bodyPr>
           <a:lstStyle/>
           <a:p>
@@ -8506,13 +10253,25 @@
               <a:buNone/>
             </a:pPr>
             <a:br>
-              <a:rPr lang="en-GB" sz="2100"/>
+              <a:rPr lang="en-GB" sz="2200"/>
             </a:br>
             <a:r>
-              <a:rPr lang="en-GB" sz="2100"/>
-              <a:t>Version Control System is a tool that helps to track changes in code</a:t>
-            </a:r>
-            <a:endParaRPr sz="2100"/>
+              <a:rPr lang="en-GB" sz="1600">
+                <a:solidFill>
+                  <a:srgbClr val="CACACA"/>
+                </a:solidFill>
+                <a:latin typeface="Arial"/>
+                <a:ea typeface="Arial"/>
+                <a:cs typeface="Arial"/>
+                <a:sym typeface="Arial"/>
+              </a:rPr>
+              <a:t>It is like a time machine + teamwork tool for code.</a:t>
+            </a:r>
+            <a:endParaRPr sz="2600">
+              <a:solidFill>
+                <a:srgbClr val="CACACA"/>
+              </a:solidFill>
+            </a:endParaRPr>
           </a:p>
           <a:p>
             <a:pPr indent="0" lvl="0" marL="0" rtl="0" algn="l">
@@ -8563,7 +10322,7 @@
             <a:endParaRPr i="1" sz="2100"/>
           </a:p>
           <a:p>
-            <a:pPr indent="-361950" lvl="0" marL="457200" rtl="0" algn="l">
+            <a:pPr indent="-336550" lvl="0" marL="457200" rtl="0" algn="l">
               <a:lnSpc>
                 <a:spcPct val="100000"/>
               </a:lnSpc>
@@ -8573,17 +10332,37 @@
               <a:spcAft>
                 <a:spcPts val="0"/>
               </a:spcAft>
-              <a:buSzPts val="2100"/>
+              <a:buSzPts val="1700"/>
+              <a:buFont typeface="Times New Roman"/>
               <a:buChar char="●"/>
             </a:pPr>
             <a:r>
-              <a:rPr i="1" lang="en-GB" sz="2100"/>
-              <a:t>Free &amp; open source</a:t>
-            </a:r>
-            <a:endParaRPr i="1" sz="2100"/>
-          </a:p>
-          <a:p>
-            <a:pPr indent="-361950" lvl="0" marL="457200" rtl="0" algn="l">
+              <a:rPr lang="en-GB" sz="1600">
+                <a:latin typeface="Times New Roman"/>
+                <a:ea typeface="Times New Roman"/>
+                <a:cs typeface="Times New Roman"/>
+                <a:sym typeface="Times New Roman"/>
+              </a:rPr>
+              <a:t> </a:t>
+            </a:r>
+            <a:r>
+              <a:rPr lang="en-GB">
+                <a:latin typeface="Times New Roman"/>
+                <a:ea typeface="Times New Roman"/>
+                <a:cs typeface="Times New Roman"/>
+                <a:sym typeface="Times New Roman"/>
+              </a:rPr>
+              <a:t>You Never Lose Your Work</a:t>
+            </a:r>
+            <a:endParaRPr>
+              <a:latin typeface="Times New Roman"/>
+              <a:ea typeface="Times New Roman"/>
+              <a:cs typeface="Times New Roman"/>
+              <a:sym typeface="Times New Roman"/>
+            </a:endParaRPr>
+          </a:p>
+          <a:p>
+            <a:pPr indent="-342900" lvl="0" marL="457200" rtl="0" algn="l">
               <a:lnSpc>
                 <a:spcPct val="100000"/>
               </a:lnSpc>
@@ -8593,18 +10372,87 @@
               <a:spcAft>
                 <a:spcPts val="0"/>
               </a:spcAft>
-              <a:buSzPts val="2100"/>
+              <a:buSzPts val="1800"/>
+              <a:buFont typeface="Times New Roman"/>
               <a:buChar char="●"/>
             </a:pPr>
             <a:r>
-              <a:rPr i="1" lang="en-GB" sz="2100"/>
-              <a:t>Fast and scalable</a:t>
-            </a:r>
-            <a:r>
-              <a:rPr lang="en-GB" sz="2100"/>
-              <a:t> </a:t>
-            </a:r>
-            <a:endParaRPr sz="2100"/>
+              <a:rPr lang="en-GB">
+                <a:latin typeface="Times New Roman"/>
+                <a:ea typeface="Times New Roman"/>
+                <a:cs typeface="Times New Roman"/>
+                <a:sym typeface="Times New Roman"/>
+              </a:rPr>
+              <a:t> Easy Teamwork</a:t>
+            </a:r>
+            <a:endParaRPr>
+              <a:latin typeface="Times New Roman"/>
+              <a:ea typeface="Times New Roman"/>
+              <a:cs typeface="Times New Roman"/>
+              <a:sym typeface="Times New Roman"/>
+            </a:endParaRPr>
+          </a:p>
+          <a:p>
+            <a:pPr indent="-342900" lvl="0" marL="457200" rtl="0" algn="l">
+              <a:lnSpc>
+                <a:spcPct val="100000"/>
+              </a:lnSpc>
+              <a:spcBef>
+                <a:spcPts val="0"/>
+              </a:spcBef>
+              <a:spcAft>
+                <a:spcPts val="0"/>
+              </a:spcAft>
+              <a:buSzPts val="1800"/>
+              <a:buFont typeface="Times New Roman"/>
+              <a:buChar char="●"/>
+            </a:pPr>
+            <a:r>
+              <a:rPr lang="en-GB">
+                <a:latin typeface="Times New Roman"/>
+                <a:ea typeface="Times New Roman"/>
+                <a:cs typeface="Times New Roman"/>
+                <a:sym typeface="Times New Roman"/>
+              </a:rPr>
+              <a:t>Safe Experimenting (Branches)</a:t>
+            </a:r>
+            <a:endParaRPr>
+              <a:latin typeface="Times New Roman"/>
+              <a:ea typeface="Times New Roman"/>
+              <a:cs typeface="Times New Roman"/>
+              <a:sym typeface="Times New Roman"/>
+            </a:endParaRPr>
+          </a:p>
+          <a:p>
+            <a:pPr indent="-342900" lvl="0" marL="457200" rtl="0" algn="l">
+              <a:lnSpc>
+                <a:spcPct val="100000"/>
+              </a:lnSpc>
+              <a:spcBef>
+                <a:spcPts val="0"/>
+              </a:spcBef>
+              <a:spcAft>
+                <a:spcPts val="0"/>
+              </a:spcAft>
+              <a:buSzPts val="1800"/>
+              <a:buFont typeface="Times New Roman"/>
+              <a:buChar char="●"/>
+            </a:pPr>
+            <a:r>
+              <a:rPr lang="en-GB">
+                <a:latin typeface="Times New Roman"/>
+                <a:ea typeface="Times New Roman"/>
+                <a:cs typeface="Times New Roman"/>
+                <a:sym typeface="Times New Roman"/>
+              </a:rPr>
+              <a:t> Fast and Efficient</a:t>
+            </a:r>
+            <a:endParaRPr>
+              <a:latin typeface="Times New Roman"/>
+              <a:ea typeface="Times New Roman"/>
+              <a:cs typeface="Times New Roman"/>
+              <a:sym typeface="Times New Roman"/>
+            </a:endParaRPr>
           </a:p>
           <a:p>
             <a:pPr indent="0" lvl="0" marL="457200" rtl="0" algn="l">
@@ -8644,6 +10492,33 @@
           </a:p>
         </p:txBody>
       </p:sp>
+      <p:pic>
+        <p:nvPicPr>
+          <p:cNvPr id="69" name="Google Shape;69;p14" title="Screenshot_2025-12-04_194506-removebg-preview-removebg-preview.png"/>
+          <p:cNvPicPr preferRelativeResize="0"/>
+          <p:nvPr/>
+        </p:nvPicPr>
+        <p:blipFill rotWithShape="1">
+          <a:blip r:embed="rId3">
+            <a:alphaModFix/>
+          </a:blip>
+          <a:srcRect b="11857" l="4591" r="55656" t="9408"/>
+          <a:stretch/>
+        </p:blipFill>
+        <p:spPr>
+          <a:xfrm>
+            <a:off x="6439175" y="171325"/>
+            <a:ext cx="2447875" cy="2228775"/>
+          </a:xfrm>
+          <a:prstGeom prst="rect">
+            <a:avLst/>
+          </a:prstGeom>
+          <a:noFill/>
+          <a:ln>
+            <a:noFill/>
+          </a:ln>
+        </p:spPr>
+      </p:pic>
     </p:spTree>
   </p:cSld>
   <p:clrMapOvr>
@@ -8657,7 +10532,7 @@
   <p:cSld>
     <p:spTree>
       <p:nvGrpSpPr>
-        <p:cNvPr id="72" name="Shape 72"/>
+        <p:cNvPr id="73" name="Shape 73"/>
         <p:cNvGrpSpPr/>
         <p:nvPr/>
       </p:nvGrpSpPr>
@@ -8671,7 +10546,398 @@
       </p:grpSpPr>
       <p:sp>
         <p:nvSpPr>
-          <p:cNvPr id="73" name="Google Shape;73;p15"/>
+          <p:cNvPr id="74" name="Google Shape;74;p15"/>
+          <p:cNvSpPr txBox="1"/>
+          <p:nvPr>
+            <p:ph type="title"/>
+          </p:nvPr>
+        </p:nvSpPr>
+        <p:spPr>
+          <a:xfrm>
+            <a:off x="311700" y="445025"/>
+            <a:ext cx="8520600" cy="572700"/>
+          </a:xfrm>
+          <a:prstGeom prst="rect">
+            <a:avLst/>
+          </a:prstGeom>
+        </p:spPr>
+        <p:txBody>
+          <a:bodyPr anchorCtr="0" anchor="t" bIns="91425" lIns="91425" spcFirstLastPara="1" rIns="91425" wrap="square" tIns="91425">
+            <a:normAutofit fontScale="90000"/>
+          </a:bodyPr>
+          <a:lstStyle/>
+          <a:p>
+            <a:pPr indent="0" lvl="0" marL="0" rtl="0" algn="l">
+              <a:spcBef>
+                <a:spcPts val="0"/>
+              </a:spcBef>
+              <a:spcAft>
+                <a:spcPts val="0"/>
+              </a:spcAft>
+              <a:buNone/>
+            </a:pPr>
+            <a:r>
+              <a:rPr lang="en-GB">
+                <a:solidFill>
+                  <a:srgbClr val="FF9900"/>
+                </a:solidFill>
+              </a:rPr>
+              <a:t>Version Control System (VCS)</a:t>
+            </a:r>
+            <a:endParaRPr>
+              <a:solidFill>
+                <a:srgbClr val="FF9900"/>
+              </a:solidFill>
+            </a:endParaRPr>
+          </a:p>
+        </p:txBody>
+      </p:sp>
+      <p:sp>
+        <p:nvSpPr>
+          <p:cNvPr id="75" name="Google Shape;75;p15"/>
+          <p:cNvSpPr txBox="1"/>
+          <p:nvPr>
+            <p:ph idx="1" type="body"/>
+          </p:nvPr>
+        </p:nvSpPr>
+        <p:spPr>
+          <a:xfrm>
+            <a:off x="311700" y="1152475"/>
+            <a:ext cx="8520600" cy="3416400"/>
+          </a:xfrm>
+          <a:prstGeom prst="rect">
+            <a:avLst/>
+          </a:prstGeom>
+        </p:spPr>
+        <p:txBody>
+          <a:bodyPr anchorCtr="0" anchor="t" bIns="91425" lIns="91425" spcFirstLastPara="1" rIns="91425" wrap="square" tIns="91425">
+            <a:normAutofit lnSpcReduction="10000"/>
+          </a:bodyPr>
+          <a:lstStyle/>
+          <a:p>
+            <a:pPr indent="0" lvl="0" marL="0" rtl="0" algn="l">
+              <a:spcBef>
+                <a:spcPts val="0"/>
+              </a:spcBef>
+              <a:spcAft>
+                <a:spcPts val="0"/>
+              </a:spcAft>
+              <a:buNone/>
+            </a:pPr>
+            <a:r>
+              <a:rPr lang="en-GB"/>
+              <a:t>A VCS is software that tracks and manages changes to files </a:t>
+            </a:r>
+            <a:endParaRPr/>
+          </a:p>
+          <a:p>
+            <a:pPr indent="0" lvl="0" marL="0" rtl="0" algn="l">
+              <a:spcBef>
+                <a:spcPts val="1200"/>
+              </a:spcBef>
+              <a:spcAft>
+                <a:spcPts val="0"/>
+              </a:spcAft>
+              <a:buNone/>
+            </a:pPr>
+            <a:r>
+              <a:rPr lang="en-GB"/>
+              <a:t>over time, enabling collaboration and rollback.</a:t>
+            </a:r>
+            <a:endParaRPr/>
+          </a:p>
+          <a:p>
+            <a:pPr indent="0" lvl="0" marL="457200" rtl="0" algn="l">
+              <a:spcBef>
+                <a:spcPts val="1200"/>
+              </a:spcBef>
+              <a:spcAft>
+                <a:spcPts val="0"/>
+              </a:spcAft>
+              <a:buNone/>
+            </a:pPr>
+            <a:r>
+              <a:t/>
+            </a:r>
+            <a:endParaRPr/>
+          </a:p>
+          <a:p>
+            <a:pPr indent="-342900" lvl="0" marL="457200" rtl="0" algn="l">
+              <a:spcBef>
+                <a:spcPts val="1200"/>
+              </a:spcBef>
+              <a:spcAft>
+                <a:spcPts val="0"/>
+              </a:spcAft>
+              <a:buSzPts val="1800"/>
+              <a:buChar char="●"/>
+            </a:pPr>
+            <a:r>
+              <a:rPr lang="en-GB"/>
+              <a:t>Tracks changes to files</a:t>
+            </a:r>
+            <a:endParaRPr/>
+          </a:p>
+          <a:p>
+            <a:pPr indent="-342900" lvl="0" marL="457200" rtl="0" algn="l">
+              <a:spcBef>
+                <a:spcPts val="0"/>
+              </a:spcBef>
+              <a:spcAft>
+                <a:spcPts val="0"/>
+              </a:spcAft>
+              <a:buSzPts val="1800"/>
+              <a:buChar char="●"/>
+            </a:pPr>
+            <a:r>
+              <a:rPr lang="en-GB"/>
+              <a:t>Maintains version history</a:t>
+            </a:r>
+            <a:endParaRPr/>
+          </a:p>
+          <a:p>
+            <a:pPr indent="-342900" lvl="0" marL="457200" rtl="0" algn="l">
+              <a:spcBef>
+                <a:spcPts val="0"/>
+              </a:spcBef>
+              <a:spcAft>
+                <a:spcPts val="0"/>
+              </a:spcAft>
+              <a:buSzPts val="1800"/>
+              <a:buChar char="●"/>
+            </a:pPr>
+            <a:r>
+              <a:rPr lang="en-GB"/>
+              <a:t>Supports team collaboration</a:t>
+            </a:r>
+            <a:endParaRPr/>
+          </a:p>
+          <a:p>
+            <a:pPr indent="-342900" lvl="0" marL="457200" rtl="0" algn="l">
+              <a:spcBef>
+                <a:spcPts val="0"/>
+              </a:spcBef>
+              <a:spcAft>
+                <a:spcPts val="0"/>
+              </a:spcAft>
+              <a:buSzPts val="1800"/>
+              <a:buChar char="●"/>
+            </a:pPr>
+            <a:r>
+              <a:rPr lang="en-GB"/>
+              <a:t>Enables rollback to older versions</a:t>
+            </a:r>
+            <a:endParaRPr/>
+          </a:p>
+          <a:p>
+            <a:pPr indent="-342900" lvl="0" marL="457200" rtl="0" algn="l">
+              <a:spcBef>
+                <a:spcPts val="0"/>
+              </a:spcBef>
+              <a:spcAft>
+                <a:spcPts val="0"/>
+              </a:spcAft>
+              <a:buSzPts val="1800"/>
+              <a:buChar char="●"/>
+            </a:pPr>
+            <a:r>
+              <a:rPr lang="en-GB"/>
+              <a:t>Records who changed what</a:t>
+            </a:r>
+            <a:endParaRPr/>
+          </a:p>
+          <a:p>
+            <a:pPr indent="0" lvl="0" marL="0" rtl="0" algn="l">
+              <a:spcBef>
+                <a:spcPts val="1200"/>
+              </a:spcBef>
+              <a:spcAft>
+                <a:spcPts val="1200"/>
+              </a:spcAft>
+              <a:buNone/>
+            </a:pPr>
+            <a:r>
+              <a:t/>
+            </a:r>
+            <a:endParaRPr/>
+          </a:p>
+        </p:txBody>
+      </p:sp>
+    </p:spTree>
+  </p:cSld>
+  <p:clrMapOvr>
+    <a:masterClrMapping/>
+  </p:clrMapOvr>
+</p:sld>
+</file>
+
+<file path=ppt/slides/slide4.xml><?xml version="1.0" encoding="utf-8"?>
+<p:sld xmlns:a="http://schemas.openxmlformats.org/drawingml/2006/main" xmlns:r="http://schemas.openxmlformats.org/officeDocument/2006/relationships" xmlns:mc="http://schemas.openxmlformats.org/markup-compatibility/2006" xmlns:mv="urn:schemas-microsoft-com:mac:vml" xmlns:p="http://schemas.openxmlformats.org/presentationml/2006/main" xmlns:c="http://schemas.openxmlformats.org/drawingml/2006/chart" xmlns:dgm="http://schemas.openxmlformats.org/drawingml/2006/diagram" xmlns:o="urn:schemas-microsoft-com:office:office" xmlns:v="urn:schemas-microsoft-com:vml" xmlns:pvml="urn:schemas-microsoft-com:office:powerpoint" xmlns:com="http://schemas.openxmlformats.org/drawingml/2006/compatibility" xmlns:p14="http://schemas.microsoft.com/office/powerpoint/2010/main" xmlns:p15="http://schemas.microsoft.com/office/powerpoint/2012/main" xmlns:ahyp="http://schemas.microsoft.com/office/drawing/2018/hyperlinkcolor">
+  <p:cSld>
+    <p:bg>
+      <p:bgPr>
+        <a:blipFill>
+          <a:blip r:embed="rId3">
+            <a:alphaModFix/>
+          </a:blip>
+          <a:stretch>
+            <a:fillRect/>
+          </a:stretch>
+        </a:blipFill>
+      </p:bgPr>
+    </p:bg>
+    <p:spTree>
+      <p:nvGrpSpPr>
+        <p:cNvPr id="79" name="Shape 79"/>
+        <p:cNvGrpSpPr/>
+        <p:nvPr/>
+      </p:nvGrpSpPr>
+      <p:grpSpPr>
+        <a:xfrm>
+          <a:off x="0" y="0"/>
+          <a:ext cx="0" cy="0"/>
+          <a:chOff x="0" y="0"/>
+          <a:chExt cx="0" cy="0"/>
+        </a:xfrm>
+      </p:grpSpPr>
+      <p:sp>
+        <p:nvSpPr>
+          <p:cNvPr id="80" name="Google Shape;80;p16"/>
+          <p:cNvSpPr txBox="1"/>
+          <p:nvPr>
+            <p:ph type="title"/>
+          </p:nvPr>
+        </p:nvSpPr>
+        <p:spPr>
+          <a:xfrm flipH="1">
+            <a:off x="7229225" y="1850075"/>
+            <a:ext cx="2112000" cy="169200"/>
+          </a:xfrm>
+          <a:prstGeom prst="rect">
+            <a:avLst/>
+          </a:prstGeom>
+        </p:spPr>
+        <p:txBody>
+          <a:bodyPr anchorCtr="0" anchor="t" bIns="91425" lIns="91425" spcFirstLastPara="1" rIns="91425" wrap="square" tIns="91425">
+            <a:noAutofit/>
+          </a:bodyPr>
+          <a:lstStyle/>
+          <a:p>
+            <a:pPr indent="0" lvl="0" marL="0" rtl="0" algn="l">
+              <a:spcBef>
+                <a:spcPts val="0"/>
+              </a:spcBef>
+              <a:spcAft>
+                <a:spcPts val="0"/>
+              </a:spcAft>
+              <a:buSzPts val="990"/>
+              <a:buNone/>
+            </a:pPr>
+            <a:r>
+              <a:rPr lang="en-GB" sz="100"/>
+              <a:t>vcs</a:t>
+            </a:r>
+            <a:endParaRPr sz="100"/>
+          </a:p>
+        </p:txBody>
+      </p:sp>
+      <p:sp>
+        <p:nvSpPr>
+          <p:cNvPr id="81" name="Google Shape;81;p16"/>
+          <p:cNvSpPr txBox="1"/>
+          <p:nvPr>
+            <p:ph idx="1" type="body"/>
+          </p:nvPr>
+        </p:nvSpPr>
+        <p:spPr>
+          <a:xfrm>
+            <a:off x="420950" y="1349350"/>
+            <a:ext cx="6116400" cy="3219600"/>
+          </a:xfrm>
+          <a:prstGeom prst="rect">
+            <a:avLst/>
+          </a:prstGeom>
+        </p:spPr>
+        <p:txBody>
+          <a:bodyPr anchorCtr="0" anchor="t" bIns="91425" lIns="91425" spcFirstLastPara="1" rIns="91425" wrap="square" tIns="91425">
+            <a:normAutofit/>
+          </a:bodyPr>
+          <a:lstStyle/>
+          <a:p>
+            <a:pPr indent="0" lvl="0" marL="0" rtl="0" algn="l">
+              <a:spcBef>
+                <a:spcPts val="0"/>
+              </a:spcBef>
+              <a:spcAft>
+                <a:spcPts val="1200"/>
+              </a:spcAft>
+              <a:buNone/>
+            </a:pPr>
+            <a:r>
+              <a:rPr lang="en-GB" sz="1500">
+                <a:solidFill>
+                  <a:schemeClr val="dk1"/>
+                </a:solidFill>
+                <a:highlight>
+                  <a:srgbClr val="131417"/>
+                </a:highlight>
+                <a:latin typeface="Nunito"/>
+                <a:ea typeface="Nunito"/>
+                <a:cs typeface="Nunito"/>
+                <a:sym typeface="Nunito"/>
+              </a:rPr>
+              <a:t>                </a:t>
+            </a:r>
+            <a:endParaRPr sz="1500">
+              <a:solidFill>
+                <a:schemeClr val="dk1"/>
+              </a:solidFill>
+              <a:highlight>
+                <a:srgbClr val="131417"/>
+              </a:highlight>
+              <a:latin typeface="Nunito"/>
+              <a:ea typeface="Nunito"/>
+              <a:cs typeface="Nunito"/>
+              <a:sym typeface="Nunito"/>
+            </a:endParaRPr>
+          </a:p>
+        </p:txBody>
+      </p:sp>
+    </p:spTree>
+  </p:cSld>
+  <p:clrMapOvr>
+    <a:masterClrMapping/>
+  </p:clrMapOvr>
+</p:sld>
+</file>
+
+<file path=ppt/slides/slide5.xml><?xml version="1.0" encoding="utf-8"?>
+<p:sld xmlns:a="http://schemas.openxmlformats.org/drawingml/2006/main" xmlns:r="http://schemas.openxmlformats.org/officeDocument/2006/relationships" xmlns:mc="http://schemas.openxmlformats.org/markup-compatibility/2006" xmlns:mv="urn:schemas-microsoft-com:mac:vml" xmlns:p="http://schemas.openxmlformats.org/presentationml/2006/main" xmlns:c="http://schemas.openxmlformats.org/drawingml/2006/chart" xmlns:dgm="http://schemas.openxmlformats.org/drawingml/2006/diagram" xmlns:o="urn:schemas-microsoft-com:office:office" xmlns:v="urn:schemas-microsoft-com:vml" xmlns:pvml="urn:schemas-microsoft-com:office:powerpoint" xmlns:com="http://schemas.openxmlformats.org/drawingml/2006/compatibility" xmlns:p14="http://schemas.microsoft.com/office/powerpoint/2010/main" xmlns:p15="http://schemas.microsoft.com/office/powerpoint/2012/main" xmlns:ahyp="http://schemas.microsoft.com/office/drawing/2018/hyperlinkcolor">
+  <p:cSld>
+    <p:bg>
+      <p:bgPr>
+        <a:solidFill>
+          <a:srgbClr val="EBF6FF"/>
+        </a:solidFill>
+      </p:bgPr>
+    </p:bg>
+    <p:spTree>
+      <p:nvGrpSpPr>
+        <p:cNvPr id="85" name="Shape 85"/>
+        <p:cNvGrpSpPr/>
+        <p:nvPr/>
+      </p:nvGrpSpPr>
+      <p:grpSpPr>
+        <a:xfrm>
+          <a:off x="0" y="0"/>
+          <a:ext cx="0" cy="0"/>
+          <a:chOff x="0" y="0"/>
+          <a:chExt cx="0" cy="0"/>
+        </a:xfrm>
+      </p:grpSpPr>
+      <p:sp>
+        <p:nvSpPr>
+          <p:cNvPr id="86" name="Google Shape;86;p17"/>
           <p:cNvSpPr txBox="1"/>
           <p:nvPr>
             <p:ph type="title"/>
@@ -8703,16 +10969,16 @@
               <a:buNone/>
             </a:pPr>
             <a:r>
-              <a:rPr lang="en-GB" sz="3200">
-                <a:solidFill>
-                  <a:schemeClr val="accent5"/>
+              <a:rPr lang="en-GB">
+                <a:solidFill>
+                  <a:srgbClr val="FF9900"/>
                 </a:solidFill>
               </a:rPr>
-              <a:t>Github</a:t>
-            </a:r>
-            <a:endParaRPr sz="3200">
+              <a:t>Local VCS</a:t>
+            </a:r>
+            <a:endParaRPr>
               <a:solidFill>
-                <a:schemeClr val="accent5"/>
+                <a:srgbClr val="FF9900"/>
               </a:solidFill>
             </a:endParaRPr>
           </a:p>
@@ -8720,7 +10986,7 @@
       </p:sp>
       <p:sp>
         <p:nvSpPr>
-          <p:cNvPr id="74" name="Google Shape;74;p15"/>
+          <p:cNvPr id="87" name="Google Shape;87;p17"/>
           <p:cNvSpPr txBox="1"/>
           <p:nvPr>
             <p:ph idx="1" type="body"/>
@@ -8751,10 +11017,50 @@
               <a:buNone/>
             </a:pPr>
             <a:r>
-              <a:rPr lang="en-GB" sz="2100"/>
-              <a:t>Website that allows developers to store and manage their code using Git.</a:t>
-            </a:r>
-            <a:endParaRPr sz="2100"/>
+              <a:rPr lang="en-GB" sz="1500">
+                <a:solidFill>
+                  <a:srgbClr val="131417"/>
+                </a:solidFill>
+                <a:latin typeface="Arial"/>
+                <a:ea typeface="Arial"/>
+                <a:cs typeface="Arial"/>
+                <a:sym typeface="Arial"/>
+              </a:rPr>
+              <a:t>A</a:t>
+            </a:r>
+            <a:r>
+              <a:rPr b="1" lang="en-GB" sz="1500">
+                <a:solidFill>
+                  <a:srgbClr val="131417"/>
+                </a:solidFill>
+                <a:latin typeface="Arial"/>
+                <a:ea typeface="Arial"/>
+                <a:cs typeface="Arial"/>
+                <a:sym typeface="Arial"/>
+              </a:rPr>
+              <a:t> Local VCS</a:t>
+            </a:r>
+            <a:r>
+              <a:rPr lang="en-GB" sz="1500">
+                <a:solidFill>
+                  <a:srgbClr val="131417"/>
+                </a:solidFill>
+                <a:latin typeface="Arial"/>
+                <a:ea typeface="Arial"/>
+                <a:cs typeface="Arial"/>
+                <a:sym typeface="Arial"/>
+              </a:rPr>
+              <a:t> stores all file versions and </a:t>
+            </a:r>
+            <a:endParaRPr sz="1500">
+              <a:solidFill>
+                <a:srgbClr val="131417"/>
+              </a:solidFill>
+              <a:latin typeface="Arial"/>
+              <a:ea typeface="Arial"/>
+              <a:cs typeface="Arial"/>
+              <a:sym typeface="Arial"/>
+            </a:endParaRPr>
           </a:p>
           <a:p>
             <a:pPr indent="0" lvl="0" marL="0" rtl="0" algn="l">
@@ -8762,18 +11068,221 @@
                 <a:spcPts val="1200"/>
               </a:spcBef>
               <a:spcAft>
+                <a:spcPts val="0"/>
+              </a:spcAft>
+              <a:buNone/>
+            </a:pPr>
+            <a:r>
+              <a:rPr lang="en-GB" sz="1500">
+                <a:solidFill>
+                  <a:srgbClr val="131417"/>
+                </a:solidFill>
+                <a:latin typeface="Arial"/>
+                <a:ea typeface="Arial"/>
+                <a:cs typeface="Arial"/>
+                <a:sym typeface="Arial"/>
+              </a:rPr>
+              <a:t>history on a single computer.</a:t>
+            </a:r>
+            <a:endParaRPr sz="1500">
+              <a:solidFill>
+                <a:srgbClr val="131417"/>
+              </a:solidFill>
+              <a:latin typeface="Arial"/>
+              <a:ea typeface="Arial"/>
+              <a:cs typeface="Arial"/>
+              <a:sym typeface="Arial"/>
+            </a:endParaRPr>
+          </a:p>
+          <a:p>
+            <a:pPr indent="0" lvl="0" marL="0" rtl="0" algn="l">
+              <a:spcBef>
                 <a:spcPts val="1200"/>
-              </a:spcAft>
-              <a:buNone/>
-            </a:pPr>
-            <a:r>
-              <a:rPr i="1" lang="en-GB" sz="2100"/>
-              <a:t>https://github.com</a:t>
-            </a:r>
-            <a:endParaRPr i="1" sz="2100"/>
+              </a:spcBef>
+              <a:spcAft>
+                <a:spcPts val="0"/>
+              </a:spcAft>
+              <a:buNone/>
+            </a:pPr>
+            <a:r>
+              <a:rPr lang="en-GB" sz="1500">
+                <a:solidFill>
+                  <a:srgbClr val="131417"/>
+                </a:solidFill>
+                <a:latin typeface="Arial"/>
+                <a:ea typeface="Arial"/>
+                <a:cs typeface="Arial"/>
+                <a:sym typeface="Arial"/>
+              </a:rPr>
+              <a:t>It tracks changes by saving snapshots in </a:t>
+            </a:r>
+            <a:endParaRPr sz="1500">
+              <a:solidFill>
+                <a:srgbClr val="131417"/>
+              </a:solidFill>
+              <a:latin typeface="Arial"/>
+              <a:ea typeface="Arial"/>
+              <a:cs typeface="Arial"/>
+              <a:sym typeface="Arial"/>
+            </a:endParaRPr>
+          </a:p>
+          <a:p>
+            <a:pPr indent="0" lvl="0" marL="0" rtl="0" algn="l">
+              <a:spcBef>
+                <a:spcPts val="1200"/>
+              </a:spcBef>
+              <a:spcAft>
+                <a:spcPts val="0"/>
+              </a:spcAft>
+              <a:buNone/>
+            </a:pPr>
+            <a:r>
+              <a:rPr lang="en-GB" sz="1500">
+                <a:solidFill>
+                  <a:srgbClr val="131417"/>
+                </a:solidFill>
+                <a:latin typeface="Arial"/>
+                <a:ea typeface="Arial"/>
+                <a:cs typeface="Arial"/>
+                <a:sym typeface="Arial"/>
+              </a:rPr>
+              <a:t>a version database and allows users </a:t>
+            </a:r>
+            <a:endParaRPr sz="1500">
+              <a:solidFill>
+                <a:srgbClr val="131417"/>
+              </a:solidFill>
+              <a:latin typeface="Arial"/>
+              <a:ea typeface="Arial"/>
+              <a:cs typeface="Arial"/>
+              <a:sym typeface="Arial"/>
+            </a:endParaRPr>
+          </a:p>
+          <a:p>
+            <a:pPr indent="0" lvl="0" marL="0" rtl="0" algn="l">
+              <a:spcBef>
+                <a:spcPts val="1200"/>
+              </a:spcBef>
+              <a:spcAft>
+                <a:spcPts val="0"/>
+              </a:spcAft>
+              <a:buNone/>
+            </a:pPr>
+            <a:r>
+              <a:rPr lang="en-GB" sz="1500">
+                <a:solidFill>
+                  <a:srgbClr val="131417"/>
+                </a:solidFill>
+                <a:latin typeface="Arial"/>
+                <a:ea typeface="Arial"/>
+                <a:cs typeface="Arial"/>
+                <a:sym typeface="Arial"/>
+              </a:rPr>
+              <a:t>to checkout versions for editing.</a:t>
+            </a:r>
+            <a:endParaRPr sz="1500">
+              <a:solidFill>
+                <a:srgbClr val="131417"/>
+              </a:solidFill>
+              <a:latin typeface="Arial"/>
+              <a:ea typeface="Arial"/>
+              <a:cs typeface="Arial"/>
+              <a:sym typeface="Arial"/>
+            </a:endParaRPr>
+          </a:p>
+          <a:p>
+            <a:pPr indent="0" lvl="0" marL="0" rtl="0" algn="l">
+              <a:spcBef>
+                <a:spcPts val="1200"/>
+              </a:spcBef>
+              <a:spcAft>
+                <a:spcPts val="0"/>
+              </a:spcAft>
+              <a:buNone/>
+            </a:pPr>
+            <a:r>
+              <a:rPr lang="en-GB" sz="1500">
+                <a:solidFill>
+                  <a:srgbClr val="131417"/>
+                </a:solidFill>
+                <a:latin typeface="Arial"/>
+                <a:ea typeface="Arial"/>
+                <a:cs typeface="Arial"/>
+                <a:sym typeface="Arial"/>
+              </a:rPr>
+              <a:t>It works offline, supports solo development,</a:t>
+            </a:r>
+            <a:endParaRPr sz="1500">
+              <a:solidFill>
+                <a:srgbClr val="131417"/>
+              </a:solidFill>
+              <a:latin typeface="Arial"/>
+              <a:ea typeface="Arial"/>
+              <a:cs typeface="Arial"/>
+              <a:sym typeface="Arial"/>
+            </a:endParaRPr>
+          </a:p>
+          <a:p>
+            <a:pPr indent="0" lvl="0" marL="0" rtl="0" algn="l">
+              <a:spcBef>
+                <a:spcPts val="1200"/>
+              </a:spcBef>
+              <a:spcAft>
+                <a:spcPts val="1200"/>
+              </a:spcAft>
+              <a:buNone/>
+            </a:pPr>
+            <a:r>
+              <a:rPr lang="en-GB" sz="1500">
+                <a:solidFill>
+                  <a:srgbClr val="131417"/>
+                </a:solidFill>
+                <a:latin typeface="Arial"/>
+                <a:ea typeface="Arial"/>
+                <a:cs typeface="Arial"/>
+                <a:sym typeface="Arial"/>
+              </a:rPr>
+              <a:t> and has no built-in collaboration features.</a:t>
+            </a:r>
+            <a:endParaRPr sz="1500">
+              <a:solidFill>
+                <a:srgbClr val="131417"/>
+              </a:solidFill>
+              <a:latin typeface="Arial"/>
+              <a:ea typeface="Arial"/>
+              <a:cs typeface="Arial"/>
+              <a:sym typeface="Arial"/>
+            </a:endParaRPr>
           </a:p>
         </p:txBody>
       </p:sp>
+      <p:pic>
+        <p:nvPicPr>
+          <p:cNvPr id="88" name="Google Shape;88;p17"/>
+          <p:cNvPicPr preferRelativeResize="0"/>
+          <p:nvPr/>
+        </p:nvPicPr>
+        <p:blipFill rotWithShape="1">
+          <a:blip r:embed="rId3">
+            <a:alphaModFix/>
+          </a:blip>
+          <a:srcRect b="10995" l="27854" r="27889" t="1107"/>
+          <a:stretch/>
+        </p:blipFill>
+        <p:spPr>
+          <a:xfrm>
+            <a:off x="4836175" y="1585300"/>
+            <a:ext cx="3996125" cy="3481550"/>
+          </a:xfrm>
+          <a:prstGeom prst="rect">
+            <a:avLst/>
+          </a:prstGeom>
+          <a:noFill/>
+          <a:ln>
+            <a:noFill/>
+          </a:ln>
+        </p:spPr>
+      </p:pic>
     </p:spTree>
   </p:cSld>
   <p:clrMapOvr>
@@ -8782,12 +11291,19 @@
 </p:sld>
 </file>
 
-<file path=ppt/slides/slide4.xml><?xml version="1.0" encoding="utf-8"?>
+<file path=ppt/slides/slide6.xml><?xml version="1.0" encoding="utf-8"?>
 <p:sld xmlns:a="http://schemas.openxmlformats.org/drawingml/2006/main" xmlns:r="http://schemas.openxmlformats.org/officeDocument/2006/relationships" xmlns:mc="http://schemas.openxmlformats.org/markup-compatibility/2006" xmlns:mv="urn:schemas-microsoft-com:mac:vml" xmlns:p="http://schemas.openxmlformats.org/presentationml/2006/main" xmlns:c="http://schemas.openxmlformats.org/drawingml/2006/chart" xmlns:dgm="http://schemas.openxmlformats.org/drawingml/2006/diagram" xmlns:o="urn:schemas-microsoft-com:office:office" xmlns:v="urn:schemas-microsoft-com:vml" xmlns:pvml="urn:schemas-microsoft-com:office:powerpoint" xmlns:com="http://schemas.openxmlformats.org/drawingml/2006/compatibility" xmlns:p14="http://schemas.microsoft.com/office/powerpoint/2010/main" xmlns:p15="http://schemas.microsoft.com/office/powerpoint/2012/main" xmlns:ahyp="http://schemas.microsoft.com/office/drawing/2018/hyperlinkcolor">
   <p:cSld>
+    <p:bg>
+      <p:bgPr>
+        <a:solidFill>
+          <a:srgbClr val="EBF6FF"/>
+        </a:solidFill>
+      </p:bgPr>
+    </p:bg>
     <p:spTree>
       <p:nvGrpSpPr>
-        <p:cNvPr id="78" name="Shape 78"/>
+        <p:cNvPr id="92" name="Shape 92"/>
         <p:cNvGrpSpPr/>
         <p:nvPr/>
       </p:nvGrpSpPr>
@@ -8801,7 +11317,7 @@
       </p:grpSpPr>
       <p:sp>
         <p:nvSpPr>
-          <p:cNvPr id="79" name="Google Shape;79;p16"/>
+          <p:cNvPr id="93" name="Google Shape;93;p18"/>
           <p:cNvSpPr txBox="1"/>
           <p:nvPr>
             <p:ph type="title"/>
@@ -8818,7 +11334,7 @@
         </p:spPr>
         <p:txBody>
           <a:bodyPr anchorCtr="0" anchor="t" bIns="91425" lIns="91425" spcFirstLastPara="1" rIns="91425" wrap="square" tIns="91425">
-            <a:noAutofit/>
+            <a:normAutofit fontScale="90000"/>
           </a:bodyPr>
           <a:lstStyle/>
           <a:p>
@@ -8829,20 +11345,19 @@
               <a:spcAft>
                 <a:spcPts val="0"/>
               </a:spcAft>
-              <a:buSzPts val="990"/>
-              <a:buNone/>
-            </a:pPr>
-            <a:r>
-              <a:rPr lang="en-GB" sz="3200">
-                <a:solidFill>
-                  <a:schemeClr val="accent5"/>
+              <a:buNone/>
+            </a:pPr>
+            <a:r>
+              <a:rPr lang="en-GB">
+                <a:solidFill>
+                  <a:srgbClr val="FF9900"/>
                 </a:solidFill>
               </a:rPr>
-              <a:t>Setting up Git</a:t>
-            </a:r>
-            <a:endParaRPr sz="3200">
+              <a:t>Centralized VCS</a:t>
+            </a:r>
+            <a:endParaRPr>
               <a:solidFill>
-                <a:schemeClr val="accent5"/>
+                <a:srgbClr val="FF9900"/>
               </a:solidFill>
             </a:endParaRPr>
           </a:p>
@@ -8850,7 +11365,7 @@
       </p:sp>
       <p:sp>
         <p:nvSpPr>
-          <p:cNvPr id="80" name="Google Shape;80;p16"/>
+          <p:cNvPr id="94" name="Google Shape;94;p18"/>
           <p:cNvSpPr txBox="1"/>
           <p:nvPr>
             <p:ph idx="1" type="body"/>
@@ -8881,10 +11396,50 @@
               <a:buNone/>
             </a:pPr>
             <a:r>
-              <a:rPr lang="en-GB" sz="2100"/>
-              <a:t>Visual Studio Code</a:t>
-            </a:r>
-            <a:endParaRPr sz="2100"/>
+              <a:rPr lang="en-GB" sz="1400">
+                <a:solidFill>
+                  <a:srgbClr val="131417"/>
+                </a:solidFill>
+                <a:latin typeface="Arial"/>
+                <a:ea typeface="Arial"/>
+                <a:cs typeface="Arial"/>
+                <a:sym typeface="Arial"/>
+              </a:rPr>
+              <a:t>A </a:t>
+            </a:r>
+            <a:r>
+              <a:rPr b="1" lang="en-GB" sz="1400">
+                <a:solidFill>
+                  <a:srgbClr val="131417"/>
+                </a:solidFill>
+                <a:latin typeface="Arial"/>
+                <a:ea typeface="Arial"/>
+                <a:cs typeface="Arial"/>
+                <a:sym typeface="Arial"/>
+              </a:rPr>
+              <a:t>Centralized VCS</a:t>
+            </a:r>
+            <a:r>
+              <a:rPr lang="en-GB" sz="1400">
+                <a:solidFill>
+                  <a:srgbClr val="131417"/>
+                </a:solidFill>
+                <a:latin typeface="Arial"/>
+                <a:ea typeface="Arial"/>
+                <a:cs typeface="Arial"/>
+                <a:sym typeface="Arial"/>
+              </a:rPr>
+              <a:t> stores all project versions on </a:t>
+            </a:r>
+            <a:endParaRPr sz="1400">
+              <a:solidFill>
+                <a:srgbClr val="131417"/>
+              </a:solidFill>
+              <a:latin typeface="Arial"/>
+              <a:ea typeface="Arial"/>
+              <a:cs typeface="Arial"/>
+              <a:sym typeface="Arial"/>
+            </a:endParaRPr>
           </a:p>
           <a:p>
             <a:pPr indent="0" lvl="0" marL="0" rtl="0" algn="l">
@@ -8897,10 +11452,26 @@
               <a:buNone/>
             </a:pPr>
             <a:r>
-              <a:rPr lang="en-GB" sz="2100"/>
-              <a:t>Windows (Git Bash)</a:t>
-            </a:r>
-            <a:endParaRPr sz="2100"/>
+              <a:rPr lang="en-GB" sz="1400">
+                <a:solidFill>
+                  <a:srgbClr val="131417"/>
+                </a:solidFill>
+                <a:latin typeface="Arial"/>
+                <a:ea typeface="Arial"/>
+                <a:cs typeface="Arial"/>
+                <a:sym typeface="Arial"/>
+              </a:rPr>
+              <a:t>a central server, where users commit and</a:t>
+            </a:r>
+            <a:endParaRPr sz="1400">
+              <a:solidFill>
+                <a:srgbClr val="131417"/>
+              </a:solidFill>
+              <a:latin typeface="Arial"/>
+              <a:ea typeface="Arial"/>
+              <a:cs typeface="Arial"/>
+              <a:sym typeface="Arial"/>
+            </a:endParaRPr>
           </a:p>
           <a:p>
             <a:pPr indent="0" lvl="0" marL="0" rtl="0" algn="l">
@@ -8913,10 +11484,26 @@
               <a:buNone/>
             </a:pPr>
             <a:r>
-              <a:rPr lang="en-GB" sz="2100"/>
-              <a:t>Mac (Terminal)</a:t>
-            </a:r>
-            <a:endParaRPr sz="2100"/>
+              <a:rPr lang="en-GB" sz="1400">
+                <a:solidFill>
+                  <a:srgbClr val="131417"/>
+                </a:solidFill>
+                <a:latin typeface="Arial"/>
+                <a:ea typeface="Arial"/>
+                <a:cs typeface="Arial"/>
+                <a:sym typeface="Arial"/>
+              </a:rPr>
+              <a:t> update changes, requiring network </a:t>
+            </a:r>
+            <a:endParaRPr sz="1400">
+              <a:solidFill>
+                <a:srgbClr val="131417"/>
+              </a:solidFill>
+              <a:latin typeface="Arial"/>
+              <a:ea typeface="Arial"/>
+              <a:cs typeface="Arial"/>
+              <a:sym typeface="Arial"/>
+            </a:endParaRPr>
           </a:p>
           <a:p>
             <a:pPr indent="0" lvl="0" marL="0" rtl="0" algn="l">
@@ -8929,9 +11516,26 @@
               <a:buNone/>
             </a:pPr>
             <a:r>
-              <a:t/>
-            </a:r>
-            <a:endParaRPr sz="2100"/>
+              <a:rPr lang="en-GB" sz="1400">
+                <a:solidFill>
+                  <a:srgbClr val="131417"/>
+                </a:solidFill>
+                <a:latin typeface="Arial"/>
+                <a:ea typeface="Arial"/>
+                <a:cs typeface="Arial"/>
+                <a:sym typeface="Arial"/>
+              </a:rPr>
+              <a:t>access for collaboration.</a:t>
+            </a:r>
+            <a:endParaRPr sz="1400">
+              <a:solidFill>
+                <a:srgbClr val="131417"/>
+              </a:solidFill>
+              <a:latin typeface="Arial"/>
+              <a:ea typeface="Arial"/>
+              <a:cs typeface="Arial"/>
+              <a:sym typeface="Arial"/>
+            </a:endParaRPr>
           </a:p>
           <a:p>
             <a:pPr indent="0" lvl="0" marL="0" rtl="0" algn="l">
@@ -8939,26 +11543,118 @@
                 <a:spcPts val="1200"/>
               </a:spcBef>
               <a:spcAft>
+                <a:spcPts val="0"/>
+              </a:spcAft>
+              <a:buNone/>
+            </a:pPr>
+            <a:r>
+              <a:rPr lang="en-GB" sz="1400">
+                <a:solidFill>
+                  <a:srgbClr val="000000"/>
+                </a:solidFill>
+                <a:latin typeface="Arial"/>
+                <a:ea typeface="Arial"/>
+                <a:cs typeface="Arial"/>
+                <a:sym typeface="Arial"/>
+              </a:rPr>
+              <a:t>One </a:t>
+            </a:r>
+            <a:r>
+              <a:rPr b="1" lang="en-GB" sz="1400">
+                <a:solidFill>
+                  <a:srgbClr val="000000"/>
+                </a:solidFill>
+                <a:latin typeface="Arial"/>
+                <a:ea typeface="Arial"/>
+                <a:cs typeface="Arial"/>
+                <a:sym typeface="Arial"/>
+              </a:rPr>
+              <a:t>central server</a:t>
+            </a:r>
+            <a:r>
+              <a:rPr lang="en-GB" sz="1400">
+                <a:solidFill>
+                  <a:srgbClr val="000000"/>
+                </a:solidFill>
+                <a:latin typeface="Arial"/>
+                <a:ea typeface="Arial"/>
+                <a:cs typeface="Arial"/>
+                <a:sym typeface="Arial"/>
+              </a:rPr>
+              <a:t> stores the complete</a:t>
+            </a:r>
+            <a:endParaRPr sz="1400">
+              <a:solidFill>
+                <a:srgbClr val="000000"/>
+              </a:solidFill>
+              <a:latin typeface="Arial"/>
+              <a:ea typeface="Arial"/>
+              <a:cs typeface="Arial"/>
+              <a:sym typeface="Arial"/>
+            </a:endParaRPr>
+          </a:p>
+          <a:p>
+            <a:pPr indent="0" lvl="0" marL="0" rtl="0" algn="l">
+              <a:spcBef>
                 <a:spcPts val="1200"/>
-              </a:spcAft>
-              <a:buNone/>
-            </a:pPr>
-            <a:r>
-              <a:rPr i="1" lang="en-GB" sz="2100"/>
-              <a:t>git </a:t>
-            </a:r>
-            <a:r>
-              <a:rPr i="1" lang="en-GB" sz="2100"/>
-              <a:t>--</a:t>
-            </a:r>
-            <a:r>
-              <a:rPr i="1" lang="en-GB" sz="2100"/>
-              <a:t>version</a:t>
-            </a:r>
-            <a:endParaRPr i="1" sz="2100"/>
+              </a:spcBef>
+              <a:spcAft>
+                <a:spcPts val="1200"/>
+              </a:spcAft>
+              <a:buNone/>
+            </a:pPr>
+            <a:r>
+              <a:rPr lang="en-GB" sz="1400">
+                <a:solidFill>
+                  <a:srgbClr val="000000"/>
+                </a:solidFill>
+                <a:latin typeface="Arial"/>
+                <a:ea typeface="Arial"/>
+                <a:cs typeface="Arial"/>
+                <a:sym typeface="Arial"/>
+              </a:rPr>
+              <a:t>project history.</a:t>
+            </a:r>
+            <a:endParaRPr sz="1400">
+              <a:solidFill>
+                <a:srgbClr val="131417"/>
+              </a:solidFill>
+              <a:latin typeface="Arial"/>
+              <a:ea typeface="Arial"/>
+              <a:cs typeface="Arial"/>
+              <a:sym typeface="Arial"/>
+            </a:endParaRPr>
           </a:p>
         </p:txBody>
       </p:sp>
+      <p:pic>
+        <p:nvPicPr>
+          <p:cNvPr id="95" name="Google Shape;95;p18" title="Centralized-Version-Control__1_-removebg-preview.png"/>
+          <p:cNvPicPr preferRelativeResize="0"/>
+          <p:nvPr/>
+        </p:nvPicPr>
+        <p:blipFill>
+          <a:blip r:embed="rId3">
+            <a:alphaModFix/>
+          </a:blip>
+          <a:stretch>
+            <a:fillRect/>
+          </a:stretch>
+        </p:blipFill>
+        <p:spPr>
+          <a:xfrm>
+            <a:off x="3734575" y="1303413"/>
+            <a:ext cx="5475125" cy="2991775"/>
+          </a:xfrm>
+          <a:prstGeom prst="rect">
+            <a:avLst/>
+          </a:prstGeom>
+          <a:noFill/>
+          <a:ln>
+            <a:noFill/>
+          </a:ln>
+        </p:spPr>
+      </p:pic>
     </p:spTree>
   </p:cSld>
   <p:clrMapOvr>
@@ -8967,12 +11663,19 @@
 </p:sld>
 </file>
 
-<file path=ppt/slides/slide5.xml><?xml version="1.0" encoding="utf-8"?>
+<file path=ppt/slides/slide7.xml><?xml version="1.0" encoding="utf-8"?>
 <p:sld xmlns:a="http://schemas.openxmlformats.org/drawingml/2006/main" xmlns:r="http://schemas.openxmlformats.org/officeDocument/2006/relationships" xmlns:mc="http://schemas.openxmlformats.org/markup-compatibility/2006" xmlns:mv="urn:schemas-microsoft-com:mac:vml" xmlns:p="http://schemas.openxmlformats.org/presentationml/2006/main" xmlns:c="http://schemas.openxmlformats.org/drawingml/2006/chart" xmlns:dgm="http://schemas.openxmlformats.org/drawingml/2006/diagram" xmlns:o="urn:schemas-microsoft-com:office:office" xmlns:v="urn:schemas-microsoft-com:vml" xmlns:pvml="urn:schemas-microsoft-com:office:powerpoint" xmlns:com="http://schemas.openxmlformats.org/drawingml/2006/compatibility" xmlns:p14="http://schemas.microsoft.com/office/powerpoint/2010/main" xmlns:p15="http://schemas.microsoft.com/office/powerpoint/2012/main" xmlns:ahyp="http://schemas.microsoft.com/office/drawing/2018/hyperlinkcolor">
   <p:cSld>
+    <p:bg>
+      <p:bgPr>
+        <a:solidFill>
+          <a:srgbClr val="EBF6FF"/>
+        </a:solidFill>
+      </p:bgPr>
+    </p:bg>
     <p:spTree>
       <p:nvGrpSpPr>
-        <p:cNvPr id="84" name="Shape 84"/>
+        <p:cNvPr id="99" name="Shape 99"/>
         <p:cNvGrpSpPr/>
         <p:nvPr/>
       </p:nvGrpSpPr>
@@ -8986,7 +11689,7 @@
       </p:grpSpPr>
       <p:sp>
         <p:nvSpPr>
-          <p:cNvPr id="85" name="Google Shape;85;p17"/>
+          <p:cNvPr id="100" name="Google Shape;100;p19"/>
           <p:cNvSpPr txBox="1"/>
           <p:nvPr>
             <p:ph type="title"/>
@@ -9003,7 +11706,7 @@
         </p:spPr>
         <p:txBody>
           <a:bodyPr anchorCtr="0" anchor="t" bIns="91425" lIns="91425" spcFirstLastPara="1" rIns="91425" wrap="square" tIns="91425">
-            <a:noAutofit/>
+            <a:normAutofit fontScale="90000"/>
           </a:bodyPr>
           <a:lstStyle/>
           <a:p>
@@ -9014,28 +11717,19 @@
               <a:spcAft>
                 <a:spcPts val="0"/>
               </a:spcAft>
-              <a:buSzPts val="990"/>
-              <a:buNone/>
-            </a:pPr>
-            <a:r>
-              <a:rPr lang="en-GB" sz="3200">
-                <a:solidFill>
-                  <a:schemeClr val="accent5"/>
+              <a:buNone/>
+            </a:pPr>
+            <a:r>
+              <a:rPr lang="en-GB">
+                <a:solidFill>
+                  <a:srgbClr val="FF9900"/>
                 </a:solidFill>
               </a:rPr>
-              <a:t>Configuring</a:t>
-            </a:r>
-            <a:r>
-              <a:rPr lang="en-GB" sz="3200">
-                <a:solidFill>
-                  <a:schemeClr val="accent5"/>
-                </a:solidFill>
-              </a:rPr>
-              <a:t> Git</a:t>
-            </a:r>
-            <a:endParaRPr sz="3200">
+              <a:t>Distributed VCS</a:t>
+            </a:r>
+            <a:endParaRPr>
               <a:solidFill>
-                <a:schemeClr val="accent5"/>
+                <a:srgbClr val="FF9900"/>
               </a:solidFill>
             </a:endParaRPr>
           </a:p>
@@ -9043,7 +11737,7 @@
       </p:sp>
       <p:sp>
         <p:nvSpPr>
-          <p:cNvPr id="86" name="Google Shape;86;p17"/>
+          <p:cNvPr id="101" name="Google Shape;101;p19"/>
           <p:cNvSpPr txBox="1"/>
           <p:nvPr>
             <p:ph idx="1" type="body"/>
@@ -9074,14 +11768,50 @@
               <a:buNone/>
             </a:pPr>
             <a:r>
-              <a:rPr i="1" lang="en-GB" sz="2100"/>
-              <a:t>git config </a:t>
-            </a:r>
-            <a:r>
-              <a:rPr i="1" lang="en-GB" sz="2100"/>
-              <a:t>--global user.name “Khushee”</a:t>
-            </a:r>
-            <a:endParaRPr i="1" sz="2100"/>
+              <a:rPr lang="en-GB" sz="1400">
+                <a:solidFill>
+                  <a:srgbClr val="000000"/>
+                </a:solidFill>
+                <a:latin typeface="Arial"/>
+                <a:ea typeface="Arial"/>
+                <a:cs typeface="Arial"/>
+                <a:sym typeface="Arial"/>
+              </a:rPr>
+              <a:t>A </a:t>
+            </a:r>
+            <a:r>
+              <a:rPr b="1" lang="en-GB" sz="1400">
+                <a:solidFill>
+                  <a:srgbClr val="000000"/>
+                </a:solidFill>
+                <a:latin typeface="Arial"/>
+                <a:ea typeface="Arial"/>
+                <a:cs typeface="Arial"/>
+                <a:sym typeface="Arial"/>
+              </a:rPr>
+              <a:t>Distributed VCS</a:t>
+            </a:r>
+            <a:r>
+              <a:rPr lang="en-GB" sz="1400">
+                <a:solidFill>
+                  <a:srgbClr val="000000"/>
+                </a:solidFill>
+                <a:latin typeface="Arial"/>
+                <a:ea typeface="Arial"/>
+                <a:cs typeface="Arial"/>
+                <a:sym typeface="Arial"/>
+              </a:rPr>
+              <a:t> is a system where </a:t>
+            </a:r>
+            <a:endParaRPr sz="1400">
+              <a:solidFill>
+                <a:srgbClr val="000000"/>
+              </a:solidFill>
+              <a:latin typeface="Arial"/>
+              <a:ea typeface="Arial"/>
+              <a:cs typeface="Arial"/>
+              <a:sym typeface="Arial"/>
+            </a:endParaRPr>
           </a:p>
           <a:p>
             <a:pPr indent="0" lvl="0" marL="0" rtl="0" algn="l">
@@ -9094,23 +11824,26 @@
               <a:buNone/>
             </a:pPr>
             <a:r>
-              <a:rPr i="1" lang="en-GB" sz="2100"/>
-              <a:t>git config --global user.email “</a:t>
-            </a:r>
-            <a:r>
-              <a:rPr i="1" lang="en-GB" sz="2100" u="sng">
-                <a:solidFill>
-                  <a:schemeClr val="hlink"/>
-                </a:solidFill>
-                <a:hlinkClick r:id="rId3"/>
+              <a:rPr lang="en-GB" sz="1400">
+                <a:solidFill>
+                  <a:srgbClr val="000000"/>
+                </a:solidFill>
+                <a:latin typeface="Arial"/>
+                <a:ea typeface="Arial"/>
+                <a:cs typeface="Arial"/>
+                <a:sym typeface="Arial"/>
               </a:rPr>
-              <a:t>khushee@gmail.com</a:t>
-            </a:r>
-            <a:r>
-              <a:rPr i="1" lang="en-GB" sz="2100"/>
-              <a:t>”</a:t>
-            </a:r>
-            <a:endParaRPr i="1" sz="2100"/>
+              <a:t>every user has a full local copy of the repository,</a:t>
+            </a:r>
+            <a:endParaRPr sz="1400">
+              <a:solidFill>
+                <a:srgbClr val="000000"/>
+              </a:solidFill>
+              <a:latin typeface="Arial"/>
+              <a:ea typeface="Arial"/>
+              <a:cs typeface="Arial"/>
+              <a:sym typeface="Arial"/>
+            </a:endParaRPr>
           </a:p>
           <a:p>
             <a:pPr indent="0" lvl="0" marL="0" rtl="0" algn="l">
@@ -9118,18 +11851,97 @@
                 <a:spcPts val="1200"/>
               </a:spcBef>
               <a:spcAft>
+                <a:spcPts val="0"/>
+              </a:spcAft>
+              <a:buNone/>
+            </a:pPr>
+            <a:r>
+              <a:rPr lang="en-GB" sz="1400">
+                <a:solidFill>
+                  <a:srgbClr val="000000"/>
+                </a:solidFill>
+                <a:latin typeface="Arial"/>
+                <a:ea typeface="Arial"/>
+                <a:cs typeface="Arial"/>
+                <a:sym typeface="Arial"/>
+              </a:rPr>
+              <a:t> enabling offline commits, branching,</a:t>
+            </a:r>
+            <a:endParaRPr sz="1400">
+              <a:solidFill>
+                <a:srgbClr val="000000"/>
+              </a:solidFill>
+              <a:latin typeface="Arial"/>
+              <a:ea typeface="Arial"/>
+              <a:cs typeface="Arial"/>
+              <a:sym typeface="Arial"/>
+            </a:endParaRPr>
+          </a:p>
+          <a:p>
+            <a:pPr indent="0" lvl="0" marL="0" rtl="0" algn="l">
+              <a:spcBef>
                 <a:spcPts val="1200"/>
-              </a:spcAft>
-              <a:buNone/>
-            </a:pPr>
-            <a:r>
-              <a:rPr i="1" lang="en-GB" sz="2100"/>
-              <a:t>git config --list</a:t>
-            </a:r>
-            <a:endParaRPr i="1" sz="2100"/>
+              </a:spcBef>
+              <a:spcAft>
+                <a:spcPts val="1200"/>
+              </a:spcAft>
+              <a:buNone/>
+            </a:pPr>
+            <a:r>
+              <a:rPr lang="en-GB" sz="1400">
+                <a:solidFill>
+                  <a:srgbClr val="000000"/>
+                </a:solidFill>
+                <a:latin typeface="Arial"/>
+                <a:ea typeface="Arial"/>
+                <a:cs typeface="Arial"/>
+                <a:sym typeface="Arial"/>
+              </a:rPr>
+              <a:t> merging, and secure collaboration.</a:t>
+            </a:r>
+            <a:br>
+              <a:rPr lang="en-GB" sz="1400">
+                <a:solidFill>
+                  <a:srgbClr val="000000"/>
+                </a:solidFill>
+                <a:latin typeface="Arial"/>
+                <a:ea typeface="Arial"/>
+                <a:cs typeface="Arial"/>
+                <a:sym typeface="Arial"/>
+              </a:rPr>
+            </a:br>
+            <a:endParaRPr sz="2100"/>
           </a:p>
         </p:txBody>
       </p:sp>
+      <p:pic>
+        <p:nvPicPr>
+          <p:cNvPr id="102" name="Google Shape;102;p19" title="distr vcs.png"/>
+          <p:cNvPicPr preferRelativeResize="0"/>
+          <p:nvPr/>
+        </p:nvPicPr>
+        <p:blipFill>
+          <a:blip r:embed="rId3">
+            <a:alphaModFix/>
+          </a:blip>
+          <a:stretch>
+            <a:fillRect/>
+          </a:stretch>
+        </p:blipFill>
+        <p:spPr>
+          <a:xfrm>
+            <a:off x="3759121" y="1152475"/>
+            <a:ext cx="5165702" cy="3416399"/>
+          </a:xfrm>
+          <a:prstGeom prst="rect">
+            <a:avLst/>
+          </a:prstGeom>
+          <a:noFill/>
+          <a:ln>
+            <a:noFill/>
+          </a:ln>
+        </p:spPr>
+      </p:pic>
     </p:spTree>
   </p:cSld>
   <p:clrMapOvr>
@@ -9138,12 +11950,12 @@
 </p:sld>
 </file>
 
-<file path=ppt/slides/slide6.xml><?xml version="1.0" encoding="utf-8"?>
+<file path=ppt/slides/slide8.xml><?xml version="1.0" encoding="utf-8"?>
 <p:sld xmlns:a="http://schemas.openxmlformats.org/drawingml/2006/main" xmlns:r="http://schemas.openxmlformats.org/officeDocument/2006/relationships" xmlns:mc="http://schemas.openxmlformats.org/markup-compatibility/2006" xmlns:mv="urn:schemas-microsoft-com:mac:vml" xmlns:p="http://schemas.openxmlformats.org/presentationml/2006/main" xmlns:c="http://schemas.openxmlformats.org/drawingml/2006/chart" xmlns:dgm="http://schemas.openxmlformats.org/drawingml/2006/diagram" xmlns:o="urn:schemas-microsoft-com:office:office" xmlns:v="urn:schemas-microsoft-com:vml" xmlns:pvml="urn:schemas-microsoft-com:office:powerpoint" xmlns:com="http://schemas.openxmlformats.org/drawingml/2006/compatibility" xmlns:p14="http://schemas.microsoft.com/office/powerpoint/2010/main" xmlns:p15="http://schemas.microsoft.com/office/powerpoint/2012/main" xmlns:ahyp="http://schemas.microsoft.com/office/drawing/2018/hyperlinkcolor">
   <p:cSld>
     <p:spTree>
       <p:nvGrpSpPr>
-        <p:cNvPr id="90" name="Shape 90"/>
+        <p:cNvPr id="106" name="Shape 106"/>
         <p:cNvGrpSpPr/>
         <p:nvPr/>
       </p:nvGrpSpPr>
@@ -9157,7 +11969,7 @@
       </p:grpSpPr>
       <p:sp>
         <p:nvSpPr>
-          <p:cNvPr id="91" name="Google Shape;91;p18"/>
+          <p:cNvPr id="107" name="Google Shape;107;p20"/>
           <p:cNvSpPr txBox="1"/>
           <p:nvPr>
             <p:ph type="title"/>
@@ -9174,7 +11986,7 @@
         </p:spPr>
         <p:txBody>
           <a:bodyPr anchorCtr="0" anchor="t" bIns="91425" lIns="91425" spcFirstLastPara="1" rIns="91425" wrap="square" tIns="91425">
-            <a:noAutofit/>
+            <a:normAutofit fontScale="90000"/>
           </a:bodyPr>
           <a:lstStyle/>
           <a:p>
@@ -9185,28 +11997,18 @@
               <a:spcAft>
                 <a:spcPts val="0"/>
               </a:spcAft>
-              <a:buSzPts val="990"/>
-              <a:buNone/>
-            </a:pPr>
-            <a:r>
-              <a:rPr lang="en-GB" sz="3200">
-                <a:solidFill>
-                  <a:schemeClr val="accent5"/>
-                </a:solidFill>
-              </a:rPr>
-              <a:t>Github Account</a:t>
-            </a:r>
-            <a:endParaRPr sz="3200">
-              <a:solidFill>
-                <a:schemeClr val="accent5"/>
-              </a:solidFill>
-            </a:endParaRPr>
+              <a:buNone/>
+            </a:pPr>
+            <a:r>
+              <a:t/>
+            </a:r>
+            <a:endParaRPr/>
           </a:p>
         </p:txBody>
       </p:sp>
       <p:sp>
         <p:nvSpPr>
-          <p:cNvPr id="92" name="Google Shape;92;p18"/>
+          <p:cNvPr id="108" name="Google Shape;108;p20"/>
           <p:cNvSpPr txBox="1"/>
           <p:nvPr>
             <p:ph idx="1" type="body"/>
@@ -9232,34 +12034,44 @@
                 <a:spcPts val="0"/>
               </a:spcBef>
               <a:spcAft>
-                <a:spcPts val="0"/>
-              </a:spcAft>
-              <a:buNone/>
-            </a:pPr>
-            <a:r>
-              <a:rPr lang="en-GB" sz="2100"/>
-              <a:t>Create a new repository : github-demo</a:t>
-            </a:r>
-            <a:endParaRPr sz="2100"/>
-          </a:p>
-          <a:p>
-            <a:pPr indent="0" lvl="0" marL="0" rtl="0" algn="l">
-              <a:spcBef>
                 <a:spcPts val="1200"/>
-              </a:spcBef>
-              <a:spcAft>
-                <a:spcPts val="1200"/>
-              </a:spcAft>
-              <a:buNone/>
-            </a:pPr>
-            <a:r>
-              <a:rPr lang="en-GB" sz="2100"/>
-              <a:t>Make our first commit</a:t>
-            </a:r>
-            <a:endParaRPr sz="2100"/>
+              </a:spcAft>
+              <a:buNone/>
+            </a:pPr>
+            <a:r>
+              <a:t/>
+            </a:r>
+            <a:endParaRPr/>
           </a:p>
         </p:txBody>
       </p:sp>
+      <p:pic>
+        <p:nvPicPr>
+          <p:cNvPr id="109" name="Google Shape;109;p20"/>
+          <p:cNvPicPr preferRelativeResize="0"/>
+          <p:nvPr/>
+        </p:nvPicPr>
+        <p:blipFill rotWithShape="1">
+          <a:blip r:embed="rId3">
+            <a:alphaModFix/>
+          </a:blip>
+          <a:srcRect b="-2082" l="0" r="1370" t="-502"/>
+          <a:stretch/>
+        </p:blipFill>
+        <p:spPr>
+          <a:xfrm>
+            <a:off x="-80925" y="-70800"/>
+            <a:ext cx="9322025" cy="5352876"/>
+          </a:xfrm>
+          <a:prstGeom prst="rect">
+            <a:avLst/>
+          </a:prstGeom>
+          <a:noFill/>
+          <a:ln>
+            <a:noFill/>
+          </a:ln>
+        </p:spPr>
+      </p:pic>
     </p:spTree>
   </p:cSld>
   <p:clrMapOvr>
@@ -9268,12 +12080,12 @@
 </p:sld>
 </file>
 
-<file path=ppt/slides/slide7.xml><?xml version="1.0" encoding="utf-8"?>
+<file path=ppt/slides/slide9.xml><?xml version="1.0" encoding="utf-8"?>
 <p:sld xmlns:a="http://schemas.openxmlformats.org/drawingml/2006/main" xmlns:r="http://schemas.openxmlformats.org/officeDocument/2006/relationships" xmlns:mc="http://schemas.openxmlformats.org/markup-compatibility/2006" xmlns:mv="urn:schemas-microsoft-com:mac:vml" xmlns:p="http://schemas.openxmlformats.org/presentationml/2006/main" xmlns:c="http://schemas.openxmlformats.org/drawingml/2006/chart" xmlns:dgm="http://schemas.openxmlformats.org/drawingml/2006/diagram" xmlns:o="urn:schemas-microsoft-com:office:office" xmlns:v="urn:schemas-microsoft-com:vml" xmlns:pvml="urn:schemas-microsoft-com:office:powerpoint" xmlns:com="http://schemas.openxmlformats.org/drawingml/2006/compatibility" xmlns:p14="http://schemas.microsoft.com/office/powerpoint/2010/main" xmlns:p15="http://schemas.microsoft.com/office/powerpoint/2012/main" xmlns:ahyp="http://schemas.microsoft.com/office/drawing/2018/hyperlinkcolor">
   <p:cSld>
     <p:spTree>
       <p:nvGrpSpPr>
-        <p:cNvPr id="96" name="Shape 96"/>
+        <p:cNvPr id="113" name="Shape 113"/>
         <p:cNvGrpSpPr/>
         <p:nvPr/>
       </p:nvGrpSpPr>
@@ -9287,7 +12099,7 @@
       </p:grpSpPr>
       <p:sp>
         <p:nvSpPr>
-          <p:cNvPr id="97" name="Google Shape;97;p19"/>
+          <p:cNvPr id="114" name="Google Shape;114;p21"/>
           <p:cNvSpPr txBox="1"/>
           <p:nvPr>
             <p:ph type="title"/>
@@ -9295,7 +12107,7 @@
         </p:nvSpPr>
         <p:spPr>
           <a:xfrm>
-            <a:off x="311700" y="445025"/>
+            <a:off x="1384450" y="412200"/>
             <a:ext cx="8520600" cy="572700"/>
           </a:xfrm>
           <a:prstGeom prst="rect">
@@ -9324,7 +12136,7 @@
                   <a:schemeClr val="accent5"/>
                 </a:solidFill>
               </a:rPr>
-              <a:t>Clone &amp; Status</a:t>
+              <a:t>Github</a:t>
             </a:r>
             <a:endParaRPr sz="3200">
               <a:solidFill>
@@ -9336,7 +12148,7 @@
       </p:sp>
       <p:sp>
         <p:nvSpPr>
-          <p:cNvPr id="98" name="Google Shape;98;p19"/>
+          <p:cNvPr id="115" name="Google Shape;115;p21"/>
           <p:cNvSpPr txBox="1"/>
           <p:nvPr>
             <p:ph idx="1" type="body"/>
@@ -9367,24 +12179,24 @@
               <a:buNone/>
             </a:pPr>
             <a:r>
-              <a:rPr b="1" lang="en-GB" sz="2100">
-                <a:solidFill>
-                  <a:srgbClr val="A4C2F4"/>
+              <a:rPr b="1" lang="en-GB">
+                <a:solidFill>
+                  <a:srgbClr val="CACAC6"/>
                 </a:solidFill>
               </a:rPr>
-              <a:t>Clone- </a:t>
-            </a:r>
-            <a:r>
-              <a:rPr lang="en-GB" sz="2100">
-                <a:solidFill>
-                  <a:schemeClr val="dk1"/>
+              <a:t>GitHub is an online platform that hosts Git repositories</a:t>
+            </a:r>
+            <a:r>
+              <a:rPr lang="en-GB">
+                <a:solidFill>
+                  <a:srgbClr val="CACAC6"/>
                 </a:solidFill>
               </a:rPr>
-              <a:t>Cloning a repository on our local machine</a:t>
-            </a:r>
-            <a:endParaRPr sz="2100">
+              <a:t>, enabling </a:t>
+            </a:r>
+            <a:endParaRPr>
               <a:solidFill>
-                <a:schemeClr val="dk1"/>
+                <a:srgbClr val="CACAC6"/>
               </a:solidFill>
             </a:endParaRPr>
           </a:p>
@@ -9399,24 +12211,54 @@
               <a:buNone/>
             </a:pPr>
             <a:r>
-              <a:rPr lang="en-GB" sz="2100">
-                <a:solidFill>
-                  <a:schemeClr val="dk1"/>
+              <a:rPr lang="en-GB">
+                <a:solidFill>
+                  <a:srgbClr val="CACAC6"/>
                 </a:solidFill>
               </a:rPr>
-              <a:t>	</a:t>
-            </a:r>
-            <a:r>
-              <a:rPr i="1" lang="en-GB" sz="2100">
-                <a:solidFill>
-                  <a:schemeClr val="dk1"/>
+              <a:t>developers to store, share and manage their codes using Git.</a:t>
+            </a:r>
+            <a:br>
+              <a:rPr lang="en-GB">
+                <a:solidFill>
+                  <a:srgbClr val="CACAC6"/>
                 </a:solidFill>
               </a:rPr>
-              <a:t>git clone &lt;- some link -&gt;</a:t>
-            </a:r>
-            <a:endParaRPr i="1" sz="2100">
+            </a:br>
+            <a:br>
+              <a:rPr lang="en-GB">
+                <a:solidFill>
+                  <a:srgbClr val="CACAC6"/>
+                </a:solidFill>
+              </a:rPr>
+            </a:br>
+            <a:r>
+              <a:rPr lang="en-GB">
+                <a:solidFill>
+                  <a:srgbClr val="CACAC6"/>
+                </a:solidFill>
+              </a:rPr>
+              <a:t>GitHub is like </a:t>
+            </a:r>
+            <a:r>
+              <a:rPr b="1" lang="en-GB">
+                <a:solidFill>
+                  <a:srgbClr val="CACAC6"/>
+                </a:solidFill>
+              </a:rPr>
+              <a:t>Google Drive for code</a:t>
+            </a:r>
+            <a:r>
+              <a:rPr lang="en-GB">
+                <a:solidFill>
+                  <a:srgbClr val="CACAC6"/>
+                </a:solidFill>
+              </a:rPr>
+              <a:t>, but with built-in version control, collaboration, and development tools.</a:t>
+            </a:r>
+            <a:endParaRPr>
               <a:solidFill>
-                <a:schemeClr val="dk1"/>
+                <a:srgbClr val="CACAC6"/>
               </a:solidFill>
             </a:endParaRPr>
           </a:p>
@@ -9426,494 +12268,45 @@
                 <a:spcPts val="1200"/>
               </a:spcBef>
               <a:spcAft>
-                <a:spcPts val="0"/>
-              </a:spcAft>
-              <a:buNone/>
-            </a:pPr>
-            <a:r>
-              <a:rPr b="1" lang="en-GB" sz="2100">
-                <a:solidFill>
-                  <a:srgbClr val="A4C2F4"/>
-                </a:solidFill>
-              </a:rPr>
-              <a:t>status</a:t>
-            </a:r>
-            <a:r>
-              <a:rPr b="1" lang="en-GB" sz="2100">
-                <a:solidFill>
-                  <a:srgbClr val="A4C2F4"/>
-                </a:solidFill>
-              </a:rPr>
-              <a:t>- </a:t>
-            </a:r>
-            <a:r>
-              <a:rPr lang="en-GB" sz="2100">
-                <a:solidFill>
-                  <a:schemeClr val="dk1"/>
-                </a:solidFill>
-              </a:rPr>
-              <a:t>displays the status of the code</a:t>
-            </a:r>
-            <a:endParaRPr sz="2100">
-              <a:solidFill>
-                <a:schemeClr val="dk1"/>
-              </a:solidFill>
-            </a:endParaRPr>
-          </a:p>
-          <a:p>
-            <a:pPr indent="0" lvl="0" marL="0" rtl="0" algn="l">
-              <a:spcBef>
                 <a:spcPts val="1200"/>
-              </a:spcBef>
-              <a:spcAft>
-                <a:spcPts val="1200"/>
-              </a:spcAft>
-              <a:buNone/>
-            </a:pPr>
-            <a:r>
-              <a:rPr lang="en-GB" sz="2100">
-                <a:solidFill>
-                  <a:schemeClr val="dk1"/>
-                </a:solidFill>
-              </a:rPr>
-              <a:t>	</a:t>
-            </a:r>
-            <a:r>
-              <a:rPr i="1" lang="en-GB" sz="2100">
-                <a:solidFill>
-                  <a:schemeClr val="dk1"/>
-                </a:solidFill>
-              </a:rPr>
-              <a:t>git status </a:t>
-            </a:r>
-            <a:endParaRPr i="1" sz="2100">
-              <a:solidFill>
-                <a:schemeClr val="dk1"/>
-              </a:solidFill>
-            </a:endParaRPr>
+              </a:spcAft>
+              <a:buNone/>
+            </a:pPr>
+            <a:r>
+              <a:rPr i="1" lang="en-GB" sz="2100"/>
+              <a:t>https://github.com</a:t>
+            </a:r>
+            <a:endParaRPr i="1" sz="2100"/>
           </a:p>
         </p:txBody>
       </p:sp>
-    </p:spTree>
-  </p:cSld>
-  <p:clrMapOvr>
-    <a:masterClrMapping/>
-  </p:clrMapOvr>
-</p:sld>
-</file>
-
-<file path=ppt/slides/slide8.xml><?xml version="1.0" encoding="utf-8"?>
-<p:sld xmlns:a="http://schemas.openxmlformats.org/drawingml/2006/main" xmlns:r="http://schemas.openxmlformats.org/officeDocument/2006/relationships" xmlns:mc="http://schemas.openxmlformats.org/markup-compatibility/2006" xmlns:mv="urn:schemas-microsoft-com:mac:vml" xmlns:p="http://schemas.openxmlformats.org/presentationml/2006/main" xmlns:c="http://schemas.openxmlformats.org/drawingml/2006/chart" xmlns:dgm="http://schemas.openxmlformats.org/drawingml/2006/diagram" xmlns:o="urn:schemas-microsoft-com:office:office" xmlns:v="urn:schemas-microsoft-com:vml" xmlns:pvml="urn:schemas-microsoft-com:office:powerpoint" xmlns:com="http://schemas.openxmlformats.org/drawingml/2006/compatibility" xmlns:p14="http://schemas.microsoft.com/office/powerpoint/2010/main" xmlns:p15="http://schemas.microsoft.com/office/powerpoint/2012/main" xmlns:ahyp="http://schemas.microsoft.com/office/drawing/2018/hyperlinkcolor">
-  <p:cSld>
-    <p:spTree>
-      <p:nvGrpSpPr>
-        <p:cNvPr id="102" name="Shape 102"/>
-        <p:cNvGrpSpPr/>
-        <p:nvPr/>
-      </p:nvGrpSpPr>
-      <p:grpSpPr>
-        <a:xfrm>
-          <a:off x="0" y="0"/>
-          <a:ext cx="0" cy="0"/>
-          <a:chOff x="0" y="0"/>
-          <a:chExt cx="0" cy="0"/>
-        </a:xfrm>
-      </p:grpSpPr>
-      <p:sp>
-        <p:nvSpPr>
-          <p:cNvPr id="103" name="Google Shape;103;p20"/>
-          <p:cNvSpPr txBox="1"/>
-          <p:nvPr>
-            <p:ph type="title"/>
-          </p:nvPr>
-        </p:nvSpPr>
+      <p:pic>
+        <p:nvPicPr>
+          <p:cNvPr id="116" name="Google Shape;116;p21" title="Screenshot_2025-12-04_194506-removebg-preview-removebg-preview.png"/>
+          <p:cNvPicPr preferRelativeResize="0"/>
+          <p:nvPr/>
+        </p:nvPicPr>
+        <p:blipFill rotWithShape="1">
+          <a:blip r:embed="rId3">
+            <a:alphaModFix/>
+          </a:blip>
+          <a:srcRect b="10371" l="55091" r="5955" t="6654"/>
+          <a:stretch/>
+        </p:blipFill>
         <p:spPr>
           <a:xfrm>
-            <a:off x="311700" y="445025"/>
-            <a:ext cx="8520600" cy="572700"/>
+            <a:off x="311700" y="159050"/>
+            <a:ext cx="1072757" cy="938675"/>
           </a:xfrm>
           <a:prstGeom prst="rect">
             <a:avLst/>
           </a:prstGeom>
+          <a:noFill/>
+          <a:ln>
+            <a:noFill/>
+          </a:ln>
         </p:spPr>
-        <p:txBody>
-          <a:bodyPr anchorCtr="0" anchor="t" bIns="91425" lIns="91425" spcFirstLastPara="1" rIns="91425" wrap="square" tIns="91425">
-            <a:noAutofit/>
-          </a:bodyPr>
-          <a:lstStyle/>
-          <a:p>
-            <a:pPr indent="0" lvl="0" marL="0" rtl="0" algn="l">
-              <a:spcBef>
-                <a:spcPts val="0"/>
-              </a:spcBef>
-              <a:spcAft>
-                <a:spcPts val="0"/>
-              </a:spcAft>
-              <a:buSzPts val="990"/>
-              <a:buNone/>
-            </a:pPr>
-            <a:r>
-              <a:rPr lang="en-GB" sz="3200">
-                <a:solidFill>
-                  <a:schemeClr val="accent5"/>
-                </a:solidFill>
-              </a:rPr>
-              <a:t>Add &amp; Commit</a:t>
-            </a:r>
-            <a:endParaRPr sz="3200">
-              <a:solidFill>
-                <a:schemeClr val="accent5"/>
-              </a:solidFill>
-            </a:endParaRPr>
-          </a:p>
-        </p:txBody>
-      </p:sp>
-      <p:sp>
-        <p:nvSpPr>
-          <p:cNvPr id="104" name="Google Shape;104;p20"/>
-          <p:cNvSpPr txBox="1"/>
-          <p:nvPr>
-            <p:ph idx="1" type="body"/>
-          </p:nvPr>
-        </p:nvSpPr>
-        <p:spPr>
-          <a:xfrm>
-            <a:off x="311700" y="1152475"/>
-            <a:ext cx="8520600" cy="3416400"/>
-          </a:xfrm>
-          <a:prstGeom prst="rect">
-            <a:avLst/>
-          </a:prstGeom>
-        </p:spPr>
-        <p:txBody>
-          <a:bodyPr anchorCtr="0" anchor="t" bIns="91425" lIns="91425" spcFirstLastPara="1" rIns="91425" wrap="square" tIns="91425">
-            <a:normAutofit/>
-          </a:bodyPr>
-          <a:lstStyle/>
-          <a:p>
-            <a:pPr indent="0" lvl="0" marL="0" rtl="0" algn="l">
-              <a:spcBef>
-                <a:spcPts val="0"/>
-              </a:spcBef>
-              <a:spcAft>
-                <a:spcPts val="0"/>
-              </a:spcAft>
-              <a:buNone/>
-            </a:pPr>
-            <a:r>
-              <a:rPr b="1" lang="en-GB" sz="2100">
-                <a:solidFill>
-                  <a:srgbClr val="A4C2F4"/>
-                </a:solidFill>
-              </a:rPr>
-              <a:t>add</a:t>
-            </a:r>
-            <a:r>
-              <a:rPr b="1" lang="en-GB" sz="2100">
-                <a:solidFill>
-                  <a:srgbClr val="A4C2F4"/>
-                </a:solidFill>
-              </a:rPr>
-              <a:t>- </a:t>
-            </a:r>
-            <a:r>
-              <a:rPr lang="en-GB" sz="2100">
-                <a:solidFill>
-                  <a:schemeClr val="dk1"/>
-                </a:solidFill>
-              </a:rPr>
-              <a:t>adds new or changed files in your working directory to the Git staging area.</a:t>
-            </a:r>
-            <a:endParaRPr sz="2100">
-              <a:solidFill>
-                <a:schemeClr val="dk1"/>
-              </a:solidFill>
-            </a:endParaRPr>
-          </a:p>
-          <a:p>
-            <a:pPr indent="0" lvl="0" marL="0" rtl="0" algn="l">
-              <a:spcBef>
-                <a:spcPts val="1200"/>
-              </a:spcBef>
-              <a:spcAft>
-                <a:spcPts val="0"/>
-              </a:spcAft>
-              <a:buNone/>
-            </a:pPr>
-            <a:r>
-              <a:rPr lang="en-GB" sz="2100">
-                <a:solidFill>
-                  <a:schemeClr val="dk1"/>
-                </a:solidFill>
-              </a:rPr>
-              <a:t>	</a:t>
-            </a:r>
-            <a:r>
-              <a:rPr i="1" lang="en-GB" sz="2100">
-                <a:solidFill>
-                  <a:schemeClr val="dk1"/>
-                </a:solidFill>
-              </a:rPr>
-              <a:t>git add &lt;- file name -&gt;</a:t>
-            </a:r>
-            <a:endParaRPr i="1" sz="2100">
-              <a:solidFill>
-                <a:schemeClr val="dk1"/>
-              </a:solidFill>
-            </a:endParaRPr>
-          </a:p>
-          <a:p>
-            <a:pPr indent="0" lvl="0" marL="0" rtl="0" algn="l">
-              <a:spcBef>
-                <a:spcPts val="1200"/>
-              </a:spcBef>
-              <a:spcAft>
-                <a:spcPts val="0"/>
-              </a:spcAft>
-              <a:buNone/>
-            </a:pPr>
-            <a:r>
-              <a:rPr b="1" lang="en-GB" sz="2100">
-                <a:solidFill>
-                  <a:srgbClr val="A4C2F4"/>
-                </a:solidFill>
-              </a:rPr>
-              <a:t>commit</a:t>
-            </a:r>
-            <a:r>
-              <a:rPr b="1" lang="en-GB" sz="2100">
-                <a:solidFill>
-                  <a:srgbClr val="A4C2F4"/>
-                </a:solidFill>
-              </a:rPr>
-              <a:t>- </a:t>
-            </a:r>
-            <a:r>
-              <a:rPr lang="en-GB" sz="2100">
-                <a:solidFill>
-                  <a:schemeClr val="dk1"/>
-                </a:solidFill>
-              </a:rPr>
-              <a:t>it is the record of change</a:t>
-            </a:r>
-            <a:endParaRPr sz="2100">
-              <a:solidFill>
-                <a:schemeClr val="dk1"/>
-              </a:solidFill>
-            </a:endParaRPr>
-          </a:p>
-          <a:p>
-            <a:pPr indent="0" lvl="0" marL="0" rtl="0" algn="l">
-              <a:spcBef>
-                <a:spcPts val="1200"/>
-              </a:spcBef>
-              <a:spcAft>
-                <a:spcPts val="1200"/>
-              </a:spcAft>
-              <a:buNone/>
-            </a:pPr>
-            <a:r>
-              <a:rPr lang="en-GB" sz="2100">
-                <a:solidFill>
-                  <a:schemeClr val="dk1"/>
-                </a:solidFill>
-              </a:rPr>
-              <a:t>	</a:t>
-            </a:r>
-            <a:r>
-              <a:rPr i="1" lang="en-GB" sz="2100">
-                <a:solidFill>
-                  <a:schemeClr val="dk1"/>
-                </a:solidFill>
-              </a:rPr>
-              <a:t>git commit -m “some message”</a:t>
-            </a:r>
-            <a:endParaRPr i="1" sz="2100">
-              <a:solidFill>
-                <a:schemeClr val="dk1"/>
-              </a:solidFill>
-            </a:endParaRPr>
-          </a:p>
-        </p:txBody>
-      </p:sp>
-    </p:spTree>
-  </p:cSld>
-  <p:clrMapOvr>
-    <a:masterClrMapping/>
-  </p:clrMapOvr>
-</p:sld>
-</file>
-
-<file path=ppt/slides/slide9.xml><?xml version="1.0" encoding="utf-8"?>
-<p:sld xmlns:a="http://schemas.openxmlformats.org/drawingml/2006/main" xmlns:r="http://schemas.openxmlformats.org/officeDocument/2006/relationships" xmlns:mc="http://schemas.openxmlformats.org/markup-compatibility/2006" xmlns:mv="urn:schemas-microsoft-com:mac:vml" xmlns:p="http://schemas.openxmlformats.org/presentationml/2006/main" xmlns:c="http://schemas.openxmlformats.org/drawingml/2006/chart" xmlns:dgm="http://schemas.openxmlformats.org/drawingml/2006/diagram" xmlns:o="urn:schemas-microsoft-com:office:office" xmlns:v="urn:schemas-microsoft-com:vml" xmlns:pvml="urn:schemas-microsoft-com:office:powerpoint" xmlns:com="http://schemas.openxmlformats.org/drawingml/2006/compatibility" xmlns:p14="http://schemas.microsoft.com/office/powerpoint/2010/main" xmlns:p15="http://schemas.microsoft.com/office/powerpoint/2012/main" xmlns:ahyp="http://schemas.microsoft.com/office/drawing/2018/hyperlinkcolor">
-  <p:cSld>
-    <p:spTree>
-      <p:nvGrpSpPr>
-        <p:cNvPr id="108" name="Shape 108"/>
-        <p:cNvGrpSpPr/>
-        <p:nvPr/>
-      </p:nvGrpSpPr>
-      <p:grpSpPr>
-        <a:xfrm>
-          <a:off x="0" y="0"/>
-          <a:ext cx="0" cy="0"/>
-          <a:chOff x="0" y="0"/>
-          <a:chExt cx="0" cy="0"/>
-        </a:xfrm>
-      </p:grpSpPr>
-      <p:sp>
-        <p:nvSpPr>
-          <p:cNvPr id="109" name="Google Shape;109;p21"/>
-          <p:cNvSpPr txBox="1"/>
-          <p:nvPr>
-            <p:ph type="title"/>
-          </p:nvPr>
-        </p:nvSpPr>
-        <p:spPr>
-          <a:xfrm>
-            <a:off x="311700" y="445025"/>
-            <a:ext cx="8520600" cy="572700"/>
-          </a:xfrm>
-          <a:prstGeom prst="rect">
-            <a:avLst/>
-          </a:prstGeom>
-        </p:spPr>
-        <p:txBody>
-          <a:bodyPr anchorCtr="0" anchor="t" bIns="91425" lIns="91425" spcFirstLastPara="1" rIns="91425" wrap="square" tIns="91425">
-            <a:noAutofit/>
-          </a:bodyPr>
-          <a:lstStyle/>
-          <a:p>
-            <a:pPr indent="0" lvl="0" marL="0" rtl="0" algn="l">
-              <a:spcBef>
-                <a:spcPts val="0"/>
-              </a:spcBef>
-              <a:spcAft>
-                <a:spcPts val="0"/>
-              </a:spcAft>
-              <a:buSzPts val="990"/>
-              <a:buNone/>
-            </a:pPr>
-            <a:r>
-              <a:rPr lang="en-GB" sz="3200">
-                <a:solidFill>
-                  <a:schemeClr val="accent5"/>
-                </a:solidFill>
-              </a:rPr>
-              <a:t>Push Command</a:t>
-            </a:r>
-            <a:endParaRPr sz="3200">
-              <a:solidFill>
-                <a:schemeClr val="accent5"/>
-              </a:solidFill>
-            </a:endParaRPr>
-          </a:p>
-        </p:txBody>
-      </p:sp>
-      <p:sp>
-        <p:nvSpPr>
-          <p:cNvPr id="110" name="Google Shape;110;p21"/>
-          <p:cNvSpPr txBox="1"/>
-          <p:nvPr>
-            <p:ph idx="1" type="body"/>
-          </p:nvPr>
-        </p:nvSpPr>
-        <p:spPr>
-          <a:xfrm>
-            <a:off x="311700" y="1152475"/>
-            <a:ext cx="8520600" cy="3416400"/>
-          </a:xfrm>
-          <a:prstGeom prst="rect">
-            <a:avLst/>
-          </a:prstGeom>
-        </p:spPr>
-        <p:txBody>
-          <a:bodyPr anchorCtr="0" anchor="t" bIns="91425" lIns="91425" spcFirstLastPara="1" rIns="91425" wrap="square" tIns="91425">
-            <a:normAutofit/>
-          </a:bodyPr>
-          <a:lstStyle/>
-          <a:p>
-            <a:pPr indent="0" lvl="0" marL="0" rtl="0" algn="l">
-              <a:spcBef>
-                <a:spcPts val="0"/>
-              </a:spcBef>
-              <a:spcAft>
-                <a:spcPts val="0"/>
-              </a:spcAft>
-              <a:buNone/>
-            </a:pPr>
-            <a:r>
-              <a:rPr b="1" lang="en-GB" sz="2100">
-                <a:solidFill>
-                  <a:srgbClr val="A4C2F4"/>
-                </a:solidFill>
-              </a:rPr>
-              <a:t>Push</a:t>
-            </a:r>
-            <a:r>
-              <a:rPr b="1" lang="en-GB" sz="2100">
-                <a:solidFill>
-                  <a:srgbClr val="A4C2F4"/>
-                </a:solidFill>
-              </a:rPr>
-              <a:t>- upload local repo content to </a:t>
-            </a:r>
-            <a:r>
-              <a:rPr b="1" lang="en-GB" sz="2100">
-                <a:solidFill>
-                  <a:srgbClr val="A4C2F4"/>
-                </a:solidFill>
-              </a:rPr>
-              <a:t>remote</a:t>
-            </a:r>
-            <a:r>
-              <a:rPr b="1" lang="en-GB" sz="2100">
-                <a:solidFill>
-                  <a:srgbClr val="A4C2F4"/>
-                </a:solidFill>
-              </a:rPr>
-              <a:t> repo</a:t>
-            </a:r>
-            <a:endParaRPr sz="2100">
-              <a:solidFill>
-                <a:schemeClr val="dk1"/>
-              </a:solidFill>
-            </a:endParaRPr>
-          </a:p>
-          <a:p>
-            <a:pPr indent="0" lvl="0" marL="0" rtl="0" algn="l">
-              <a:spcBef>
-                <a:spcPts val="1200"/>
-              </a:spcBef>
-              <a:spcAft>
-                <a:spcPts val="1200"/>
-              </a:spcAft>
-              <a:buNone/>
-            </a:pPr>
-            <a:r>
-              <a:rPr lang="en-GB" sz="2100">
-                <a:solidFill>
-                  <a:schemeClr val="dk1"/>
-                </a:solidFill>
-              </a:rPr>
-              <a:t>	</a:t>
-            </a:r>
-            <a:r>
-              <a:rPr i="1" lang="en-GB" sz="2100">
-                <a:solidFill>
-                  <a:schemeClr val="dk1"/>
-                </a:solidFill>
-              </a:rPr>
-              <a:t>git push origin main</a:t>
-            </a:r>
-            <a:endParaRPr i="1" sz="2100">
-              <a:solidFill>
-                <a:schemeClr val="dk1"/>
-              </a:solidFill>
-            </a:endParaRPr>
-          </a:p>
-        </p:txBody>
-      </p:sp>
+      </p:pic>
     </p:spTree>
   </p:cSld>
   <p:clrMapOvr>

</xml_diff>